<commit_message>
socket examples / asyncio
</commit_message>
<xml_diff>
--- a/Sockets.pptx
+++ b/Sockets.pptx
@@ -5,7 +5,7 @@
     <p:sldMasterId id="2147483648" r:id="rId1"/>
   </p:sldMasterIdLst>
   <p:notesMasterIdLst>
-    <p:notesMasterId r:id="rId38"/>
+    <p:notesMasterId r:id="rId40"/>
   </p:notesMasterIdLst>
   <p:sldIdLst>
     <p:sldId id="257" r:id="rId2"/>
@@ -43,7 +43,9 @@
     <p:sldId id="291" r:id="rId34"/>
     <p:sldId id="293" r:id="rId35"/>
     <p:sldId id="292" r:id="rId36"/>
-    <p:sldId id="294" r:id="rId37"/>
+    <p:sldId id="295" r:id="rId37"/>
+    <p:sldId id="296" r:id="rId38"/>
+    <p:sldId id="294" r:id="rId39"/>
   </p:sldIdLst>
   <p:sldSz cx="12192000" cy="6858000"/>
   <p:notesSz cx="6858000" cy="9144000"/>
@@ -232,7 +234,7 @@
           <a:p>
             <a:fld id="{60C2344A-5F44-9247-953C-2A7A155124F0}" type="datetimeFigureOut">
               <a:rPr lang="ru-RU" smtClean="0"/>
-              <a:t>28.03.2025</a:t>
+              <a:t>14.04.2025</a:t>
             </a:fld>
             <a:endParaRPr lang="ru-RU"/>
           </a:p>
@@ -2090,7 +2092,7 @@
           <a:p>
             <a:fld id="{4121567C-448C-7948-ABE2-6D095D07F811}" type="datetimeFigureOut">
               <a:rPr lang="ru-RU" smtClean="0"/>
-              <a:t>28.03.2025</a:t>
+              <a:t>14.04.2025</a:t>
             </a:fld>
             <a:endParaRPr lang="ru-RU"/>
           </a:p>
@@ -2288,7 +2290,7 @@
           <a:p>
             <a:fld id="{4121567C-448C-7948-ABE2-6D095D07F811}" type="datetimeFigureOut">
               <a:rPr lang="ru-RU" smtClean="0"/>
-              <a:t>28.03.2025</a:t>
+              <a:t>14.04.2025</a:t>
             </a:fld>
             <a:endParaRPr lang="ru-RU"/>
           </a:p>
@@ -2496,7 +2498,7 @@
           <a:p>
             <a:fld id="{4121567C-448C-7948-ABE2-6D095D07F811}" type="datetimeFigureOut">
               <a:rPr lang="ru-RU" smtClean="0"/>
-              <a:t>28.03.2025</a:t>
+              <a:t>14.04.2025</a:t>
             </a:fld>
             <a:endParaRPr lang="ru-RU"/>
           </a:p>
@@ -2898,7 +2900,7 @@
           <a:p>
             <a:fld id="{4121567C-448C-7948-ABE2-6D095D07F811}" type="datetimeFigureOut">
               <a:rPr lang="ru-RU" smtClean="0"/>
-              <a:t>28.03.2025</a:t>
+              <a:t>14.04.2025</a:t>
             </a:fld>
             <a:endParaRPr lang="ru-RU"/>
           </a:p>
@@ -3163,7 +3165,7 @@
           <a:p>
             <a:fld id="{4121567C-448C-7948-ABE2-6D095D07F811}" type="datetimeFigureOut">
               <a:rPr lang="ru-RU" smtClean="0"/>
-              <a:t>28.03.2025</a:t>
+              <a:t>14.04.2025</a:t>
             </a:fld>
             <a:endParaRPr lang="ru-RU"/>
           </a:p>
@@ -3575,7 +3577,7 @@
           <a:p>
             <a:fld id="{4121567C-448C-7948-ABE2-6D095D07F811}" type="datetimeFigureOut">
               <a:rPr lang="ru-RU" smtClean="0"/>
-              <a:t>28.03.2025</a:t>
+              <a:t>14.04.2025</a:t>
             </a:fld>
             <a:endParaRPr lang="ru-RU"/>
           </a:p>
@@ -3716,7 +3718,7 @@
           <a:p>
             <a:fld id="{4121567C-448C-7948-ABE2-6D095D07F811}" type="datetimeFigureOut">
               <a:rPr lang="ru-RU" smtClean="0"/>
-              <a:t>28.03.2025</a:t>
+              <a:t>14.04.2025</a:t>
             </a:fld>
             <a:endParaRPr lang="ru-RU"/>
           </a:p>
@@ -3829,7 +3831,7 @@
           <a:p>
             <a:fld id="{4121567C-448C-7948-ABE2-6D095D07F811}" type="datetimeFigureOut">
               <a:rPr lang="ru-RU" smtClean="0"/>
-              <a:t>28.03.2025</a:t>
+              <a:t>14.04.2025</a:t>
             </a:fld>
             <a:endParaRPr lang="ru-RU"/>
           </a:p>
@@ -4140,7 +4142,7 @@
           <a:p>
             <a:fld id="{4121567C-448C-7948-ABE2-6D095D07F811}" type="datetimeFigureOut">
               <a:rPr lang="ru-RU" smtClean="0"/>
-              <a:t>28.03.2025</a:t>
+              <a:t>14.04.2025</a:t>
             </a:fld>
             <a:endParaRPr lang="ru-RU"/>
           </a:p>
@@ -4428,7 +4430,7 @@
           <a:p>
             <a:fld id="{4121567C-448C-7948-ABE2-6D095D07F811}" type="datetimeFigureOut">
               <a:rPr lang="ru-RU" smtClean="0"/>
-              <a:t>28.03.2025</a:t>
+              <a:t>14.04.2025</a:t>
             </a:fld>
             <a:endParaRPr lang="ru-RU"/>
           </a:p>
@@ -4669,7 +4671,7 @@
           <a:p>
             <a:fld id="{4121567C-448C-7948-ABE2-6D095D07F811}" type="datetimeFigureOut">
               <a:rPr lang="ru-RU" smtClean="0"/>
-              <a:t>28.03.2025</a:t>
+              <a:t>14.04.2025</a:t>
             </a:fld>
             <a:endParaRPr lang="ru-RU"/>
           </a:p>
@@ -16967,7 +16969,7 @@
         </p:nvSpPr>
         <p:spPr>
           <a:xfrm>
-            <a:off x="677426" y="1149138"/>
+            <a:off x="397506" y="1149138"/>
             <a:ext cx="7733044" cy="4427697"/>
           </a:xfrm>
           <a:solidFill>
@@ -17645,7 +17647,7 @@
         </p:nvSpPr>
         <p:spPr>
           <a:xfrm>
-            <a:off x="5503722" y="5847920"/>
+            <a:off x="754440" y="5955146"/>
             <a:ext cx="6099348" cy="646331"/>
           </a:xfrm>
           <a:prstGeom prst="rect">
@@ -17705,8 +17707,8 @@
         </p:nvSpPr>
         <p:spPr>
           <a:xfrm>
-            <a:off x="5360796" y="1077840"/>
-            <a:ext cx="6099348" cy="3416320"/>
+            <a:off x="8289169" y="1077839"/>
+            <a:ext cx="3781530" cy="4498995"/>
           </a:xfrm>
           <a:prstGeom prst="rect">
             <a:avLst/>
@@ -34657,6 +34659,1204 @@
       </p:grpSpPr>
       <p:sp>
         <p:nvSpPr>
+          <p:cNvPr id="2" name="Заголовок 1">
+            <a:extLst>
+              <a:ext uri="{FF2B5EF4-FFF2-40B4-BE49-F238E27FC236}">
+                <a16:creationId xmlns:a16="http://schemas.microsoft.com/office/drawing/2014/main" id="{374D1B64-184B-7602-7008-76FAE2ECE2DB}"/>
+              </a:ext>
+            </a:extLst>
+          </p:cNvPr>
+          <p:cNvSpPr>
+            <a:spLocks noGrp="1"/>
+          </p:cNvSpPr>
+          <p:nvPr>
+            <p:ph type="title"/>
+          </p:nvPr>
+        </p:nvSpPr>
+        <p:spPr/>
+        <p:txBody>
+          <a:bodyPr/>
+          <a:lstStyle/>
+          <a:p>
+            <a:r>
+              <a:rPr lang="ru-RU" dirty="0"/>
+              <a:t>Что такое </a:t>
+            </a:r>
+            <a:r>
+              <a:rPr lang="en" dirty="0"/>
+              <a:t>asyncio?</a:t>
+            </a:r>
+            <a:endParaRPr lang="ru-RU" dirty="0"/>
+          </a:p>
+        </p:txBody>
+      </p:sp>
+      <p:sp>
+        <p:nvSpPr>
+          <p:cNvPr id="3" name="Объект 2">
+            <a:extLst>
+              <a:ext uri="{FF2B5EF4-FFF2-40B4-BE49-F238E27FC236}">
+                <a16:creationId xmlns:a16="http://schemas.microsoft.com/office/drawing/2014/main" id="{21F7B02E-89B8-4BD4-4B80-C97629CE9731}"/>
+              </a:ext>
+            </a:extLst>
+          </p:cNvPr>
+          <p:cNvSpPr>
+            <a:spLocks noGrp="1"/>
+          </p:cNvSpPr>
+          <p:nvPr>
+            <p:ph idx="1"/>
+          </p:nvPr>
+        </p:nvSpPr>
+        <p:spPr>
+          <a:xfrm>
+            <a:off x="838200" y="1027599"/>
+            <a:ext cx="10515600" cy="3447419"/>
+          </a:xfrm>
+        </p:spPr>
+        <p:txBody>
+          <a:bodyPr/>
+          <a:lstStyle/>
+          <a:p>
+            <a:pPr marL="0" indent="0">
+              <a:buNone/>
+            </a:pPr>
+            <a:r>
+              <a:rPr lang="en" sz="2000" b="1" dirty="0"/>
+              <a:t>asyncio</a:t>
+            </a:r>
+            <a:r>
+              <a:rPr lang="en" sz="2000" dirty="0"/>
+              <a:t> — </a:t>
+            </a:r>
+            <a:r>
+              <a:rPr lang="ru-RU" sz="2000" dirty="0"/>
+              <a:t>это стандартная библиотека </a:t>
+            </a:r>
+            <a:r>
+              <a:rPr lang="en" sz="2000" dirty="0"/>
+              <a:t>Python </a:t>
+            </a:r>
+            <a:r>
+              <a:rPr lang="ru-RU" sz="2000" dirty="0"/>
+              <a:t>для </a:t>
+            </a:r>
+            <a:r>
+              <a:rPr lang="ru-RU" sz="2000" b="1" dirty="0"/>
+              <a:t>асинхронного программирования</a:t>
+            </a:r>
+            <a:r>
+              <a:rPr lang="ru-RU" sz="2000" dirty="0"/>
+              <a:t>.</a:t>
+            </a:r>
+          </a:p>
+          <a:p>
+            <a:pPr>
+              <a:buFont typeface="Arial" panose="020B0604020202020204" pitchFamily="34" charset="0"/>
+              <a:buChar char="•"/>
+            </a:pPr>
+            <a:r>
+              <a:rPr lang="ru-RU" sz="2000" dirty="0"/>
+              <a:t>Позволяет писать </a:t>
+            </a:r>
+            <a:r>
+              <a:rPr lang="ru-RU" sz="2000" b="1" dirty="0"/>
+              <a:t>однопоточные, неблокирующие</a:t>
+            </a:r>
+            <a:r>
+              <a:rPr lang="ru-RU" sz="2000" dirty="0"/>
+              <a:t> приложения: идеально для сетевых задач, ввода-вывода, ботов и серверов.</a:t>
+            </a:r>
+          </a:p>
+          <a:p>
+            <a:pPr>
+              <a:buFont typeface="Arial" panose="020B0604020202020204" pitchFamily="34" charset="0"/>
+              <a:buChar char="•"/>
+            </a:pPr>
+            <a:r>
+              <a:rPr lang="ru-RU" sz="2000" dirty="0"/>
+              <a:t>Основан на </a:t>
+            </a:r>
+            <a:r>
+              <a:rPr lang="ru-RU" sz="2000" b="1" dirty="0"/>
+              <a:t>корутинах</a:t>
+            </a:r>
+            <a:r>
+              <a:rPr lang="ru-RU" sz="2000" dirty="0"/>
+              <a:t> (</a:t>
+            </a:r>
+            <a:r>
+              <a:rPr lang="en" sz="2000" dirty="0">
+                <a:latin typeface="Consolas" panose="020B0609020204030204" pitchFamily="49" charset="0"/>
+                <a:cs typeface="Consolas" panose="020B0609020204030204" pitchFamily="49" charset="0"/>
+              </a:rPr>
+              <a:t>async def / await</a:t>
+            </a:r>
+            <a:r>
+              <a:rPr lang="en" sz="2000" dirty="0"/>
+              <a:t>) </a:t>
+            </a:r>
+            <a:r>
+              <a:rPr lang="ru-RU" sz="2000" dirty="0"/>
+              <a:t>и </a:t>
+            </a:r>
+            <a:r>
+              <a:rPr lang="ru-RU" sz="2000" b="1" dirty="0"/>
+              <a:t>цикле событий</a:t>
+            </a:r>
+            <a:r>
+              <a:rPr lang="ru-RU" sz="2000" dirty="0"/>
+              <a:t> (</a:t>
+            </a:r>
+            <a:r>
+              <a:rPr lang="en" sz="2000" dirty="0"/>
+              <a:t>event loop).</a:t>
+            </a:r>
+          </a:p>
+          <a:p>
+            <a:pPr>
+              <a:buNone/>
+            </a:pPr>
+            <a:r>
+              <a:rPr lang="ru-RU" sz="2000" b="1" dirty="0"/>
+              <a:t>Основные концепции </a:t>
+            </a:r>
+            <a:r>
+              <a:rPr lang="en" sz="2000" b="1" dirty="0"/>
+              <a:t>asyncio</a:t>
+            </a:r>
+            <a:r>
+              <a:rPr lang="en-US" sz="2000" b="1" dirty="0"/>
+              <a:t>:</a:t>
+            </a:r>
+            <a:endParaRPr lang="en" sz="2000" b="1" dirty="0"/>
+          </a:p>
+          <a:p>
+            <a:pPr>
+              <a:buFont typeface="Arial" panose="020B0604020202020204" pitchFamily="34" charset="0"/>
+              <a:buChar char="•"/>
+            </a:pPr>
+            <a:r>
+              <a:rPr lang="ru-RU" sz="2000" b="1" dirty="0"/>
+              <a:t>Корутины</a:t>
+            </a:r>
+            <a:r>
+              <a:rPr lang="ru-RU" sz="2000" dirty="0"/>
+              <a:t>: функции, которые могут приостанавливать выполнение (</a:t>
+            </a:r>
+            <a:r>
+              <a:rPr lang="en" sz="2000" dirty="0"/>
+              <a:t>await) </a:t>
+            </a:r>
+            <a:r>
+              <a:rPr lang="ru-RU" sz="2000" dirty="0"/>
+              <a:t>и продолжать позже.</a:t>
+            </a:r>
+          </a:p>
+          <a:p>
+            <a:pPr>
+              <a:buFont typeface="Arial" panose="020B0604020202020204" pitchFamily="34" charset="0"/>
+              <a:buChar char="•"/>
+            </a:pPr>
+            <a:r>
+              <a:rPr lang="ru-RU" sz="2000" b="1" dirty="0"/>
+              <a:t>Событийный цикл</a:t>
+            </a:r>
+            <a:r>
+              <a:rPr lang="ru-RU" sz="2000" dirty="0"/>
+              <a:t>: управляет исполнением всех задач.</a:t>
+            </a:r>
+          </a:p>
+          <a:p>
+            <a:pPr>
+              <a:buFont typeface="Arial" panose="020B0604020202020204" pitchFamily="34" charset="0"/>
+              <a:buChar char="•"/>
+            </a:pPr>
+            <a:r>
+              <a:rPr lang="en" sz="2000" b="1" dirty="0"/>
+              <a:t>await</a:t>
+            </a:r>
+            <a:r>
+              <a:rPr lang="en" sz="2000" dirty="0"/>
+              <a:t>: </a:t>
+            </a:r>
+            <a:r>
+              <a:rPr lang="ru-RU" sz="2000" dirty="0"/>
+              <a:t>говорит “подожди результат, не блокируя всё приложение”.</a:t>
+            </a:r>
+          </a:p>
+          <a:p>
+            <a:pPr marL="0" indent="0">
+              <a:buNone/>
+            </a:pPr>
+            <a:endParaRPr lang="ru-RU" sz="2000" dirty="0"/>
+          </a:p>
+        </p:txBody>
+      </p:sp>
+      <p:sp>
+        <p:nvSpPr>
+          <p:cNvPr id="5" name="TextBox 4">
+            <a:extLst>
+              <a:ext uri="{FF2B5EF4-FFF2-40B4-BE49-F238E27FC236}">
+                <a16:creationId xmlns:a16="http://schemas.microsoft.com/office/drawing/2014/main" id="{763EEEE8-B01B-18D3-D85A-E45A8C1AC226}"/>
+              </a:ext>
+            </a:extLst>
+          </p:cNvPr>
+          <p:cNvSpPr txBox="1"/>
+          <p:nvPr/>
+        </p:nvSpPr>
+        <p:spPr>
+          <a:xfrm>
+            <a:off x="838200" y="4475018"/>
+            <a:ext cx="3864429" cy="2031325"/>
+          </a:xfrm>
+          <a:prstGeom prst="rect">
+            <a:avLst/>
+          </a:prstGeom>
+          <a:solidFill>
+            <a:schemeClr val="bg2"/>
+          </a:solidFill>
+        </p:spPr>
+        <p:txBody>
+          <a:bodyPr wrap="square">
+            <a:spAutoFit/>
+          </a:bodyPr>
+          <a:lstStyle/>
+          <a:p>
+            <a:r>
+              <a:rPr lang="en" b="1" noProof="1">
+                <a:solidFill>
+                  <a:srgbClr val="0C450D"/>
+                </a:solidFill>
+                <a:effectLst/>
+                <a:latin typeface="Consolas" panose="020B0609020204030204" pitchFamily="49" charset="0"/>
+                <a:cs typeface="Consolas" panose="020B0609020204030204" pitchFamily="49" charset="0"/>
+              </a:rPr>
+              <a:t>import</a:t>
+            </a:r>
+            <a:r>
+              <a:rPr lang="en" noProof="1">
+                <a:effectLst/>
+                <a:latin typeface="Consolas" panose="020B0609020204030204" pitchFamily="49" charset="0"/>
+                <a:cs typeface="Consolas" panose="020B0609020204030204" pitchFamily="49" charset="0"/>
+              </a:rPr>
+              <a:t> asyncio</a:t>
+            </a:r>
+            <a:br>
+              <a:rPr lang="en" noProof="1">
+                <a:effectLst/>
+                <a:latin typeface="Consolas" panose="020B0609020204030204" pitchFamily="49" charset="0"/>
+                <a:cs typeface="Consolas" panose="020B0609020204030204" pitchFamily="49" charset="0"/>
+              </a:rPr>
+            </a:br>
+            <a:br>
+              <a:rPr lang="en" noProof="1">
+                <a:effectLst/>
+                <a:latin typeface="Consolas" panose="020B0609020204030204" pitchFamily="49" charset="0"/>
+                <a:cs typeface="Consolas" panose="020B0609020204030204" pitchFamily="49" charset="0"/>
+              </a:rPr>
+            </a:br>
+            <a:r>
+              <a:rPr lang="en" b="1" noProof="1">
+                <a:solidFill>
+                  <a:srgbClr val="0000FF"/>
+                </a:solidFill>
+                <a:effectLst/>
+                <a:latin typeface="Consolas" panose="020B0609020204030204" pitchFamily="49" charset="0"/>
+                <a:cs typeface="Consolas" panose="020B0609020204030204" pitchFamily="49" charset="0"/>
+              </a:rPr>
+              <a:t>async</a:t>
+            </a:r>
+            <a:r>
+              <a:rPr lang="en" noProof="1">
+                <a:effectLst/>
+                <a:latin typeface="Consolas" panose="020B0609020204030204" pitchFamily="49" charset="0"/>
+                <a:cs typeface="Consolas" panose="020B0609020204030204" pitchFamily="49" charset="0"/>
+              </a:rPr>
+              <a:t> </a:t>
+            </a:r>
+            <a:r>
+              <a:rPr lang="en" b="1" noProof="1">
+                <a:solidFill>
+                  <a:srgbClr val="0000FF"/>
+                </a:solidFill>
+                <a:effectLst/>
+                <a:latin typeface="Consolas" panose="020B0609020204030204" pitchFamily="49" charset="0"/>
+                <a:cs typeface="Consolas" panose="020B0609020204030204" pitchFamily="49" charset="0"/>
+              </a:rPr>
+              <a:t>def</a:t>
+            </a:r>
+            <a:r>
+              <a:rPr lang="en" noProof="1">
+                <a:effectLst/>
+                <a:latin typeface="Consolas" panose="020B0609020204030204" pitchFamily="49" charset="0"/>
+                <a:cs typeface="Consolas" panose="020B0609020204030204" pitchFamily="49" charset="0"/>
+              </a:rPr>
+              <a:t> </a:t>
+            </a:r>
+            <a:r>
+              <a:rPr lang="en" b="1" noProof="1">
+                <a:solidFill>
+                  <a:srgbClr val="0000A2"/>
+                </a:solidFill>
+                <a:effectLst/>
+                <a:latin typeface="Consolas" panose="020B0609020204030204" pitchFamily="49" charset="0"/>
+                <a:cs typeface="Consolas" panose="020B0609020204030204" pitchFamily="49" charset="0"/>
+              </a:rPr>
+              <a:t>say_hello</a:t>
+            </a:r>
+            <a:r>
+              <a:rPr lang="en" noProof="1">
+                <a:effectLst/>
+                <a:latin typeface="Consolas" panose="020B0609020204030204" pitchFamily="49" charset="0"/>
+                <a:cs typeface="Consolas" panose="020B0609020204030204" pitchFamily="49" charset="0"/>
+              </a:rPr>
+              <a:t>():</a:t>
+            </a:r>
+            <a:br>
+              <a:rPr lang="en" noProof="1">
+                <a:effectLst/>
+                <a:latin typeface="Consolas" panose="020B0609020204030204" pitchFamily="49" charset="0"/>
+                <a:cs typeface="Consolas" panose="020B0609020204030204" pitchFamily="49" charset="0"/>
+              </a:rPr>
+            </a:br>
+            <a:r>
+              <a:rPr lang="en" noProof="1">
+                <a:effectLst/>
+                <a:latin typeface="Consolas" panose="020B0609020204030204" pitchFamily="49" charset="0"/>
+                <a:cs typeface="Consolas" panose="020B0609020204030204" pitchFamily="49" charset="0"/>
+              </a:rPr>
+              <a:t>    </a:t>
+            </a:r>
+            <a:r>
+              <a:rPr lang="en" b="1" noProof="1">
+                <a:solidFill>
+                  <a:srgbClr val="0000FF"/>
+                </a:solidFill>
+                <a:effectLst/>
+                <a:latin typeface="Consolas" panose="020B0609020204030204" pitchFamily="49" charset="0"/>
+                <a:cs typeface="Consolas" panose="020B0609020204030204" pitchFamily="49" charset="0"/>
+              </a:rPr>
+              <a:t>await</a:t>
+            </a:r>
+            <a:r>
+              <a:rPr lang="en" noProof="1">
+                <a:effectLst/>
+                <a:latin typeface="Consolas" panose="020B0609020204030204" pitchFamily="49" charset="0"/>
+                <a:cs typeface="Consolas" panose="020B0609020204030204" pitchFamily="49" charset="0"/>
+              </a:rPr>
+              <a:t> asyncio.sleep(</a:t>
+            </a:r>
+            <a:r>
+              <a:rPr lang="en" noProof="1">
+                <a:solidFill>
+                  <a:srgbClr val="0000CD"/>
+                </a:solidFill>
+                <a:effectLst/>
+                <a:latin typeface="Consolas" panose="020B0609020204030204" pitchFamily="49" charset="0"/>
+                <a:cs typeface="Consolas" panose="020B0609020204030204" pitchFamily="49" charset="0"/>
+              </a:rPr>
+              <a:t>1</a:t>
+            </a:r>
+            <a:r>
+              <a:rPr lang="en" noProof="1">
+                <a:effectLst/>
+                <a:latin typeface="Consolas" panose="020B0609020204030204" pitchFamily="49" charset="0"/>
+                <a:cs typeface="Consolas" panose="020B0609020204030204" pitchFamily="49" charset="0"/>
+              </a:rPr>
+              <a:t>)</a:t>
+            </a:r>
+            <a:br>
+              <a:rPr lang="en" noProof="1">
+                <a:effectLst/>
+                <a:latin typeface="Consolas" panose="020B0609020204030204" pitchFamily="49" charset="0"/>
+                <a:cs typeface="Consolas" panose="020B0609020204030204" pitchFamily="49" charset="0"/>
+              </a:rPr>
+            </a:br>
+            <a:r>
+              <a:rPr lang="en" noProof="1">
+                <a:effectLst/>
+                <a:latin typeface="Consolas" panose="020B0609020204030204" pitchFamily="49" charset="0"/>
+                <a:cs typeface="Consolas" panose="020B0609020204030204" pitchFamily="49" charset="0"/>
+              </a:rPr>
+              <a:t>    </a:t>
+            </a:r>
+            <a:r>
+              <a:rPr lang="en" b="1" noProof="1">
+                <a:solidFill>
+                  <a:srgbClr val="3C4C72"/>
+                </a:solidFill>
+                <a:effectLst/>
+                <a:latin typeface="Consolas" panose="020B0609020204030204" pitchFamily="49" charset="0"/>
+                <a:cs typeface="Consolas" panose="020B0609020204030204" pitchFamily="49" charset="0"/>
+              </a:rPr>
+              <a:t>print</a:t>
+            </a:r>
+            <a:r>
+              <a:rPr lang="en" noProof="1">
+                <a:effectLst/>
+                <a:latin typeface="Consolas" panose="020B0609020204030204" pitchFamily="49" charset="0"/>
+                <a:cs typeface="Consolas" panose="020B0609020204030204" pitchFamily="49" charset="0"/>
+              </a:rPr>
+              <a:t>(</a:t>
+            </a:r>
+            <a:r>
+              <a:rPr lang="en" noProof="1">
+                <a:solidFill>
+                  <a:srgbClr val="036A07"/>
+                </a:solidFill>
+                <a:effectLst/>
+                <a:latin typeface="Consolas" panose="020B0609020204030204" pitchFamily="49" charset="0"/>
+                <a:cs typeface="Consolas" panose="020B0609020204030204" pitchFamily="49" charset="0"/>
+              </a:rPr>
+              <a:t>"Hello, world!"</a:t>
+            </a:r>
+            <a:r>
+              <a:rPr lang="en" noProof="1">
+                <a:effectLst/>
+                <a:latin typeface="Consolas" panose="020B0609020204030204" pitchFamily="49" charset="0"/>
+                <a:cs typeface="Consolas" panose="020B0609020204030204" pitchFamily="49" charset="0"/>
+              </a:rPr>
+              <a:t>)</a:t>
+            </a:r>
+            <a:br>
+              <a:rPr lang="en" noProof="1">
+                <a:effectLst/>
+                <a:latin typeface="Consolas" panose="020B0609020204030204" pitchFamily="49" charset="0"/>
+                <a:cs typeface="Consolas" panose="020B0609020204030204" pitchFamily="49" charset="0"/>
+              </a:rPr>
+            </a:br>
+            <a:br>
+              <a:rPr lang="en" noProof="1">
+                <a:effectLst/>
+                <a:latin typeface="Consolas" panose="020B0609020204030204" pitchFamily="49" charset="0"/>
+                <a:cs typeface="Consolas" panose="020B0609020204030204" pitchFamily="49" charset="0"/>
+              </a:rPr>
+            </a:br>
+            <a:r>
+              <a:rPr lang="en" noProof="1">
+                <a:effectLst/>
+                <a:latin typeface="Consolas" panose="020B0609020204030204" pitchFamily="49" charset="0"/>
+                <a:cs typeface="Consolas" panose="020B0609020204030204" pitchFamily="49" charset="0"/>
+              </a:rPr>
+              <a:t>asyncio.run(say_hello())</a:t>
+            </a:r>
+          </a:p>
+        </p:txBody>
+      </p:sp>
+      <p:pic>
+        <p:nvPicPr>
+          <p:cNvPr id="1026" name="Picture 2" descr="Coroutine (корутины): что это за сопрограммы, как работают ...">
+            <a:extLst>
+              <a:ext uri="{FF2B5EF4-FFF2-40B4-BE49-F238E27FC236}">
+                <a16:creationId xmlns:a16="http://schemas.microsoft.com/office/drawing/2014/main" id="{AE910300-23FF-5380-3F2C-1B8554BC77FA}"/>
+              </a:ext>
+            </a:extLst>
+          </p:cNvPr>
+          <p:cNvPicPr>
+            <a:picLocks noChangeAspect="1" noChangeArrowheads="1"/>
+          </p:cNvPicPr>
+          <p:nvPr/>
+        </p:nvPicPr>
+        <p:blipFill rotWithShape="1">
+          <a:blip r:embed="rId2">
+            <a:extLst>
+              <a:ext uri="{28A0092B-C50C-407E-A947-70E740481C1C}">
+                <a14:useLocalDpi xmlns:a14="http://schemas.microsoft.com/office/drawing/2010/main" val="0"/>
+              </a:ext>
+            </a:extLst>
+          </a:blip>
+          <a:srcRect l="6875" t="8027" r="6875" b="5249"/>
+          <a:stretch/>
+        </p:blipFill>
+        <p:spPr bwMode="auto">
+          <a:xfrm>
+            <a:off x="7979229" y="4660032"/>
+            <a:ext cx="4212771" cy="2197968"/>
+          </a:xfrm>
+          <a:prstGeom prst="rect">
+            <a:avLst/>
+          </a:prstGeom>
+          <a:noFill/>
+          <a:extLst>
+            <a:ext uri="{909E8E84-426E-40DD-AFC4-6F175D3DCCD1}">
+              <a14:hiddenFill xmlns:a14="http://schemas.microsoft.com/office/drawing/2010/main">
+                <a:solidFill>
+                  <a:srgbClr val="FFFFFF"/>
+                </a:solidFill>
+              </a14:hiddenFill>
+            </a:ext>
+          </a:extLst>
+        </p:spPr>
+      </p:pic>
+    </p:spTree>
+    <p:extLst>
+      <p:ext uri="{BB962C8B-B14F-4D97-AF65-F5344CB8AC3E}">
+        <p14:creationId xmlns:p14="http://schemas.microsoft.com/office/powerpoint/2010/main" val="2998434921"/>
+      </p:ext>
+    </p:extLst>
+  </p:cSld>
+  <p:clrMapOvr>
+    <a:masterClrMapping/>
+  </p:clrMapOvr>
+</p:sld>
+</file>
+
+<file path=ppt/slides/slide37.xml><?xml version="1.0" encoding="utf-8"?>
+<p:sld xmlns:a="http://schemas.openxmlformats.org/drawingml/2006/main" xmlns:r="http://schemas.openxmlformats.org/officeDocument/2006/relationships" xmlns:p="http://schemas.openxmlformats.org/presentationml/2006/main">
+  <p:cSld>
+    <p:spTree>
+      <p:nvGrpSpPr>
+        <p:cNvPr id="1" name=""/>
+        <p:cNvGrpSpPr/>
+        <p:nvPr/>
+      </p:nvGrpSpPr>
+      <p:grpSpPr>
+        <a:xfrm>
+          <a:off x="0" y="0"/>
+          <a:ext cx="0" cy="0"/>
+          <a:chOff x="0" y="0"/>
+          <a:chExt cx="0" cy="0"/>
+        </a:xfrm>
+      </p:grpSpPr>
+      <p:sp>
+        <p:nvSpPr>
+          <p:cNvPr id="2" name="Заголовок 1">
+            <a:extLst>
+              <a:ext uri="{FF2B5EF4-FFF2-40B4-BE49-F238E27FC236}">
+                <a16:creationId xmlns:a16="http://schemas.microsoft.com/office/drawing/2014/main" id="{3F956277-BD75-3915-D39E-628FD79BB64F}"/>
+              </a:ext>
+            </a:extLst>
+          </p:cNvPr>
+          <p:cNvSpPr>
+            <a:spLocks noGrp="1"/>
+          </p:cNvSpPr>
+          <p:nvPr>
+            <p:ph type="title"/>
+          </p:nvPr>
+        </p:nvSpPr>
+        <p:spPr/>
+        <p:txBody>
+          <a:bodyPr>
+            <a:normAutofit/>
+          </a:bodyPr>
+          <a:lstStyle/>
+          <a:p>
+            <a:r>
+              <a:rPr lang="ru-RU" dirty="0"/>
+              <a:t>Событийный цикл (</a:t>
+            </a:r>
+            <a:r>
+              <a:rPr lang="en" dirty="0"/>
+              <a:t>Event Loop</a:t>
+            </a:r>
+            <a:r>
+              <a:rPr lang="ru-RU" dirty="0"/>
+              <a:t>)</a:t>
+            </a:r>
+            <a:r>
+              <a:rPr lang="en" dirty="0"/>
+              <a:t> </a:t>
+            </a:r>
+            <a:r>
+              <a:rPr lang="ru-RU" dirty="0"/>
+              <a:t>в </a:t>
+            </a:r>
+            <a:r>
+              <a:rPr lang="en" dirty="0"/>
+              <a:t>asyncio</a:t>
+            </a:r>
+            <a:endParaRPr lang="ru-RU" dirty="0"/>
+          </a:p>
+        </p:txBody>
+      </p:sp>
+      <p:sp>
+        <p:nvSpPr>
+          <p:cNvPr id="3" name="Объект 2">
+            <a:extLst>
+              <a:ext uri="{FF2B5EF4-FFF2-40B4-BE49-F238E27FC236}">
+                <a16:creationId xmlns:a16="http://schemas.microsoft.com/office/drawing/2014/main" id="{4886A7A6-06FB-59CC-1C3F-65B4632DEC1F}"/>
+              </a:ext>
+            </a:extLst>
+          </p:cNvPr>
+          <p:cNvSpPr>
+            <a:spLocks noGrp="1"/>
+          </p:cNvSpPr>
+          <p:nvPr>
+            <p:ph idx="1"/>
+          </p:nvPr>
+        </p:nvSpPr>
+        <p:spPr>
+          <a:xfrm>
+            <a:off x="838200" y="1169234"/>
+            <a:ext cx="10515600" cy="2945566"/>
+          </a:xfrm>
+        </p:spPr>
+        <p:txBody>
+          <a:bodyPr/>
+          <a:lstStyle/>
+          <a:p>
+            <a:pPr marL="0" indent="0">
+              <a:buNone/>
+            </a:pPr>
+            <a:r>
+              <a:rPr lang="ru-RU" sz="2000" b="1" dirty="0"/>
+              <a:t>Сердце </a:t>
+            </a:r>
+            <a:r>
+              <a:rPr lang="en" sz="2000" b="1" dirty="0"/>
+              <a:t>asyncio</a:t>
+            </a:r>
+            <a:r>
+              <a:rPr lang="en" sz="2000" dirty="0"/>
+              <a:t> — </a:t>
+            </a:r>
+            <a:r>
+              <a:rPr lang="ru-RU" sz="2000" dirty="0"/>
+              <a:t>событийный цикл. Он управляет:</a:t>
+            </a:r>
+          </a:p>
+          <a:p>
+            <a:pPr>
+              <a:lnSpc>
+                <a:spcPct val="100000"/>
+              </a:lnSpc>
+              <a:spcBef>
+                <a:spcPts val="0"/>
+              </a:spcBef>
+              <a:buFont typeface="Arial" panose="020B0604020202020204" pitchFamily="34" charset="0"/>
+              <a:buChar char="•"/>
+            </a:pPr>
+            <a:r>
+              <a:rPr lang="ru-RU" sz="2000" dirty="0"/>
+              <a:t>запуском корутин</a:t>
+            </a:r>
+          </a:p>
+          <a:p>
+            <a:pPr>
+              <a:lnSpc>
+                <a:spcPct val="100000"/>
+              </a:lnSpc>
+              <a:spcBef>
+                <a:spcPts val="0"/>
+              </a:spcBef>
+              <a:buFont typeface="Arial" panose="020B0604020202020204" pitchFamily="34" charset="0"/>
+              <a:buChar char="•"/>
+            </a:pPr>
+            <a:r>
+              <a:rPr lang="ru-RU" sz="2000" dirty="0"/>
+              <a:t>переключением между задачами</a:t>
+            </a:r>
+          </a:p>
+          <a:p>
+            <a:pPr>
+              <a:lnSpc>
+                <a:spcPct val="100000"/>
+              </a:lnSpc>
+              <a:spcBef>
+                <a:spcPts val="0"/>
+              </a:spcBef>
+              <a:buFont typeface="Arial" panose="020B0604020202020204" pitchFamily="34" charset="0"/>
+              <a:buChar char="•"/>
+            </a:pPr>
+            <a:r>
+              <a:rPr lang="ru-RU" sz="2000" dirty="0"/>
+              <a:t>выполнением отложенных операций (таймеров, сетевых событий и т.д.)</a:t>
+            </a:r>
+          </a:p>
+          <a:p>
+            <a:pPr marL="0" indent="0">
+              <a:lnSpc>
+                <a:spcPct val="100000"/>
+              </a:lnSpc>
+              <a:buNone/>
+            </a:pPr>
+            <a:r>
+              <a:rPr lang="ru-RU" sz="2000" dirty="0"/>
+              <a:t>Цикл работает как диспетчер:</a:t>
+            </a:r>
+          </a:p>
+          <a:p>
+            <a:pPr>
+              <a:lnSpc>
+                <a:spcPct val="100000"/>
+              </a:lnSpc>
+              <a:spcBef>
+                <a:spcPts val="0"/>
+              </a:spcBef>
+              <a:buFont typeface="Arial" panose="020B0604020202020204" pitchFamily="34" charset="0"/>
+              <a:buChar char="•"/>
+            </a:pPr>
+            <a:r>
+              <a:rPr lang="ru-RU" sz="2000" dirty="0"/>
+              <a:t>Запускает корутину до первого </a:t>
+            </a:r>
+            <a:r>
+              <a:rPr lang="en" sz="2000" dirty="0"/>
+              <a:t>await</a:t>
+            </a:r>
+          </a:p>
+          <a:p>
+            <a:pPr>
+              <a:lnSpc>
+                <a:spcPct val="100000"/>
+              </a:lnSpc>
+              <a:spcBef>
+                <a:spcPts val="0"/>
+              </a:spcBef>
+              <a:buFont typeface="Arial" panose="020B0604020202020204" pitchFamily="34" charset="0"/>
+              <a:buChar char="•"/>
+            </a:pPr>
+            <a:r>
+              <a:rPr lang="ru-RU" sz="2000" dirty="0"/>
+              <a:t>Пока задача </a:t>
+            </a:r>
+            <a:r>
+              <a:rPr lang="en-US" sz="2000" dirty="0"/>
+              <a:t>«</a:t>
+            </a:r>
+            <a:r>
+              <a:rPr lang="ru-RU" sz="2000" dirty="0"/>
+              <a:t>ждёт</a:t>
+            </a:r>
+            <a:r>
+              <a:rPr lang="en-US" sz="2000" dirty="0"/>
+              <a:t>»</a:t>
+            </a:r>
+            <a:r>
+              <a:rPr lang="ru-RU" sz="2000" dirty="0"/>
+              <a:t>, запускает другие задачи</a:t>
+            </a:r>
+          </a:p>
+          <a:p>
+            <a:pPr>
+              <a:lnSpc>
+                <a:spcPct val="100000"/>
+              </a:lnSpc>
+              <a:spcBef>
+                <a:spcPts val="0"/>
+              </a:spcBef>
+              <a:buFont typeface="Arial" panose="020B0604020202020204" pitchFamily="34" charset="0"/>
+              <a:buChar char="•"/>
+            </a:pPr>
+            <a:r>
+              <a:rPr lang="ru-RU" sz="2000" dirty="0"/>
+              <a:t>Как только результат готов — продолжает выполнение</a:t>
+            </a:r>
+          </a:p>
+          <a:p>
+            <a:pPr>
+              <a:lnSpc>
+                <a:spcPct val="100000"/>
+              </a:lnSpc>
+              <a:spcBef>
+                <a:spcPts val="0"/>
+              </a:spcBef>
+              <a:buFont typeface="Arial" panose="020B0604020202020204" pitchFamily="34" charset="0"/>
+              <a:buChar char="•"/>
+            </a:pPr>
+            <a:r>
+              <a:rPr lang="ru-RU" sz="2000" dirty="0"/>
+              <a:t>Пример (ручное управление циклом):</a:t>
+            </a:r>
+          </a:p>
+          <a:p>
+            <a:pPr marL="0" indent="0">
+              <a:buNone/>
+            </a:pPr>
+            <a:endParaRPr lang="ru-RU" sz="2000" dirty="0"/>
+          </a:p>
+        </p:txBody>
+      </p:sp>
+      <p:sp>
+        <p:nvSpPr>
+          <p:cNvPr id="5" name="TextBox 4">
+            <a:extLst>
+              <a:ext uri="{FF2B5EF4-FFF2-40B4-BE49-F238E27FC236}">
+                <a16:creationId xmlns:a16="http://schemas.microsoft.com/office/drawing/2014/main" id="{BBD4AE60-CCC5-EFCD-05C7-7650F633877F}"/>
+              </a:ext>
+            </a:extLst>
+          </p:cNvPr>
+          <p:cNvSpPr txBox="1"/>
+          <p:nvPr/>
+        </p:nvSpPr>
+        <p:spPr>
+          <a:xfrm>
+            <a:off x="838200" y="4256436"/>
+            <a:ext cx="3744685" cy="2308324"/>
+          </a:xfrm>
+          <a:prstGeom prst="rect">
+            <a:avLst/>
+          </a:prstGeom>
+          <a:solidFill>
+            <a:schemeClr val="bg2"/>
+          </a:solidFill>
+        </p:spPr>
+        <p:txBody>
+          <a:bodyPr wrap="square">
+            <a:spAutoFit/>
+          </a:bodyPr>
+          <a:lstStyle/>
+          <a:p>
+            <a:r>
+              <a:rPr lang="en" b="1" noProof="1">
+                <a:solidFill>
+                  <a:srgbClr val="0C450D"/>
+                </a:solidFill>
+                <a:effectLst/>
+                <a:latin typeface="Consolas" panose="020B0609020204030204" pitchFamily="49" charset="0"/>
+                <a:cs typeface="Consolas" panose="020B0609020204030204" pitchFamily="49" charset="0"/>
+              </a:rPr>
+              <a:t>import</a:t>
+            </a:r>
+            <a:r>
+              <a:rPr lang="en" noProof="1">
+                <a:effectLst/>
+                <a:latin typeface="Consolas" panose="020B0609020204030204" pitchFamily="49" charset="0"/>
+                <a:cs typeface="Consolas" panose="020B0609020204030204" pitchFamily="49" charset="0"/>
+              </a:rPr>
+              <a:t> asyncio</a:t>
+            </a:r>
+            <a:br>
+              <a:rPr lang="en" noProof="1">
+                <a:effectLst/>
+                <a:latin typeface="Consolas" panose="020B0609020204030204" pitchFamily="49" charset="0"/>
+                <a:cs typeface="Consolas" panose="020B0609020204030204" pitchFamily="49" charset="0"/>
+              </a:rPr>
+            </a:br>
+            <a:br>
+              <a:rPr lang="en" noProof="1">
+                <a:effectLst/>
+                <a:latin typeface="Consolas" panose="020B0609020204030204" pitchFamily="49" charset="0"/>
+                <a:cs typeface="Consolas" panose="020B0609020204030204" pitchFamily="49" charset="0"/>
+              </a:rPr>
+            </a:br>
+            <a:r>
+              <a:rPr lang="en" b="1" noProof="1">
+                <a:solidFill>
+                  <a:srgbClr val="0000FF"/>
+                </a:solidFill>
+                <a:effectLst/>
+                <a:latin typeface="Consolas" panose="020B0609020204030204" pitchFamily="49" charset="0"/>
+                <a:cs typeface="Consolas" panose="020B0609020204030204" pitchFamily="49" charset="0"/>
+              </a:rPr>
+              <a:t>async</a:t>
+            </a:r>
+            <a:r>
+              <a:rPr lang="en" noProof="1">
+                <a:effectLst/>
+                <a:latin typeface="Consolas" panose="020B0609020204030204" pitchFamily="49" charset="0"/>
+                <a:cs typeface="Consolas" panose="020B0609020204030204" pitchFamily="49" charset="0"/>
+              </a:rPr>
+              <a:t> </a:t>
+            </a:r>
+            <a:r>
+              <a:rPr lang="en" b="1" noProof="1">
+                <a:solidFill>
+                  <a:srgbClr val="0000FF"/>
+                </a:solidFill>
+                <a:effectLst/>
+                <a:latin typeface="Consolas" panose="020B0609020204030204" pitchFamily="49" charset="0"/>
+                <a:cs typeface="Consolas" panose="020B0609020204030204" pitchFamily="49" charset="0"/>
+              </a:rPr>
+              <a:t>def</a:t>
+            </a:r>
+            <a:r>
+              <a:rPr lang="en" noProof="1">
+                <a:effectLst/>
+                <a:latin typeface="Consolas" panose="020B0609020204030204" pitchFamily="49" charset="0"/>
+                <a:cs typeface="Consolas" panose="020B0609020204030204" pitchFamily="49" charset="0"/>
+              </a:rPr>
+              <a:t> </a:t>
+            </a:r>
+            <a:r>
+              <a:rPr lang="en" b="1" noProof="1">
+                <a:solidFill>
+                  <a:srgbClr val="0000A2"/>
+                </a:solidFill>
+                <a:effectLst/>
+                <a:latin typeface="Consolas" panose="020B0609020204030204" pitchFamily="49" charset="0"/>
+                <a:cs typeface="Consolas" panose="020B0609020204030204" pitchFamily="49" charset="0"/>
+              </a:rPr>
+              <a:t>say_hello</a:t>
+            </a:r>
+            <a:r>
+              <a:rPr lang="en" noProof="1">
+                <a:effectLst/>
+                <a:latin typeface="Consolas" panose="020B0609020204030204" pitchFamily="49" charset="0"/>
+                <a:cs typeface="Consolas" panose="020B0609020204030204" pitchFamily="49" charset="0"/>
+              </a:rPr>
+              <a:t>():</a:t>
+            </a:r>
+            <a:br>
+              <a:rPr lang="en" noProof="1">
+                <a:effectLst/>
+                <a:latin typeface="Consolas" panose="020B0609020204030204" pitchFamily="49" charset="0"/>
+                <a:cs typeface="Consolas" panose="020B0609020204030204" pitchFamily="49" charset="0"/>
+              </a:rPr>
+            </a:br>
+            <a:r>
+              <a:rPr lang="en" noProof="1">
+                <a:effectLst/>
+                <a:latin typeface="Consolas" panose="020B0609020204030204" pitchFamily="49" charset="0"/>
+                <a:cs typeface="Consolas" panose="020B0609020204030204" pitchFamily="49" charset="0"/>
+              </a:rPr>
+              <a:t>    </a:t>
+            </a:r>
+            <a:r>
+              <a:rPr lang="en" b="1" noProof="1">
+                <a:solidFill>
+                  <a:srgbClr val="3C4C72"/>
+                </a:solidFill>
+                <a:effectLst/>
+                <a:latin typeface="Consolas" panose="020B0609020204030204" pitchFamily="49" charset="0"/>
+                <a:cs typeface="Consolas" panose="020B0609020204030204" pitchFamily="49" charset="0"/>
+              </a:rPr>
+              <a:t>print</a:t>
+            </a:r>
+            <a:r>
+              <a:rPr lang="en" noProof="1">
+                <a:effectLst/>
+                <a:latin typeface="Consolas" panose="020B0609020204030204" pitchFamily="49" charset="0"/>
+                <a:cs typeface="Consolas" panose="020B0609020204030204" pitchFamily="49" charset="0"/>
+              </a:rPr>
+              <a:t>(</a:t>
+            </a:r>
+            <a:r>
+              <a:rPr lang="en" noProof="1">
+                <a:solidFill>
+                  <a:srgbClr val="036A07"/>
+                </a:solidFill>
+                <a:effectLst/>
+                <a:latin typeface="Consolas" panose="020B0609020204030204" pitchFamily="49" charset="0"/>
+                <a:cs typeface="Consolas" panose="020B0609020204030204" pitchFamily="49" charset="0"/>
+              </a:rPr>
+              <a:t>"Start"</a:t>
+            </a:r>
+            <a:r>
+              <a:rPr lang="en" noProof="1">
+                <a:effectLst/>
+                <a:latin typeface="Consolas" panose="020B0609020204030204" pitchFamily="49" charset="0"/>
+                <a:cs typeface="Consolas" panose="020B0609020204030204" pitchFamily="49" charset="0"/>
+              </a:rPr>
+              <a:t>)</a:t>
+            </a:r>
+            <a:br>
+              <a:rPr lang="en" noProof="1">
+                <a:effectLst/>
+                <a:latin typeface="Consolas" panose="020B0609020204030204" pitchFamily="49" charset="0"/>
+                <a:cs typeface="Consolas" panose="020B0609020204030204" pitchFamily="49" charset="0"/>
+              </a:rPr>
+            </a:br>
+            <a:r>
+              <a:rPr lang="en" noProof="1">
+                <a:effectLst/>
+                <a:latin typeface="Consolas" panose="020B0609020204030204" pitchFamily="49" charset="0"/>
+                <a:cs typeface="Consolas" panose="020B0609020204030204" pitchFamily="49" charset="0"/>
+              </a:rPr>
+              <a:t>    </a:t>
+            </a:r>
+            <a:r>
+              <a:rPr lang="en" b="1" noProof="1">
+                <a:solidFill>
+                  <a:srgbClr val="0000FF"/>
+                </a:solidFill>
+                <a:effectLst/>
+                <a:latin typeface="Consolas" panose="020B0609020204030204" pitchFamily="49" charset="0"/>
+                <a:cs typeface="Consolas" panose="020B0609020204030204" pitchFamily="49" charset="0"/>
+              </a:rPr>
+              <a:t>await</a:t>
+            </a:r>
+            <a:r>
+              <a:rPr lang="en" noProof="1">
+                <a:effectLst/>
+                <a:latin typeface="Consolas" panose="020B0609020204030204" pitchFamily="49" charset="0"/>
+                <a:cs typeface="Consolas" panose="020B0609020204030204" pitchFamily="49" charset="0"/>
+              </a:rPr>
+              <a:t> asyncio.sleep(</a:t>
+            </a:r>
+            <a:r>
+              <a:rPr lang="en" noProof="1">
+                <a:solidFill>
+                  <a:srgbClr val="0000CD"/>
+                </a:solidFill>
+                <a:effectLst/>
+                <a:latin typeface="Consolas" panose="020B0609020204030204" pitchFamily="49" charset="0"/>
+                <a:cs typeface="Consolas" panose="020B0609020204030204" pitchFamily="49" charset="0"/>
+              </a:rPr>
+              <a:t>1</a:t>
+            </a:r>
+            <a:r>
+              <a:rPr lang="en" noProof="1">
+                <a:effectLst/>
+                <a:latin typeface="Consolas" panose="020B0609020204030204" pitchFamily="49" charset="0"/>
+                <a:cs typeface="Consolas" panose="020B0609020204030204" pitchFamily="49" charset="0"/>
+              </a:rPr>
+              <a:t>)</a:t>
+            </a:r>
+            <a:br>
+              <a:rPr lang="en" noProof="1">
+                <a:effectLst/>
+                <a:latin typeface="Consolas" panose="020B0609020204030204" pitchFamily="49" charset="0"/>
+                <a:cs typeface="Consolas" panose="020B0609020204030204" pitchFamily="49" charset="0"/>
+              </a:rPr>
+            </a:br>
+            <a:r>
+              <a:rPr lang="en" noProof="1">
+                <a:effectLst/>
+                <a:latin typeface="Consolas" panose="020B0609020204030204" pitchFamily="49" charset="0"/>
+                <a:cs typeface="Consolas" panose="020B0609020204030204" pitchFamily="49" charset="0"/>
+              </a:rPr>
+              <a:t>    </a:t>
+            </a:r>
+            <a:r>
+              <a:rPr lang="en" b="1" noProof="1">
+                <a:solidFill>
+                  <a:srgbClr val="3C4C72"/>
+                </a:solidFill>
+                <a:effectLst/>
+                <a:latin typeface="Consolas" panose="020B0609020204030204" pitchFamily="49" charset="0"/>
+                <a:cs typeface="Consolas" panose="020B0609020204030204" pitchFamily="49" charset="0"/>
+              </a:rPr>
+              <a:t>print</a:t>
+            </a:r>
+            <a:r>
+              <a:rPr lang="en" noProof="1">
+                <a:effectLst/>
+                <a:latin typeface="Consolas" panose="020B0609020204030204" pitchFamily="49" charset="0"/>
+                <a:cs typeface="Consolas" panose="020B0609020204030204" pitchFamily="49" charset="0"/>
+              </a:rPr>
+              <a:t>(</a:t>
+            </a:r>
+            <a:r>
+              <a:rPr lang="en" noProof="1">
+                <a:solidFill>
+                  <a:srgbClr val="036A07"/>
+                </a:solidFill>
+                <a:effectLst/>
+                <a:latin typeface="Consolas" panose="020B0609020204030204" pitchFamily="49" charset="0"/>
+                <a:cs typeface="Consolas" panose="020B0609020204030204" pitchFamily="49" charset="0"/>
+              </a:rPr>
+              <a:t>"End"</a:t>
+            </a:r>
+            <a:r>
+              <a:rPr lang="en" noProof="1">
+                <a:effectLst/>
+                <a:latin typeface="Consolas" panose="020B0609020204030204" pitchFamily="49" charset="0"/>
+                <a:cs typeface="Consolas" panose="020B0609020204030204" pitchFamily="49" charset="0"/>
+              </a:rPr>
+              <a:t>)</a:t>
+            </a:r>
+            <a:br>
+              <a:rPr lang="en" noProof="1">
+                <a:effectLst/>
+                <a:latin typeface="Consolas" panose="020B0609020204030204" pitchFamily="49" charset="0"/>
+                <a:cs typeface="Consolas" panose="020B0609020204030204" pitchFamily="49" charset="0"/>
+              </a:rPr>
+            </a:br>
+            <a:r>
+              <a:rPr lang="en" noProof="1">
+                <a:effectLst/>
+                <a:latin typeface="Consolas" panose="020B0609020204030204" pitchFamily="49" charset="0"/>
+                <a:cs typeface="Consolas" panose="020B0609020204030204" pitchFamily="49" charset="0"/>
+              </a:rPr>
+              <a:t>    </a:t>
+            </a:r>
+            <a:br>
+              <a:rPr lang="en" noProof="1">
+                <a:effectLst/>
+                <a:latin typeface="Consolas" panose="020B0609020204030204" pitchFamily="49" charset="0"/>
+                <a:cs typeface="Consolas" panose="020B0609020204030204" pitchFamily="49" charset="0"/>
+              </a:rPr>
+            </a:br>
+            <a:r>
+              <a:rPr lang="en" noProof="1">
+                <a:effectLst/>
+                <a:latin typeface="Consolas" panose="020B0609020204030204" pitchFamily="49" charset="0"/>
+                <a:cs typeface="Consolas" panose="020B0609020204030204" pitchFamily="49" charset="0"/>
+              </a:rPr>
+              <a:t>asyncio.run(say_hello())</a:t>
+            </a:r>
+          </a:p>
+        </p:txBody>
+      </p:sp>
+      <p:pic>
+        <p:nvPicPr>
+          <p:cNvPr id="2050" name="Picture 2" descr="Getting started with Python ASYNCIO [Part-1] | by Noor Al Din Ahmed | Medium">
+            <a:extLst>
+              <a:ext uri="{FF2B5EF4-FFF2-40B4-BE49-F238E27FC236}">
+                <a16:creationId xmlns:a16="http://schemas.microsoft.com/office/drawing/2014/main" id="{83071460-7AFA-3E47-9790-19F67C5DCAA7}"/>
+              </a:ext>
+            </a:extLst>
+          </p:cNvPr>
+          <p:cNvPicPr>
+            <a:picLocks noChangeAspect="1" noChangeArrowheads="1"/>
+          </p:cNvPicPr>
+          <p:nvPr/>
+        </p:nvPicPr>
+        <p:blipFill>
+          <a:blip r:embed="rId2">
+            <a:extLst>
+              <a:ext uri="{28A0092B-C50C-407E-A947-70E740481C1C}">
+                <a14:useLocalDpi xmlns:a14="http://schemas.microsoft.com/office/drawing/2010/main" val="0"/>
+              </a:ext>
+            </a:extLst>
+          </a:blip>
+          <a:srcRect/>
+          <a:stretch>
+            <a:fillRect/>
+          </a:stretch>
+        </p:blipFill>
+        <p:spPr bwMode="auto">
+          <a:xfrm>
+            <a:off x="5377543" y="4438082"/>
+            <a:ext cx="6302828" cy="2126678"/>
+          </a:xfrm>
+          <a:prstGeom prst="rect">
+            <a:avLst/>
+          </a:prstGeom>
+          <a:noFill/>
+          <a:extLst>
+            <a:ext uri="{909E8E84-426E-40DD-AFC4-6F175D3DCCD1}">
+              <a14:hiddenFill xmlns:a14="http://schemas.microsoft.com/office/drawing/2010/main">
+                <a:solidFill>
+                  <a:srgbClr val="FFFFFF"/>
+                </a:solidFill>
+              </a14:hiddenFill>
+            </a:ext>
+          </a:extLst>
+        </p:spPr>
+      </p:pic>
+    </p:spTree>
+    <p:extLst>
+      <p:ext uri="{BB962C8B-B14F-4D97-AF65-F5344CB8AC3E}">
+        <p14:creationId xmlns:p14="http://schemas.microsoft.com/office/powerpoint/2010/main" val="796976378"/>
+      </p:ext>
+    </p:extLst>
+  </p:cSld>
+  <p:clrMapOvr>
+    <a:masterClrMapping/>
+  </p:clrMapOvr>
+</p:sld>
+</file>
+
+<file path=ppt/slides/slide38.xml><?xml version="1.0" encoding="utf-8"?>
+<p:sld xmlns:a="http://schemas.openxmlformats.org/drawingml/2006/main" xmlns:r="http://schemas.openxmlformats.org/officeDocument/2006/relationships" xmlns:p="http://schemas.openxmlformats.org/presentationml/2006/main">
+  <p:cSld>
+    <p:spTree>
+      <p:nvGrpSpPr>
+        <p:cNvPr id="1" name=""/>
+        <p:cNvGrpSpPr/>
+        <p:nvPr/>
+      </p:nvGrpSpPr>
+      <p:grpSpPr>
+        <a:xfrm>
+          <a:off x="0" y="0"/>
+          <a:ext cx="0" cy="0"/>
+          <a:chOff x="0" y="0"/>
+          <a:chExt cx="0" cy="0"/>
+        </a:xfrm>
+      </p:grpSpPr>
+      <p:sp>
+        <p:nvSpPr>
           <p:cNvPr id="3" name="Объект 2">
             <a:extLst>
               <a:ext uri="{FF2B5EF4-FFF2-40B4-BE49-F238E27FC236}">
@@ -34673,8 +35873,8 @@
         </p:nvSpPr>
         <p:spPr>
           <a:xfrm>
-            <a:off x="233680" y="0"/>
-            <a:ext cx="11704320" cy="6857999"/>
+            <a:off x="213360" y="0"/>
+            <a:ext cx="11978640" cy="6857999"/>
           </a:xfrm>
         </p:spPr>
         <p:txBody>
@@ -34685,7 +35885,7 @@
               <a:buNone/>
             </a:pPr>
             <a:r>
-              <a:rPr lang="en" sz="1600" b="1" noProof="1">
+              <a:rPr lang="en" sz="1800" b="1" noProof="1">
                 <a:solidFill>
                   <a:srgbClr val="0C450D"/>
                 </a:solidFill>
@@ -34696,7 +35896,7 @@
               <a:t>import</a:t>
             </a:r>
             <a:r>
-              <a:rPr lang="en" sz="1600" noProof="1">
+              <a:rPr lang="en" sz="1800" noProof="1">
                 <a:effectLst/>
                 <a:latin typeface="Consolas" panose="020B0609020204030204" pitchFamily="49" charset="0"/>
                 <a:cs typeface="Consolas" panose="020B0609020204030204" pitchFamily="49" charset="0"/>
@@ -34704,21 +35904,14 @@
               <a:t> asyncio</a:t>
             </a:r>
             <a:br>
-              <a:rPr lang="en" sz="1600" noProof="1">
-                <a:effectLst/>
-                <a:latin typeface="Consolas" panose="020B0609020204030204" pitchFamily="49" charset="0"/>
-                <a:cs typeface="Consolas" panose="020B0609020204030204" pitchFamily="49" charset="0"/>
-              </a:rPr>
-            </a:br>
-            <a:br>
-              <a:rPr lang="en" sz="1600" noProof="1">
-                <a:effectLst/>
-                <a:latin typeface="Consolas" panose="020B0609020204030204" pitchFamily="49" charset="0"/>
-                <a:cs typeface="Consolas" panose="020B0609020204030204" pitchFamily="49" charset="0"/>
-              </a:rPr>
-            </a:br>
-            <a:r>
-              <a:rPr lang="en" sz="1600" b="1" noProof="1">
+              <a:rPr lang="en" sz="1800" noProof="1">
+                <a:effectLst/>
+                <a:latin typeface="Consolas" panose="020B0609020204030204" pitchFamily="49" charset="0"/>
+                <a:cs typeface="Consolas" panose="020B0609020204030204" pitchFamily="49" charset="0"/>
+              </a:rPr>
+            </a:br>
+            <a:r>
+              <a:rPr lang="en" sz="1800" b="1" noProof="1">
                 <a:solidFill>
                   <a:srgbClr val="C5060B"/>
                 </a:solidFill>
@@ -34729,7 +35922,7 @@
               <a:t>HOST</a:t>
             </a:r>
             <a:r>
-              <a:rPr lang="en" sz="1600" noProof="1">
+              <a:rPr lang="en" sz="1800" noProof="1">
                 <a:effectLst/>
                 <a:latin typeface="Consolas" panose="020B0609020204030204" pitchFamily="49" charset="0"/>
                 <a:cs typeface="Consolas" panose="020B0609020204030204" pitchFamily="49" charset="0"/>
@@ -34737,7 +35930,7 @@
               <a:t>, </a:t>
             </a:r>
             <a:r>
-              <a:rPr lang="en" sz="1600" b="1" noProof="1">
+              <a:rPr lang="en" sz="1800" b="1" noProof="1">
                 <a:solidFill>
                   <a:srgbClr val="C5060B"/>
                 </a:solidFill>
@@ -34748,7 +35941,7 @@
               <a:t>PORT</a:t>
             </a:r>
             <a:r>
-              <a:rPr lang="en" sz="1600" noProof="1">
+              <a:rPr lang="en" sz="1800" noProof="1">
                 <a:effectLst/>
                 <a:latin typeface="Consolas" panose="020B0609020204030204" pitchFamily="49" charset="0"/>
                 <a:cs typeface="Consolas" panose="020B0609020204030204" pitchFamily="49" charset="0"/>
@@ -34756,7 +35949,7 @@
               <a:t> </a:t>
             </a:r>
             <a:r>
-              <a:rPr lang="en" sz="1600" b="1" noProof="1">
+              <a:rPr lang="en" sz="1800" b="1" noProof="1">
                 <a:solidFill>
                   <a:srgbClr val="0000FF"/>
                 </a:solidFill>
@@ -34767,7 +35960,7 @@
               <a:t>=</a:t>
             </a:r>
             <a:r>
-              <a:rPr lang="en" sz="1600" noProof="1">
+              <a:rPr lang="en" sz="1800" noProof="1">
                 <a:effectLst/>
                 <a:latin typeface="Consolas" panose="020B0609020204030204" pitchFamily="49" charset="0"/>
                 <a:cs typeface="Consolas" panose="020B0609020204030204" pitchFamily="49" charset="0"/>
@@ -34775,7 +35968,7 @@
               <a:t> (</a:t>
             </a:r>
             <a:r>
-              <a:rPr lang="en" sz="1600" noProof="1">
+              <a:rPr lang="en" sz="1800" noProof="1">
                 <a:solidFill>
                   <a:srgbClr val="036A07"/>
                 </a:solidFill>
@@ -34786,7 +35979,7 @@
               <a:t>'localhost'</a:t>
             </a:r>
             <a:r>
-              <a:rPr lang="en" sz="1600" noProof="1">
+              <a:rPr lang="en" sz="1800" noProof="1">
                 <a:effectLst/>
                 <a:latin typeface="Consolas" panose="020B0609020204030204" pitchFamily="49" charset="0"/>
                 <a:cs typeface="Consolas" panose="020B0609020204030204" pitchFamily="49" charset="0"/>
@@ -34794,7 +35987,7 @@
               <a:t>, </a:t>
             </a:r>
             <a:r>
-              <a:rPr lang="en" sz="1600" noProof="1">
+              <a:rPr lang="en" sz="1800" noProof="1">
                 <a:solidFill>
                   <a:srgbClr val="0000CD"/>
                 </a:solidFill>
@@ -34805,7 +35998,7 @@
               <a:t>12345</a:t>
             </a:r>
             <a:r>
-              <a:rPr lang="en" sz="1600" noProof="1">
+              <a:rPr lang="en" sz="1800" noProof="1">
                 <a:effectLst/>
                 <a:latin typeface="Consolas" panose="020B0609020204030204" pitchFamily="49" charset="0"/>
                 <a:cs typeface="Consolas" panose="020B0609020204030204" pitchFamily="49" charset="0"/>
@@ -34813,21 +36006,21 @@
               <a:t>)</a:t>
             </a:r>
             <a:br>
-              <a:rPr lang="en" sz="1600" noProof="1">
-                <a:effectLst/>
-                <a:latin typeface="Consolas" panose="020B0609020204030204" pitchFamily="49" charset="0"/>
-                <a:cs typeface="Consolas" panose="020B0609020204030204" pitchFamily="49" charset="0"/>
-              </a:rPr>
-            </a:br>
-            <a:br>
-              <a:rPr lang="en" sz="1600" noProof="1">
-                <a:effectLst/>
-                <a:latin typeface="Consolas" panose="020B0609020204030204" pitchFamily="49" charset="0"/>
-                <a:cs typeface="Consolas" panose="020B0609020204030204" pitchFamily="49" charset="0"/>
-              </a:rPr>
-            </a:br>
-            <a:r>
-              <a:rPr lang="en" sz="1600" b="1" noProof="1">
+              <a:rPr lang="en" sz="1800" noProof="1">
+                <a:effectLst/>
+                <a:latin typeface="Consolas" panose="020B0609020204030204" pitchFamily="49" charset="0"/>
+                <a:cs typeface="Consolas" panose="020B0609020204030204" pitchFamily="49" charset="0"/>
+              </a:rPr>
+            </a:br>
+            <a:br>
+              <a:rPr lang="en" sz="1800" noProof="1">
+                <a:effectLst/>
+                <a:latin typeface="Consolas" panose="020B0609020204030204" pitchFamily="49" charset="0"/>
+                <a:cs typeface="Consolas" panose="020B0609020204030204" pitchFamily="49" charset="0"/>
+              </a:rPr>
+            </a:br>
+            <a:r>
+              <a:rPr lang="en" sz="1800" b="1" noProof="1">
                 <a:solidFill>
                   <a:srgbClr val="0000FF"/>
                 </a:solidFill>
@@ -34838,7 +36031,7 @@
               <a:t>async</a:t>
             </a:r>
             <a:r>
-              <a:rPr lang="en" sz="1600" noProof="1">
+              <a:rPr lang="en" sz="1800" noProof="1">
                 <a:effectLst/>
                 <a:latin typeface="Consolas" panose="020B0609020204030204" pitchFamily="49" charset="0"/>
                 <a:cs typeface="Consolas" panose="020B0609020204030204" pitchFamily="49" charset="0"/>
@@ -34846,7 +36039,7 @@
               <a:t> </a:t>
             </a:r>
             <a:r>
-              <a:rPr lang="en" sz="1600" b="1" noProof="1">
+              <a:rPr lang="en" sz="1800" b="1" noProof="1">
                 <a:solidFill>
                   <a:srgbClr val="0000FF"/>
                 </a:solidFill>
@@ -34857,7 +36050,7 @@
               <a:t>def</a:t>
             </a:r>
             <a:r>
-              <a:rPr lang="en" sz="1600" noProof="1">
+              <a:rPr lang="en" sz="1800" noProof="1">
                 <a:effectLst/>
                 <a:latin typeface="Consolas" panose="020B0609020204030204" pitchFamily="49" charset="0"/>
                 <a:cs typeface="Consolas" panose="020B0609020204030204" pitchFamily="49" charset="0"/>
@@ -34865,7 +36058,7 @@
               <a:t> </a:t>
             </a:r>
             <a:r>
-              <a:rPr lang="en" sz="1600" b="1" noProof="1">
+              <a:rPr lang="en" sz="1800" b="1" noProof="1">
                 <a:solidFill>
                   <a:srgbClr val="0000A2"/>
                 </a:solidFill>
@@ -34876,7 +36069,7 @@
               <a:t>handle_connection</a:t>
             </a:r>
             <a:r>
-              <a:rPr lang="en" sz="1600" noProof="1">
+              <a:rPr lang="en" sz="1800" noProof="1">
                 <a:effectLst/>
                 <a:latin typeface="Consolas" panose="020B0609020204030204" pitchFamily="49" charset="0"/>
                 <a:cs typeface="Consolas" panose="020B0609020204030204" pitchFamily="49" charset="0"/>
@@ -34884,14 +36077,14 @@
               <a:t>(reader, writer):</a:t>
             </a:r>
             <a:br>
-              <a:rPr lang="en" sz="1600" noProof="1">
-                <a:effectLst/>
-                <a:latin typeface="Consolas" panose="020B0609020204030204" pitchFamily="49" charset="0"/>
-                <a:cs typeface="Consolas" panose="020B0609020204030204" pitchFamily="49" charset="0"/>
-              </a:rPr>
-            </a:br>
-            <a:r>
-              <a:rPr lang="en" sz="1600" noProof="1">
+              <a:rPr lang="en" sz="1800" noProof="1">
+                <a:effectLst/>
+                <a:latin typeface="Consolas" panose="020B0609020204030204" pitchFamily="49" charset="0"/>
+                <a:cs typeface="Consolas" panose="020B0609020204030204" pitchFamily="49" charset="0"/>
+              </a:rPr>
+            </a:br>
+            <a:r>
+              <a:rPr lang="en" sz="1800" noProof="1">
                 <a:effectLst/>
                 <a:latin typeface="Consolas" panose="020B0609020204030204" pitchFamily="49" charset="0"/>
                 <a:cs typeface="Consolas" panose="020B0609020204030204" pitchFamily="49" charset="0"/>
@@ -34899,7 +36092,7 @@
               <a:t>    addr </a:t>
             </a:r>
             <a:r>
-              <a:rPr lang="en" sz="1600" b="1" noProof="1">
+              <a:rPr lang="en" sz="1800" b="1" noProof="1">
                 <a:solidFill>
                   <a:srgbClr val="0000FF"/>
                 </a:solidFill>
@@ -34910,7 +36103,7 @@
               <a:t>=</a:t>
             </a:r>
             <a:r>
-              <a:rPr lang="en" sz="1600" noProof="1">
+              <a:rPr lang="en" sz="1800" noProof="1">
                 <a:effectLst/>
                 <a:latin typeface="Consolas" panose="020B0609020204030204" pitchFamily="49" charset="0"/>
                 <a:cs typeface="Consolas" panose="020B0609020204030204" pitchFamily="49" charset="0"/>
@@ -34918,7 +36111,7 @@
               <a:t> writer.get_extra_info(</a:t>
             </a:r>
             <a:r>
-              <a:rPr lang="en" sz="1600" noProof="1">
+              <a:rPr lang="en" sz="1800" noProof="1">
                 <a:solidFill>
                   <a:srgbClr val="036A07"/>
                 </a:solidFill>
@@ -34929,7 +36122,7 @@
               <a:t>"peername"</a:t>
             </a:r>
             <a:r>
-              <a:rPr lang="en" sz="1600" noProof="1">
+              <a:rPr lang="en" sz="1800" noProof="1">
                 <a:effectLst/>
                 <a:latin typeface="Consolas" panose="020B0609020204030204" pitchFamily="49" charset="0"/>
                 <a:cs typeface="Consolas" panose="020B0609020204030204" pitchFamily="49" charset="0"/>
@@ -34937,14 +36130,14 @@
               <a:t>)</a:t>
             </a:r>
             <a:br>
-              <a:rPr lang="en" sz="1600" noProof="1">
-                <a:effectLst/>
-                <a:latin typeface="Consolas" panose="020B0609020204030204" pitchFamily="49" charset="0"/>
-                <a:cs typeface="Consolas" panose="020B0609020204030204" pitchFamily="49" charset="0"/>
-              </a:rPr>
-            </a:br>
-            <a:r>
-              <a:rPr lang="en" sz="1600" noProof="1">
+              <a:rPr lang="en" sz="1800" noProof="1">
+                <a:effectLst/>
+                <a:latin typeface="Consolas" panose="020B0609020204030204" pitchFamily="49" charset="0"/>
+                <a:cs typeface="Consolas" panose="020B0609020204030204" pitchFamily="49" charset="0"/>
+              </a:rPr>
+            </a:br>
+            <a:r>
+              <a:rPr lang="en" sz="1800" noProof="1">
                 <a:effectLst/>
                 <a:latin typeface="Consolas" panose="020B0609020204030204" pitchFamily="49" charset="0"/>
                 <a:cs typeface="Consolas" panose="020B0609020204030204" pitchFamily="49" charset="0"/>
@@ -34952,7 +36145,7 @@
               <a:t>    </a:t>
             </a:r>
             <a:r>
-              <a:rPr lang="en" sz="1600" b="1" noProof="1">
+              <a:rPr lang="en" sz="1800" b="1" noProof="1">
                 <a:solidFill>
                   <a:srgbClr val="3C4C72"/>
                 </a:solidFill>
@@ -34963,7 +36156,7 @@
               <a:t>print</a:t>
             </a:r>
             <a:r>
-              <a:rPr lang="en" sz="1600" noProof="1">
+              <a:rPr lang="en" sz="1800" noProof="1">
                 <a:effectLst/>
                 <a:latin typeface="Consolas" panose="020B0609020204030204" pitchFamily="49" charset="0"/>
                 <a:cs typeface="Consolas" panose="020B0609020204030204" pitchFamily="49" charset="0"/>
@@ -34971,7 +36164,7 @@
               <a:t>(</a:t>
             </a:r>
             <a:r>
-              <a:rPr lang="en" sz="1600" noProof="1">
+              <a:rPr lang="en" sz="1800" noProof="1">
                 <a:solidFill>
                   <a:srgbClr val="036A07"/>
                 </a:solidFill>
@@ -34982,7 +36175,7 @@
               <a:t>"Connected by"</a:t>
             </a:r>
             <a:r>
-              <a:rPr lang="en" sz="1600" noProof="1">
+              <a:rPr lang="en" sz="1800" noProof="1">
                 <a:effectLst/>
                 <a:latin typeface="Consolas" panose="020B0609020204030204" pitchFamily="49" charset="0"/>
                 <a:cs typeface="Consolas" panose="020B0609020204030204" pitchFamily="49" charset="0"/>
@@ -34990,14 +36183,14 @@
               <a:t>, addr)</a:t>
             </a:r>
             <a:br>
-              <a:rPr lang="en" sz="1600" noProof="1">
-                <a:effectLst/>
-                <a:latin typeface="Consolas" panose="020B0609020204030204" pitchFamily="49" charset="0"/>
-                <a:cs typeface="Consolas" panose="020B0609020204030204" pitchFamily="49" charset="0"/>
-              </a:rPr>
-            </a:br>
-            <a:r>
-              <a:rPr lang="en" sz="1600" noProof="1">
+              <a:rPr lang="en" sz="1800" noProof="1">
+                <a:effectLst/>
+                <a:latin typeface="Consolas" panose="020B0609020204030204" pitchFamily="49" charset="0"/>
+                <a:cs typeface="Consolas" panose="020B0609020204030204" pitchFamily="49" charset="0"/>
+              </a:rPr>
+            </a:br>
+            <a:r>
+              <a:rPr lang="en" sz="1800" noProof="1">
                 <a:effectLst/>
                 <a:latin typeface="Consolas" panose="020B0609020204030204" pitchFamily="49" charset="0"/>
                 <a:cs typeface="Consolas" panose="020B0609020204030204" pitchFamily="49" charset="0"/>
@@ -35005,7 +36198,7 @@
               <a:t>    </a:t>
             </a:r>
             <a:r>
-              <a:rPr lang="en" sz="1600" b="1" noProof="1">
+              <a:rPr lang="en" sz="1800" b="1" noProof="1">
                 <a:solidFill>
                   <a:srgbClr val="0000FF"/>
                 </a:solidFill>
@@ -35016,7 +36209,7 @@
               <a:t>while</a:t>
             </a:r>
             <a:r>
-              <a:rPr lang="en" sz="1600" noProof="1">
+              <a:rPr lang="en" sz="1800" noProof="1">
                 <a:effectLst/>
                 <a:latin typeface="Consolas" panose="020B0609020204030204" pitchFamily="49" charset="0"/>
                 <a:cs typeface="Consolas" panose="020B0609020204030204" pitchFamily="49" charset="0"/>
@@ -35024,7 +36217,7 @@
               <a:t> </a:t>
             </a:r>
             <a:r>
-              <a:rPr lang="en" sz="1600" b="1" noProof="1">
+              <a:rPr lang="en" sz="1800" b="1" noProof="1">
                 <a:solidFill>
                   <a:srgbClr val="585CF6"/>
                 </a:solidFill>
@@ -35035,7 +36228,7 @@
               <a:t>True</a:t>
             </a:r>
             <a:r>
-              <a:rPr lang="en" sz="1600" noProof="1">
+              <a:rPr lang="en" sz="1800" noProof="1">
                 <a:effectLst/>
                 <a:latin typeface="Consolas" panose="020B0609020204030204" pitchFamily="49" charset="0"/>
                 <a:cs typeface="Consolas" panose="020B0609020204030204" pitchFamily="49" charset="0"/>
@@ -35043,14 +36236,14 @@
               <a:t>:</a:t>
             </a:r>
             <a:br>
-              <a:rPr lang="en" sz="1600" noProof="1">
-                <a:effectLst/>
-                <a:latin typeface="Consolas" panose="020B0609020204030204" pitchFamily="49" charset="0"/>
-                <a:cs typeface="Consolas" panose="020B0609020204030204" pitchFamily="49" charset="0"/>
-              </a:rPr>
-            </a:br>
-            <a:r>
-              <a:rPr lang="en" sz="1600" noProof="1">
+              <a:rPr lang="en" sz="1800" noProof="1">
+                <a:effectLst/>
+                <a:latin typeface="Consolas" panose="020B0609020204030204" pitchFamily="49" charset="0"/>
+                <a:cs typeface="Consolas" panose="020B0609020204030204" pitchFamily="49" charset="0"/>
+              </a:rPr>
+            </a:br>
+            <a:r>
+              <a:rPr lang="en" sz="1800" noProof="1">
                 <a:effectLst/>
                 <a:latin typeface="Consolas" panose="020B0609020204030204" pitchFamily="49" charset="0"/>
                 <a:cs typeface="Consolas" panose="020B0609020204030204" pitchFamily="49" charset="0"/>
@@ -35058,7 +36251,7 @@
               <a:t>        </a:t>
             </a:r>
             <a:r>
-              <a:rPr lang="en" sz="1600" noProof="1">
+              <a:rPr lang="en" sz="1800" noProof="1">
                 <a:solidFill>
                   <a:srgbClr val="0066FF"/>
                 </a:solidFill>
@@ -35069,7 +36262,7 @@
               <a:t># Receive</a:t>
             </a:r>
             <a:br>
-              <a:rPr lang="en" sz="1600" noProof="1">
+              <a:rPr lang="en" sz="1800" noProof="1">
                 <a:solidFill>
                   <a:srgbClr val="0066FF"/>
                 </a:solidFill>
@@ -35079,7 +36272,7 @@
               </a:rPr>
             </a:br>
             <a:r>
-              <a:rPr lang="en" sz="1600" noProof="1">
+              <a:rPr lang="en" sz="1800" noProof="1">
                 <a:effectLst/>
                 <a:latin typeface="Consolas" panose="020B0609020204030204" pitchFamily="49" charset="0"/>
                 <a:cs typeface="Consolas" panose="020B0609020204030204" pitchFamily="49" charset="0"/>
@@ -35087,7 +36280,7 @@
               <a:t>        </a:t>
             </a:r>
             <a:r>
-              <a:rPr lang="en" sz="1600" b="1" noProof="1">
+              <a:rPr lang="en" sz="1800" b="1" noProof="1">
                 <a:solidFill>
                   <a:srgbClr val="0000FF"/>
                 </a:solidFill>
@@ -35098,7 +36291,7 @@
               <a:t>try</a:t>
             </a:r>
             <a:r>
-              <a:rPr lang="en" sz="1600" noProof="1">
+              <a:rPr lang="en" sz="1800" noProof="1">
                 <a:effectLst/>
                 <a:latin typeface="Consolas" panose="020B0609020204030204" pitchFamily="49" charset="0"/>
                 <a:cs typeface="Consolas" panose="020B0609020204030204" pitchFamily="49" charset="0"/>
@@ -35106,14 +36299,14 @@
               <a:t>:</a:t>
             </a:r>
             <a:br>
-              <a:rPr lang="en" sz="1600" noProof="1">
-                <a:effectLst/>
-                <a:latin typeface="Consolas" panose="020B0609020204030204" pitchFamily="49" charset="0"/>
-                <a:cs typeface="Consolas" panose="020B0609020204030204" pitchFamily="49" charset="0"/>
-              </a:rPr>
-            </a:br>
-            <a:r>
-              <a:rPr lang="en" sz="1600" noProof="1">
+              <a:rPr lang="en" sz="1800" noProof="1">
+                <a:effectLst/>
+                <a:latin typeface="Consolas" panose="020B0609020204030204" pitchFamily="49" charset="0"/>
+                <a:cs typeface="Consolas" panose="020B0609020204030204" pitchFamily="49" charset="0"/>
+              </a:rPr>
+            </a:br>
+            <a:r>
+              <a:rPr lang="en" sz="1800" noProof="1">
                 <a:effectLst/>
                 <a:latin typeface="Consolas" panose="020B0609020204030204" pitchFamily="49" charset="0"/>
                 <a:cs typeface="Consolas" panose="020B0609020204030204" pitchFamily="49" charset="0"/>
@@ -35121,7 +36314,7 @@
               <a:t>            data </a:t>
             </a:r>
             <a:r>
-              <a:rPr lang="en" sz="1600" b="1" noProof="1">
+              <a:rPr lang="en" sz="1800" b="1" noProof="1">
                 <a:solidFill>
                   <a:srgbClr val="0000FF"/>
                 </a:solidFill>
@@ -35132,7 +36325,7 @@
               <a:t>=</a:t>
             </a:r>
             <a:r>
-              <a:rPr lang="en" sz="1600" noProof="1">
+              <a:rPr lang="en" sz="1800" noProof="1">
                 <a:effectLst/>
                 <a:latin typeface="Consolas" panose="020B0609020204030204" pitchFamily="49" charset="0"/>
                 <a:cs typeface="Consolas" panose="020B0609020204030204" pitchFamily="49" charset="0"/>
@@ -35140,7 +36333,7 @@
               <a:t> </a:t>
             </a:r>
             <a:r>
-              <a:rPr lang="en" sz="1600" b="1" noProof="1">
+              <a:rPr lang="en" sz="1800" b="1" noProof="1">
                 <a:solidFill>
                   <a:srgbClr val="0000FF"/>
                 </a:solidFill>
@@ -35151,7 +36344,7 @@
               <a:t>await</a:t>
             </a:r>
             <a:r>
-              <a:rPr lang="en" sz="1600" noProof="1">
+              <a:rPr lang="en" sz="1800" noProof="1">
                 <a:effectLst/>
                 <a:latin typeface="Consolas" panose="020B0609020204030204" pitchFamily="49" charset="0"/>
                 <a:cs typeface="Consolas" panose="020B0609020204030204" pitchFamily="49" charset="0"/>
@@ -35159,7 +36352,7 @@
               <a:t> reader.read(</a:t>
             </a:r>
             <a:r>
-              <a:rPr lang="en" sz="1600" noProof="1">
+              <a:rPr lang="en" sz="1800" noProof="1">
                 <a:solidFill>
                   <a:srgbClr val="0000CD"/>
                 </a:solidFill>
@@ -35170,7 +36363,7 @@
               <a:t>1024</a:t>
             </a:r>
             <a:r>
-              <a:rPr lang="en" sz="1600" noProof="1">
+              <a:rPr lang="en" sz="1800" noProof="1">
                 <a:effectLst/>
                 <a:latin typeface="Consolas" panose="020B0609020204030204" pitchFamily="49" charset="0"/>
                 <a:cs typeface="Consolas" panose="020B0609020204030204" pitchFamily="49" charset="0"/>
@@ -35178,7 +36371,7 @@
               <a:t>)</a:t>
             </a:r>
             <a:br>
-              <a:rPr lang="en" sz="1600" noProof="1">
+              <a:rPr lang="en" sz="1800" noProof="1">
                 <a:solidFill>
                   <a:srgbClr val="0066FF"/>
                 </a:solidFill>
@@ -35188,7 +36381,7 @@
               </a:rPr>
             </a:br>
             <a:r>
-              <a:rPr lang="en" sz="1600" noProof="1">
+              <a:rPr lang="en" sz="1800" noProof="1">
                 <a:effectLst/>
                 <a:latin typeface="Consolas" panose="020B0609020204030204" pitchFamily="49" charset="0"/>
                 <a:cs typeface="Consolas" panose="020B0609020204030204" pitchFamily="49" charset="0"/>
@@ -35196,7 +36389,7 @@
               <a:t>        </a:t>
             </a:r>
             <a:r>
-              <a:rPr lang="en" sz="1600" b="1" noProof="1">
+              <a:rPr lang="en" sz="1800" b="1" noProof="1">
                 <a:solidFill>
                   <a:srgbClr val="0000FF"/>
                 </a:solidFill>
@@ -35207,7 +36400,7 @@
               <a:t>except</a:t>
             </a:r>
             <a:r>
-              <a:rPr lang="en" sz="1600" noProof="1">
+              <a:rPr lang="en" sz="1800" noProof="1">
                 <a:effectLst/>
                 <a:latin typeface="Consolas" panose="020B0609020204030204" pitchFamily="49" charset="0"/>
                 <a:cs typeface="Consolas" panose="020B0609020204030204" pitchFamily="49" charset="0"/>
@@ -35215,7 +36408,7 @@
               <a:t> </a:t>
             </a:r>
             <a:r>
-              <a:rPr lang="en" sz="1600" b="1" noProof="1">
+              <a:rPr lang="en" sz="1800" b="1" noProof="1">
                 <a:solidFill>
                   <a:srgbClr val="6D79DE"/>
                 </a:solidFill>
@@ -35226,7 +36419,7 @@
               <a:t>ConnectionError</a:t>
             </a:r>
             <a:r>
-              <a:rPr lang="en" sz="1600" noProof="1">
+              <a:rPr lang="en" sz="1800" noProof="1">
                 <a:effectLst/>
                 <a:latin typeface="Consolas" panose="020B0609020204030204" pitchFamily="49" charset="0"/>
                 <a:cs typeface="Consolas" panose="020B0609020204030204" pitchFamily="49" charset="0"/>
@@ -35234,14 +36427,14 @@
               <a:t>:</a:t>
             </a:r>
             <a:br>
-              <a:rPr lang="en" sz="1600" noProof="1">
-                <a:effectLst/>
-                <a:latin typeface="Consolas" panose="020B0609020204030204" pitchFamily="49" charset="0"/>
-                <a:cs typeface="Consolas" panose="020B0609020204030204" pitchFamily="49" charset="0"/>
-              </a:rPr>
-            </a:br>
-            <a:r>
-              <a:rPr lang="en" sz="1600" noProof="1">
+              <a:rPr lang="en" sz="1800" noProof="1">
+                <a:effectLst/>
+                <a:latin typeface="Consolas" panose="020B0609020204030204" pitchFamily="49" charset="0"/>
+                <a:cs typeface="Consolas" panose="020B0609020204030204" pitchFamily="49" charset="0"/>
+              </a:rPr>
+            </a:br>
+            <a:r>
+              <a:rPr lang="en" sz="1800" noProof="1">
                 <a:effectLst/>
                 <a:latin typeface="Consolas" panose="020B0609020204030204" pitchFamily="49" charset="0"/>
                 <a:cs typeface="Consolas" panose="020B0609020204030204" pitchFamily="49" charset="0"/>
@@ -35249,7 +36442,44 @@
               <a:t>            </a:t>
             </a:r>
             <a:r>
-              <a:rPr lang="en" sz="1600" b="1" noProof="1">
+              <a:rPr lang="en" sz="1800" b="1" noProof="1">
+                <a:solidFill>
+                  <a:srgbClr val="0000FF"/>
+                </a:solidFill>
+                <a:effectLst/>
+                <a:latin typeface="Consolas" panose="020B0609020204030204" pitchFamily="49" charset="0"/>
+                <a:cs typeface="Consolas" panose="020B0609020204030204" pitchFamily="49" charset="0"/>
+              </a:rPr>
+              <a:t>break </a:t>
+            </a:r>
+            <a:r>
+              <a:rPr lang="en" sz="1800" noProof="1">
+                <a:solidFill>
+                  <a:srgbClr val="0066FF"/>
+                </a:solidFill>
+                <a:effectLst/>
+                <a:latin typeface="Consolas" panose="020B0609020204030204" pitchFamily="49" charset="0"/>
+                <a:cs typeface="Consolas" panose="020B0609020204030204" pitchFamily="49" charset="0"/>
+              </a:rPr>
+              <a:t># Closed</a:t>
+            </a:r>
+            <a:br>
+              <a:rPr lang="en" sz="1800" noProof="1">
+                <a:effectLst/>
+                <a:latin typeface="Consolas" panose="020B0609020204030204" pitchFamily="49" charset="0"/>
+                <a:cs typeface="Consolas" panose="020B0609020204030204" pitchFamily="49" charset="0"/>
+              </a:rPr>
+            </a:br>
+            <a:r>
+              <a:rPr lang="en" sz="1800" noProof="1">
+                <a:effectLst/>
+                <a:latin typeface="Consolas" panose="020B0609020204030204" pitchFamily="49" charset="0"/>
+                <a:cs typeface="Consolas" panose="020B0609020204030204" pitchFamily="49" charset="0"/>
+              </a:rPr>
+              <a:t>        </a:t>
+            </a:r>
+            <a:r>
+              <a:rPr lang="en" sz="1800" b="1" noProof="1">
                 <a:solidFill>
                   <a:srgbClr val="3C4C72"/>
                 </a:solidFill>
@@ -35260,7 +36490,7 @@
               <a:t>print</a:t>
             </a:r>
             <a:r>
-              <a:rPr lang="en" sz="1600" noProof="1">
+              <a:rPr lang="en" sz="1800" noProof="1">
                 <a:effectLst/>
                 <a:latin typeface="Consolas" panose="020B0609020204030204" pitchFamily="49" charset="0"/>
                 <a:cs typeface="Consolas" panose="020B0609020204030204" pitchFamily="49" charset="0"/>
@@ -35268,7 +36498,7 @@
               <a:t>(f</a:t>
             </a:r>
             <a:r>
-              <a:rPr lang="en" sz="1600" noProof="1">
+              <a:rPr lang="en" sz="1800" noProof="1">
                 <a:solidFill>
                   <a:srgbClr val="036A07"/>
                 </a:solidFill>
@@ -35276,20 +36506,376 @@
                 <a:latin typeface="Consolas" panose="020B0609020204030204" pitchFamily="49" charset="0"/>
                 <a:cs typeface="Consolas" panose="020B0609020204030204" pitchFamily="49" charset="0"/>
               </a:rPr>
-              <a:t>"closed</a:t>
-            </a:r>
-            <a:r>
-              <a:rPr lang="en-US" sz="1600" noProof="1">
+              <a:t>"Received </a:t>
+            </a:r>
+            <a:r>
+              <a:rPr lang="en" sz="1800" b="1" noProof="1">
+                <a:solidFill>
+                  <a:srgbClr val="C5060B"/>
+                </a:solidFill>
+                <a:effectLst/>
+                <a:latin typeface="Consolas" panose="020B0609020204030204" pitchFamily="49" charset="0"/>
+                <a:cs typeface="Consolas" panose="020B0609020204030204" pitchFamily="49" charset="0"/>
+              </a:rPr>
+              <a:t>{data}</a:t>
+            </a:r>
+            <a:r>
+              <a:rPr lang="en" sz="1800" noProof="1">
                 <a:solidFill>
                   <a:srgbClr val="036A07"/>
                 </a:solidFill>
+                <a:effectLst/>
+                <a:latin typeface="Consolas" panose="020B0609020204030204" pitchFamily="49" charset="0"/>
+                <a:cs typeface="Consolas" panose="020B0609020204030204" pitchFamily="49" charset="0"/>
+              </a:rPr>
+              <a:t> fr </a:t>
+            </a:r>
+            <a:r>
+              <a:rPr lang="en" sz="1800" b="1" noProof="1">
+                <a:solidFill>
+                  <a:srgbClr val="C5060B"/>
+                </a:solidFill>
+                <a:effectLst/>
+                <a:latin typeface="Consolas" panose="020B0609020204030204" pitchFamily="49" charset="0"/>
+                <a:cs typeface="Consolas" panose="020B0609020204030204" pitchFamily="49" charset="0"/>
+              </a:rPr>
+              <a:t>{addr}</a:t>
+            </a:r>
+            <a:r>
+              <a:rPr lang="en" sz="1800" noProof="1">
+                <a:solidFill>
+                  <a:srgbClr val="036A07"/>
+                </a:solidFill>
+                <a:effectLst/>
+                <a:latin typeface="Consolas" panose="020B0609020204030204" pitchFamily="49" charset="0"/>
+                <a:cs typeface="Consolas" panose="020B0609020204030204" pitchFamily="49" charset="0"/>
+              </a:rPr>
+              <a:t>"</a:t>
+            </a:r>
+            <a:r>
+              <a:rPr lang="en" sz="1800" noProof="1">
+                <a:effectLst/>
+                <a:latin typeface="Consolas" panose="020B0609020204030204" pitchFamily="49" charset="0"/>
+                <a:cs typeface="Consolas" panose="020B0609020204030204" pitchFamily="49" charset="0"/>
+              </a:rPr>
+              <a:t>)</a:t>
+            </a:r>
+            <a:br>
+              <a:rPr lang="en" sz="1800" noProof="1">
+                <a:effectLst/>
+                <a:latin typeface="Consolas" panose="020B0609020204030204" pitchFamily="49" charset="0"/>
+                <a:cs typeface="Consolas" panose="020B0609020204030204" pitchFamily="49" charset="0"/>
+              </a:rPr>
+            </a:br>
+            <a:r>
+              <a:rPr lang="en" sz="1800" noProof="1">
+                <a:effectLst/>
+                <a:latin typeface="Consolas" panose="020B0609020204030204" pitchFamily="49" charset="0"/>
+                <a:cs typeface="Consolas" panose="020B0609020204030204" pitchFamily="49" charset="0"/>
+              </a:rPr>
+              <a:t>        </a:t>
+            </a:r>
+            <a:r>
+              <a:rPr lang="en" sz="1800" b="1" noProof="1">
+                <a:solidFill>
+                  <a:srgbClr val="0000FF"/>
+                </a:solidFill>
+                <a:effectLst/>
+                <a:latin typeface="Consolas" panose="020B0609020204030204" pitchFamily="49" charset="0"/>
+                <a:cs typeface="Consolas" panose="020B0609020204030204" pitchFamily="49" charset="0"/>
+              </a:rPr>
+              <a:t>if</a:t>
+            </a:r>
+            <a:r>
+              <a:rPr lang="en" sz="1800" noProof="1">
+                <a:effectLst/>
+                <a:latin typeface="Consolas" panose="020B0609020204030204" pitchFamily="49" charset="0"/>
+                <a:cs typeface="Consolas" panose="020B0609020204030204" pitchFamily="49" charset="0"/>
+              </a:rPr>
+              <a:t> </a:t>
+            </a:r>
+            <a:r>
+              <a:rPr lang="en" sz="1800" b="1" noProof="1">
+                <a:solidFill>
+                  <a:srgbClr val="0000FF"/>
+                </a:solidFill>
+                <a:effectLst/>
+                <a:latin typeface="Consolas" panose="020B0609020204030204" pitchFamily="49" charset="0"/>
+                <a:cs typeface="Consolas" panose="020B0609020204030204" pitchFamily="49" charset="0"/>
+              </a:rPr>
+              <a:t>not</a:t>
+            </a:r>
+            <a:r>
+              <a:rPr lang="en" sz="1800" noProof="1">
+                <a:effectLst/>
+                <a:latin typeface="Consolas" panose="020B0609020204030204" pitchFamily="49" charset="0"/>
+                <a:cs typeface="Consolas" panose="020B0609020204030204" pitchFamily="49" charset="0"/>
+              </a:rPr>
+              <a:t> data:</a:t>
+            </a:r>
+            <a:br>
+              <a:rPr lang="en" sz="1800" noProof="1">
+                <a:effectLst/>
+                <a:latin typeface="Consolas" panose="020B0609020204030204" pitchFamily="49" charset="0"/>
+                <a:cs typeface="Consolas" panose="020B0609020204030204" pitchFamily="49" charset="0"/>
+              </a:rPr>
+            </a:br>
+            <a:r>
+              <a:rPr lang="en" sz="1800" noProof="1">
+                <a:effectLst/>
+                <a:latin typeface="Consolas" panose="020B0609020204030204" pitchFamily="49" charset="0"/>
+                <a:cs typeface="Consolas" panose="020B0609020204030204" pitchFamily="49" charset="0"/>
+              </a:rPr>
+              <a:t>            </a:t>
+            </a:r>
+            <a:r>
+              <a:rPr lang="en" sz="1800" b="1" noProof="1">
+                <a:solidFill>
+                  <a:srgbClr val="0000FF"/>
+                </a:solidFill>
+                <a:effectLst/>
+                <a:latin typeface="Consolas" panose="020B0609020204030204" pitchFamily="49" charset="0"/>
+                <a:cs typeface="Consolas" panose="020B0609020204030204" pitchFamily="49" charset="0"/>
+              </a:rPr>
+              <a:t>break</a:t>
+            </a:r>
+            <a:br>
+              <a:rPr lang="en" sz="1800" noProof="1">
+                <a:effectLst/>
+                <a:latin typeface="Consolas" panose="020B0609020204030204" pitchFamily="49" charset="0"/>
+                <a:cs typeface="Consolas" panose="020B0609020204030204" pitchFamily="49" charset="0"/>
+              </a:rPr>
+            </a:br>
+            <a:r>
+              <a:rPr lang="en" sz="1800" noProof="1">
+                <a:effectLst/>
+                <a:latin typeface="Consolas" panose="020B0609020204030204" pitchFamily="49" charset="0"/>
+                <a:cs typeface="Consolas" panose="020B0609020204030204" pitchFamily="49" charset="0"/>
+              </a:rPr>
+              <a:t>        </a:t>
+            </a:r>
+            <a:r>
+              <a:rPr lang="en" sz="1800" noProof="1">
+                <a:solidFill>
+                  <a:srgbClr val="0066FF"/>
+                </a:solidFill>
+                <a:effectLst/>
+                <a:latin typeface="Consolas" panose="020B0609020204030204" pitchFamily="49" charset="0"/>
+                <a:cs typeface="Consolas" panose="020B0609020204030204" pitchFamily="49" charset="0"/>
+              </a:rPr>
+              <a:t># Process</a:t>
+            </a:r>
+            <a:br>
+              <a:rPr lang="en" sz="1800" noProof="1">
+                <a:solidFill>
+                  <a:srgbClr val="0066FF"/>
+                </a:solidFill>
+                <a:effectLst/>
+                <a:latin typeface="Consolas" panose="020B0609020204030204" pitchFamily="49" charset="0"/>
+                <a:cs typeface="Consolas" panose="020B0609020204030204" pitchFamily="49" charset="0"/>
+              </a:rPr>
+            </a:br>
+            <a:r>
+              <a:rPr lang="en" sz="1800" noProof="1">
+                <a:effectLst/>
+                <a:latin typeface="Consolas" panose="020B0609020204030204" pitchFamily="49" charset="0"/>
+                <a:cs typeface="Consolas" panose="020B0609020204030204" pitchFamily="49" charset="0"/>
+              </a:rPr>
+              <a:t>        </a:t>
+            </a:r>
+            <a:r>
+              <a:rPr lang="en" sz="1800" b="1" noProof="1">
+                <a:solidFill>
+                  <a:srgbClr val="0000FF"/>
+                </a:solidFill>
+                <a:effectLst/>
+                <a:latin typeface="Consolas" panose="020B0609020204030204" pitchFamily="49" charset="0"/>
+                <a:cs typeface="Consolas" panose="020B0609020204030204" pitchFamily="49" charset="0"/>
+              </a:rPr>
+              <a:t>if</a:t>
+            </a:r>
+            <a:r>
+              <a:rPr lang="en" sz="1800" noProof="1">
+                <a:effectLst/>
+                <a:latin typeface="Consolas" panose="020B0609020204030204" pitchFamily="49" charset="0"/>
+                <a:cs typeface="Consolas" panose="020B0609020204030204" pitchFamily="49" charset="0"/>
+              </a:rPr>
+              <a:t> data </a:t>
+            </a:r>
+            <a:r>
+              <a:rPr lang="en" sz="1800" b="1" noProof="1">
+                <a:solidFill>
+                  <a:srgbClr val="0000FF"/>
+                </a:solidFill>
+                <a:effectLst/>
+                <a:latin typeface="Consolas" panose="020B0609020204030204" pitchFamily="49" charset="0"/>
+                <a:cs typeface="Consolas" panose="020B0609020204030204" pitchFamily="49" charset="0"/>
+              </a:rPr>
+              <a:t>==</a:t>
+            </a:r>
+            <a:r>
+              <a:rPr lang="en" sz="1800" noProof="1">
+                <a:effectLst/>
+                <a:latin typeface="Consolas" panose="020B0609020204030204" pitchFamily="49" charset="0"/>
+                <a:cs typeface="Consolas" panose="020B0609020204030204" pitchFamily="49" charset="0"/>
+              </a:rPr>
+              <a:t> </a:t>
+            </a:r>
+            <a:r>
+              <a:rPr lang="en" sz="1800" b="1" noProof="1">
+                <a:solidFill>
+                  <a:srgbClr val="0000FF"/>
+                </a:solidFill>
+                <a:effectLst/>
+                <a:latin typeface="Consolas" panose="020B0609020204030204" pitchFamily="49" charset="0"/>
+                <a:cs typeface="Consolas" panose="020B0609020204030204" pitchFamily="49" charset="0"/>
+              </a:rPr>
+              <a:t>b</a:t>
+            </a:r>
+            <a:r>
+              <a:rPr lang="en" sz="1800" noProof="1">
+                <a:solidFill>
+                  <a:srgbClr val="036A07"/>
+                </a:solidFill>
+                <a:effectLst/>
+                <a:latin typeface="Consolas" panose="020B0609020204030204" pitchFamily="49" charset="0"/>
+                <a:cs typeface="Consolas" panose="020B0609020204030204" pitchFamily="49" charset="0"/>
+              </a:rPr>
+              <a:t>"close"</a:t>
+            </a:r>
+            <a:r>
+              <a:rPr lang="en" sz="1800" noProof="1">
+                <a:effectLst/>
                 <a:latin typeface="Consolas" panose="020B0609020204030204" pitchFamily="49" charset="0"/>
                 <a:cs typeface="Consolas" panose="020B0609020204030204" pitchFamily="49" charset="0"/>
               </a:rPr>
               <a:t>:</a:t>
             </a:r>
-            <a:r>
-              <a:rPr lang="en" sz="1600" noProof="1">
+            <a:br>
+              <a:rPr lang="en" sz="1800" noProof="1">
+                <a:effectLst/>
+                <a:latin typeface="Consolas" panose="020B0609020204030204" pitchFamily="49" charset="0"/>
+                <a:cs typeface="Consolas" panose="020B0609020204030204" pitchFamily="49" charset="0"/>
+              </a:rPr>
+            </a:br>
+            <a:r>
+              <a:rPr lang="en" sz="1800" noProof="1">
+                <a:effectLst/>
+                <a:latin typeface="Consolas" panose="020B0609020204030204" pitchFamily="49" charset="0"/>
+                <a:cs typeface="Consolas" panose="020B0609020204030204" pitchFamily="49" charset="0"/>
+              </a:rPr>
+              <a:t>            </a:t>
+            </a:r>
+            <a:r>
+              <a:rPr lang="en" sz="1800" b="1" noProof="1">
+                <a:solidFill>
+                  <a:srgbClr val="0000FF"/>
+                </a:solidFill>
+                <a:effectLst/>
+                <a:latin typeface="Consolas" panose="020B0609020204030204" pitchFamily="49" charset="0"/>
+                <a:cs typeface="Consolas" panose="020B0609020204030204" pitchFamily="49" charset="0"/>
+              </a:rPr>
+              <a:t>break</a:t>
+            </a:r>
+            <a:br>
+              <a:rPr lang="en" sz="1800" noProof="1">
+                <a:effectLst/>
+                <a:latin typeface="Consolas" panose="020B0609020204030204" pitchFamily="49" charset="0"/>
+                <a:cs typeface="Consolas" panose="020B0609020204030204" pitchFamily="49" charset="0"/>
+              </a:rPr>
+            </a:br>
+            <a:r>
+              <a:rPr lang="en" sz="1800" noProof="1">
+                <a:effectLst/>
+                <a:latin typeface="Consolas" panose="020B0609020204030204" pitchFamily="49" charset="0"/>
+                <a:cs typeface="Consolas" panose="020B0609020204030204" pitchFamily="49" charset="0"/>
+              </a:rPr>
+              <a:t>        data </a:t>
+            </a:r>
+            <a:r>
+              <a:rPr lang="en" sz="1800" b="1" noProof="1">
+                <a:solidFill>
+                  <a:srgbClr val="0000FF"/>
+                </a:solidFill>
+                <a:effectLst/>
+                <a:latin typeface="Consolas" panose="020B0609020204030204" pitchFamily="49" charset="0"/>
+                <a:cs typeface="Consolas" panose="020B0609020204030204" pitchFamily="49" charset="0"/>
+              </a:rPr>
+              <a:t>=</a:t>
+            </a:r>
+            <a:r>
+              <a:rPr lang="en" sz="1800" noProof="1">
+                <a:effectLst/>
+                <a:latin typeface="Consolas" panose="020B0609020204030204" pitchFamily="49" charset="0"/>
+                <a:cs typeface="Consolas" panose="020B0609020204030204" pitchFamily="49" charset="0"/>
+              </a:rPr>
+              <a:t> data.upper()</a:t>
+            </a:r>
+            <a:br>
+              <a:rPr lang="en" sz="1800" noProof="1">
+                <a:effectLst/>
+                <a:latin typeface="Consolas" panose="020B0609020204030204" pitchFamily="49" charset="0"/>
+                <a:cs typeface="Consolas" panose="020B0609020204030204" pitchFamily="49" charset="0"/>
+              </a:rPr>
+            </a:br>
+            <a:r>
+              <a:rPr lang="en" sz="1800" noProof="1">
+                <a:effectLst/>
+                <a:latin typeface="Consolas" panose="020B0609020204030204" pitchFamily="49" charset="0"/>
+                <a:cs typeface="Consolas" panose="020B0609020204030204" pitchFamily="49" charset="0"/>
+              </a:rPr>
+              <a:t>        </a:t>
+            </a:r>
+            <a:r>
+              <a:rPr lang="en" sz="1800" noProof="1">
+                <a:solidFill>
+                  <a:srgbClr val="0066FF"/>
+                </a:solidFill>
+                <a:effectLst/>
+                <a:latin typeface="Consolas" panose="020B0609020204030204" pitchFamily="49" charset="0"/>
+                <a:cs typeface="Consolas" panose="020B0609020204030204" pitchFamily="49" charset="0"/>
+              </a:rPr>
+              <a:t># Send</a:t>
+            </a:r>
+            <a:br>
+              <a:rPr lang="en" sz="1800" noProof="1">
+                <a:solidFill>
+                  <a:srgbClr val="0066FF"/>
+                </a:solidFill>
+                <a:effectLst/>
+                <a:latin typeface="Consolas" panose="020B0609020204030204" pitchFamily="49" charset="0"/>
+                <a:cs typeface="Consolas" panose="020B0609020204030204" pitchFamily="49" charset="0"/>
+              </a:rPr>
+            </a:br>
+            <a:r>
+              <a:rPr lang="en" sz="1800" noProof="1">
+                <a:effectLst/>
+                <a:latin typeface="Consolas" panose="020B0609020204030204" pitchFamily="49" charset="0"/>
+                <a:cs typeface="Consolas" panose="020B0609020204030204" pitchFamily="49" charset="0"/>
+              </a:rPr>
+              <a:t>        </a:t>
+            </a:r>
+            <a:r>
+              <a:rPr lang="en" sz="1800" b="1" noProof="1">
+                <a:solidFill>
+                  <a:srgbClr val="3C4C72"/>
+                </a:solidFill>
+                <a:effectLst/>
+                <a:latin typeface="Consolas" panose="020B0609020204030204" pitchFamily="49" charset="0"/>
+                <a:cs typeface="Consolas" panose="020B0609020204030204" pitchFamily="49" charset="0"/>
+              </a:rPr>
+              <a:t>print</a:t>
+            </a:r>
+            <a:r>
+              <a:rPr lang="en" sz="1800" noProof="1">
+                <a:effectLst/>
+                <a:latin typeface="Consolas" panose="020B0609020204030204" pitchFamily="49" charset="0"/>
+                <a:cs typeface="Consolas" panose="020B0609020204030204" pitchFamily="49" charset="0"/>
+              </a:rPr>
+              <a:t>(f</a:t>
+            </a:r>
+            <a:r>
+              <a:rPr lang="en" sz="1800" noProof="1">
                 <a:solidFill>
                   <a:srgbClr val="036A07"/>
                 </a:solidFill>
@@ -35297,10 +36883,573 @@
                 <a:latin typeface="Consolas" panose="020B0609020204030204" pitchFamily="49" charset="0"/>
                 <a:cs typeface="Consolas" panose="020B0609020204030204" pitchFamily="49" charset="0"/>
               </a:rPr>
+              <a:t>"Send: </a:t>
+            </a:r>
+            <a:r>
+              <a:rPr lang="en" sz="1800" b="1" noProof="1">
+                <a:solidFill>
+                  <a:srgbClr val="C5060B"/>
+                </a:solidFill>
+                <a:effectLst/>
+                <a:latin typeface="Consolas" panose="020B0609020204030204" pitchFamily="49" charset="0"/>
+                <a:cs typeface="Consolas" panose="020B0609020204030204" pitchFamily="49" charset="0"/>
+              </a:rPr>
+              <a:t>{data}</a:t>
+            </a:r>
+            <a:r>
+              <a:rPr lang="en" sz="1800" noProof="1">
+                <a:solidFill>
+                  <a:srgbClr val="036A07"/>
+                </a:solidFill>
+                <a:effectLst/>
+                <a:latin typeface="Consolas" panose="020B0609020204030204" pitchFamily="49" charset="0"/>
+                <a:cs typeface="Consolas" panose="020B0609020204030204" pitchFamily="49" charset="0"/>
+              </a:rPr>
+              <a:t> to: </a:t>
+            </a:r>
+            <a:r>
+              <a:rPr lang="en" sz="1800" b="1" noProof="1">
+                <a:solidFill>
+                  <a:srgbClr val="C5060B"/>
+                </a:solidFill>
+                <a:effectLst/>
+                <a:latin typeface="Consolas" panose="020B0609020204030204" pitchFamily="49" charset="0"/>
+                <a:cs typeface="Consolas" panose="020B0609020204030204" pitchFamily="49" charset="0"/>
+              </a:rPr>
+              <a:t>{addr}</a:t>
+            </a:r>
+            <a:r>
+              <a:rPr lang="en" sz="1800" noProof="1">
+                <a:solidFill>
+                  <a:srgbClr val="036A07"/>
+                </a:solidFill>
+                <a:effectLst/>
+                <a:latin typeface="Consolas" panose="020B0609020204030204" pitchFamily="49" charset="0"/>
+                <a:cs typeface="Consolas" panose="020B0609020204030204" pitchFamily="49" charset="0"/>
+              </a:rPr>
+              <a:t>"</a:t>
+            </a:r>
+            <a:r>
+              <a:rPr lang="en" sz="1800" noProof="1">
+                <a:effectLst/>
+                <a:latin typeface="Consolas" panose="020B0609020204030204" pitchFamily="49" charset="0"/>
+                <a:cs typeface="Consolas" panose="020B0609020204030204" pitchFamily="49" charset="0"/>
+              </a:rPr>
+              <a:t>)</a:t>
+            </a:r>
+            <a:br>
+              <a:rPr lang="en" sz="1800" noProof="1">
+                <a:effectLst/>
+                <a:latin typeface="Consolas" panose="020B0609020204030204" pitchFamily="49" charset="0"/>
+                <a:cs typeface="Consolas" panose="020B0609020204030204" pitchFamily="49" charset="0"/>
+              </a:rPr>
+            </a:br>
+            <a:r>
+              <a:rPr lang="en" sz="1800" noProof="1">
+                <a:effectLst/>
+                <a:latin typeface="Consolas" panose="020B0609020204030204" pitchFamily="49" charset="0"/>
+                <a:cs typeface="Consolas" panose="020B0609020204030204" pitchFamily="49" charset="0"/>
+              </a:rPr>
+              <a:t>        </a:t>
+            </a:r>
+            <a:r>
+              <a:rPr lang="en" sz="1800" b="1" noProof="1">
+                <a:solidFill>
+                  <a:srgbClr val="0000FF"/>
+                </a:solidFill>
+                <a:effectLst/>
+                <a:latin typeface="Consolas" panose="020B0609020204030204" pitchFamily="49" charset="0"/>
+                <a:cs typeface="Consolas" panose="020B0609020204030204" pitchFamily="49" charset="0"/>
+              </a:rPr>
+              <a:t>try</a:t>
+            </a:r>
+            <a:r>
+              <a:rPr lang="en" sz="1800" noProof="1">
+                <a:effectLst/>
+                <a:latin typeface="Consolas" panose="020B0609020204030204" pitchFamily="49" charset="0"/>
+                <a:cs typeface="Consolas" panose="020B0609020204030204" pitchFamily="49" charset="0"/>
+              </a:rPr>
+              <a:t>:</a:t>
+            </a:r>
+            <a:br>
+              <a:rPr lang="en" sz="1800" noProof="1">
+                <a:effectLst/>
+                <a:latin typeface="Consolas" panose="020B0609020204030204" pitchFamily="49" charset="0"/>
+                <a:cs typeface="Consolas" panose="020B0609020204030204" pitchFamily="49" charset="0"/>
+              </a:rPr>
+            </a:br>
+            <a:r>
+              <a:rPr lang="en" sz="1800" noProof="1">
+                <a:effectLst/>
+                <a:latin typeface="Consolas" panose="020B0609020204030204" pitchFamily="49" charset="0"/>
+                <a:cs typeface="Consolas" panose="020B0609020204030204" pitchFamily="49" charset="0"/>
+              </a:rPr>
+              <a:t>            writer.write(data)  </a:t>
+            </a:r>
+            <a:r>
+              <a:rPr lang="en" sz="1800" noProof="1">
+                <a:solidFill>
+                  <a:srgbClr val="0066FF"/>
+                </a:solidFill>
+                <a:effectLst/>
+                <a:latin typeface="Consolas" panose="020B0609020204030204" pitchFamily="49" charset="0"/>
+                <a:cs typeface="Consolas" panose="020B0609020204030204" pitchFamily="49" charset="0"/>
+              </a:rPr>
+              <a:t># New</a:t>
+            </a:r>
+            <a:br>
+              <a:rPr lang="en" sz="1800" noProof="1">
+                <a:solidFill>
+                  <a:srgbClr val="0066FF"/>
+                </a:solidFill>
+                <a:effectLst/>
+                <a:latin typeface="Consolas" panose="020B0609020204030204" pitchFamily="49" charset="0"/>
+                <a:cs typeface="Consolas" panose="020B0609020204030204" pitchFamily="49" charset="0"/>
+              </a:rPr>
+            </a:br>
+            <a:r>
+              <a:rPr lang="en" sz="1800" noProof="1">
+                <a:effectLst/>
+                <a:latin typeface="Consolas" panose="020B0609020204030204" pitchFamily="49" charset="0"/>
+                <a:cs typeface="Consolas" panose="020B0609020204030204" pitchFamily="49" charset="0"/>
+              </a:rPr>
+              <a:t>            </a:t>
+            </a:r>
+            <a:r>
+              <a:rPr lang="en" sz="1800" b="1" noProof="1">
+                <a:solidFill>
+                  <a:srgbClr val="0000FF"/>
+                </a:solidFill>
+                <a:effectLst/>
+                <a:latin typeface="Consolas" panose="020B0609020204030204" pitchFamily="49" charset="0"/>
+                <a:cs typeface="Consolas" panose="020B0609020204030204" pitchFamily="49" charset="0"/>
+              </a:rPr>
+              <a:t>await</a:t>
+            </a:r>
+            <a:r>
+              <a:rPr lang="en" sz="1800" noProof="1">
+                <a:effectLst/>
+                <a:latin typeface="Consolas" panose="020B0609020204030204" pitchFamily="49" charset="0"/>
+                <a:cs typeface="Consolas" panose="020B0609020204030204" pitchFamily="49" charset="0"/>
+              </a:rPr>
+              <a:t> writer.drain()</a:t>
+            </a:r>
+            <a:br>
+              <a:rPr lang="en" sz="1800" noProof="1">
+                <a:effectLst/>
+                <a:latin typeface="Consolas" panose="020B0609020204030204" pitchFamily="49" charset="0"/>
+                <a:cs typeface="Consolas" panose="020B0609020204030204" pitchFamily="49" charset="0"/>
+              </a:rPr>
+            </a:br>
+            <a:r>
+              <a:rPr lang="en" sz="1800" noProof="1">
+                <a:effectLst/>
+                <a:latin typeface="Consolas" panose="020B0609020204030204" pitchFamily="49" charset="0"/>
+                <a:cs typeface="Consolas" panose="020B0609020204030204" pitchFamily="49" charset="0"/>
+              </a:rPr>
+              <a:t>        </a:t>
+            </a:r>
+            <a:r>
+              <a:rPr lang="en" sz="1800" b="1" noProof="1">
+                <a:solidFill>
+                  <a:srgbClr val="0000FF"/>
+                </a:solidFill>
+                <a:effectLst/>
+                <a:latin typeface="Consolas" panose="020B0609020204030204" pitchFamily="49" charset="0"/>
+                <a:cs typeface="Consolas" panose="020B0609020204030204" pitchFamily="49" charset="0"/>
+              </a:rPr>
+              <a:t>except</a:t>
+            </a:r>
+            <a:r>
+              <a:rPr lang="en" sz="1800" noProof="1">
+                <a:effectLst/>
+                <a:latin typeface="Consolas" panose="020B0609020204030204" pitchFamily="49" charset="0"/>
+                <a:cs typeface="Consolas" panose="020B0609020204030204" pitchFamily="49" charset="0"/>
+              </a:rPr>
               <a:t> </a:t>
             </a:r>
             <a:r>
-              <a:rPr lang="en" sz="1600" b="1" noProof="1">
+              <a:rPr lang="en" sz="1800" b="1" noProof="1">
+                <a:solidFill>
+                  <a:srgbClr val="6D79DE"/>
+                </a:solidFill>
+                <a:effectLst/>
+                <a:latin typeface="Consolas" panose="020B0609020204030204" pitchFamily="49" charset="0"/>
+                <a:cs typeface="Consolas" panose="020B0609020204030204" pitchFamily="49" charset="0"/>
+              </a:rPr>
+              <a:t>ConnectionError</a:t>
+            </a:r>
+            <a:r>
+              <a:rPr lang="en" sz="1800" noProof="1">
+                <a:effectLst/>
+                <a:latin typeface="Consolas" panose="020B0609020204030204" pitchFamily="49" charset="0"/>
+                <a:cs typeface="Consolas" panose="020B0609020204030204" pitchFamily="49" charset="0"/>
+              </a:rPr>
+              <a:t>:</a:t>
+            </a:r>
+            <a:br>
+              <a:rPr lang="en" sz="1800" noProof="1">
+                <a:effectLst/>
+                <a:latin typeface="Consolas" panose="020B0609020204030204" pitchFamily="49" charset="0"/>
+                <a:cs typeface="Consolas" panose="020B0609020204030204" pitchFamily="49" charset="0"/>
+              </a:rPr>
+            </a:br>
+            <a:r>
+              <a:rPr lang="en" sz="1800" noProof="1">
+                <a:effectLst/>
+                <a:latin typeface="Consolas" panose="020B0609020204030204" pitchFamily="49" charset="0"/>
+                <a:cs typeface="Consolas" panose="020B0609020204030204" pitchFamily="49" charset="0"/>
+              </a:rPr>
+              <a:t>            </a:t>
+            </a:r>
+            <a:r>
+              <a:rPr lang="en" sz="1800" b="1" noProof="1">
+                <a:solidFill>
+                  <a:srgbClr val="0000FF"/>
+                </a:solidFill>
+                <a:effectLst/>
+                <a:latin typeface="Consolas" panose="020B0609020204030204" pitchFamily="49" charset="0"/>
+                <a:cs typeface="Consolas" panose="020B0609020204030204" pitchFamily="49" charset="0"/>
+              </a:rPr>
+              <a:t>break </a:t>
+            </a:r>
+            <a:r>
+              <a:rPr lang="en" sz="1800" noProof="1">
+                <a:solidFill>
+                  <a:srgbClr val="0066FF"/>
+                </a:solidFill>
+                <a:effectLst/>
+                <a:latin typeface="Consolas" panose="020B0609020204030204" pitchFamily="49" charset="0"/>
+                <a:cs typeface="Consolas" panose="020B0609020204030204" pitchFamily="49" charset="0"/>
+              </a:rPr>
+              <a:t># Closed</a:t>
+            </a:r>
+            <a:br>
+              <a:rPr lang="en" sz="1800" noProof="1">
+                <a:effectLst/>
+                <a:latin typeface="Consolas" panose="020B0609020204030204" pitchFamily="49" charset="0"/>
+                <a:cs typeface="Consolas" panose="020B0609020204030204" pitchFamily="49" charset="0"/>
+              </a:rPr>
+            </a:br>
+            <a:r>
+              <a:rPr lang="en" sz="1800" noProof="1">
+                <a:effectLst/>
+                <a:latin typeface="Consolas" panose="020B0609020204030204" pitchFamily="49" charset="0"/>
+                <a:cs typeface="Consolas" panose="020B0609020204030204" pitchFamily="49" charset="0"/>
+              </a:rPr>
+              <a:t>    writer.close()</a:t>
+            </a:r>
+            <a:br>
+              <a:rPr lang="en" sz="1800" noProof="1">
+                <a:effectLst/>
+                <a:latin typeface="Consolas" panose="020B0609020204030204" pitchFamily="49" charset="0"/>
+                <a:cs typeface="Consolas" panose="020B0609020204030204" pitchFamily="49" charset="0"/>
+              </a:rPr>
+            </a:br>
+            <a:r>
+              <a:rPr lang="en" sz="1800" b="1" noProof="1">
+                <a:solidFill>
+                  <a:srgbClr val="0000FF"/>
+                </a:solidFill>
+                <a:effectLst/>
+                <a:latin typeface="Consolas" panose="020B0609020204030204" pitchFamily="49" charset="0"/>
+                <a:cs typeface="Consolas" panose="020B0609020204030204" pitchFamily="49" charset="0"/>
+              </a:rPr>
+              <a:t>async</a:t>
+            </a:r>
+            <a:r>
+              <a:rPr lang="en" sz="1800" noProof="1">
+                <a:effectLst/>
+                <a:latin typeface="Consolas" panose="020B0609020204030204" pitchFamily="49" charset="0"/>
+                <a:cs typeface="Consolas" panose="020B0609020204030204" pitchFamily="49" charset="0"/>
+              </a:rPr>
+              <a:t> </a:t>
+            </a:r>
+            <a:r>
+              <a:rPr lang="en" sz="1800" b="1" noProof="1">
+                <a:solidFill>
+                  <a:srgbClr val="0000FF"/>
+                </a:solidFill>
+                <a:effectLst/>
+                <a:latin typeface="Consolas" panose="020B0609020204030204" pitchFamily="49" charset="0"/>
+                <a:cs typeface="Consolas" panose="020B0609020204030204" pitchFamily="49" charset="0"/>
+              </a:rPr>
+              <a:t>def</a:t>
+            </a:r>
+            <a:r>
+              <a:rPr lang="en" sz="1800" noProof="1">
+                <a:effectLst/>
+                <a:latin typeface="Consolas" panose="020B0609020204030204" pitchFamily="49" charset="0"/>
+                <a:cs typeface="Consolas" panose="020B0609020204030204" pitchFamily="49" charset="0"/>
+              </a:rPr>
+              <a:t> </a:t>
+            </a:r>
+            <a:r>
+              <a:rPr lang="en" sz="1800" b="1" noProof="1">
+                <a:solidFill>
+                  <a:srgbClr val="0000A2"/>
+                </a:solidFill>
+                <a:effectLst/>
+                <a:latin typeface="Consolas" panose="020B0609020204030204" pitchFamily="49" charset="0"/>
+                <a:cs typeface="Consolas" panose="020B0609020204030204" pitchFamily="49" charset="0"/>
+              </a:rPr>
+              <a:t>main</a:t>
+            </a:r>
+            <a:r>
+              <a:rPr lang="en" sz="1800" noProof="1">
+                <a:effectLst/>
+                <a:latin typeface="Consolas" panose="020B0609020204030204" pitchFamily="49" charset="0"/>
+                <a:cs typeface="Consolas" panose="020B0609020204030204" pitchFamily="49" charset="0"/>
+              </a:rPr>
+              <a:t>(host, port):</a:t>
+            </a:r>
+            <a:br>
+              <a:rPr lang="en" sz="1800" noProof="1">
+                <a:effectLst/>
+                <a:latin typeface="Consolas" panose="020B0609020204030204" pitchFamily="49" charset="0"/>
+                <a:cs typeface="Consolas" panose="020B0609020204030204" pitchFamily="49" charset="0"/>
+              </a:rPr>
+            </a:br>
+            <a:r>
+              <a:rPr lang="en" sz="1800" noProof="1">
+                <a:effectLst/>
+                <a:latin typeface="Consolas" panose="020B0609020204030204" pitchFamily="49" charset="0"/>
+                <a:cs typeface="Consolas" panose="020B0609020204030204" pitchFamily="49" charset="0"/>
+              </a:rPr>
+              <a:t>    server </a:t>
+            </a:r>
+            <a:r>
+              <a:rPr lang="en" sz="1800" b="1" noProof="1">
+                <a:solidFill>
+                  <a:srgbClr val="0000FF"/>
+                </a:solidFill>
+                <a:effectLst/>
+                <a:latin typeface="Consolas" panose="020B0609020204030204" pitchFamily="49" charset="0"/>
+                <a:cs typeface="Consolas" panose="020B0609020204030204" pitchFamily="49" charset="0"/>
+              </a:rPr>
+              <a:t>=</a:t>
+            </a:r>
+            <a:r>
+              <a:rPr lang="en" sz="1800" noProof="1">
+                <a:effectLst/>
+                <a:latin typeface="Consolas" panose="020B0609020204030204" pitchFamily="49" charset="0"/>
+                <a:cs typeface="Consolas" panose="020B0609020204030204" pitchFamily="49" charset="0"/>
+              </a:rPr>
+              <a:t> </a:t>
+            </a:r>
+            <a:r>
+              <a:rPr lang="en" sz="1800" b="1" noProof="1">
+                <a:solidFill>
+                  <a:srgbClr val="0000FF"/>
+                </a:solidFill>
+                <a:effectLst/>
+                <a:latin typeface="Consolas" panose="020B0609020204030204" pitchFamily="49" charset="0"/>
+                <a:cs typeface="Consolas" panose="020B0609020204030204" pitchFamily="49" charset="0"/>
+              </a:rPr>
+              <a:t>await</a:t>
+            </a:r>
+            <a:r>
+              <a:rPr lang="en" sz="1800" noProof="1">
+                <a:effectLst/>
+                <a:latin typeface="Consolas" panose="020B0609020204030204" pitchFamily="49" charset="0"/>
+                <a:cs typeface="Consolas" panose="020B0609020204030204" pitchFamily="49" charset="0"/>
+              </a:rPr>
+              <a:t> asyncio.start_server(</a:t>
+            </a:r>
+            <a:br>
+              <a:rPr lang="en" sz="1800" noProof="1">
+                <a:effectLst/>
+                <a:latin typeface="Consolas" panose="020B0609020204030204" pitchFamily="49" charset="0"/>
+                <a:cs typeface="Consolas" panose="020B0609020204030204" pitchFamily="49" charset="0"/>
+              </a:rPr>
+            </a:br>
+            <a:r>
+              <a:rPr lang="en" sz="1800" noProof="1">
+                <a:effectLst/>
+                <a:latin typeface="Consolas" panose="020B0609020204030204" pitchFamily="49" charset="0"/>
+                <a:cs typeface="Consolas" panose="020B0609020204030204" pitchFamily="49" charset="0"/>
+              </a:rPr>
+              <a:t>        handle_connection, host, port</a:t>
+            </a:r>
+            <a:br>
+              <a:rPr lang="en" sz="1800" noProof="1">
+                <a:effectLst/>
+                <a:latin typeface="Consolas" panose="020B0609020204030204" pitchFamily="49" charset="0"/>
+                <a:cs typeface="Consolas" panose="020B0609020204030204" pitchFamily="49" charset="0"/>
+              </a:rPr>
+            </a:br>
+            <a:r>
+              <a:rPr lang="en" sz="1800" noProof="1">
+                <a:effectLst/>
+                <a:latin typeface="Consolas" panose="020B0609020204030204" pitchFamily="49" charset="0"/>
+                <a:cs typeface="Consolas" panose="020B0609020204030204" pitchFamily="49" charset="0"/>
+              </a:rPr>
+              <a:t>    )</a:t>
+            </a:r>
+            <a:br>
+              <a:rPr lang="en" sz="1800" noProof="1">
+                <a:effectLst/>
+                <a:latin typeface="Consolas" panose="020B0609020204030204" pitchFamily="49" charset="0"/>
+                <a:cs typeface="Consolas" panose="020B0609020204030204" pitchFamily="49" charset="0"/>
+              </a:rPr>
+            </a:br>
+            <a:r>
+              <a:rPr lang="en" sz="1800" noProof="1">
+                <a:effectLst/>
+                <a:latin typeface="Consolas" panose="020B0609020204030204" pitchFamily="49" charset="0"/>
+                <a:cs typeface="Consolas" panose="020B0609020204030204" pitchFamily="49" charset="0"/>
+              </a:rPr>
+              <a:t>    </a:t>
+            </a:r>
+            <a:r>
+              <a:rPr lang="en" sz="1800" b="1" noProof="1">
+                <a:solidFill>
+                  <a:srgbClr val="3C4C72"/>
+                </a:solidFill>
+                <a:effectLst/>
+                <a:latin typeface="Consolas" panose="020B0609020204030204" pitchFamily="49" charset="0"/>
+                <a:cs typeface="Consolas" panose="020B0609020204030204" pitchFamily="49" charset="0"/>
+              </a:rPr>
+              <a:t>print</a:t>
+            </a:r>
+            <a:r>
+              <a:rPr lang="en" sz="1800" noProof="1">
+                <a:effectLst/>
+                <a:latin typeface="Consolas" panose="020B0609020204030204" pitchFamily="49" charset="0"/>
+                <a:cs typeface="Consolas" panose="020B0609020204030204" pitchFamily="49" charset="0"/>
+              </a:rPr>
+              <a:t>(f</a:t>
+            </a:r>
+            <a:r>
+              <a:rPr lang="en" sz="1800" noProof="1">
+                <a:solidFill>
+                  <a:srgbClr val="036A07"/>
+                </a:solidFill>
+                <a:effectLst/>
+                <a:latin typeface="Consolas" panose="020B0609020204030204" pitchFamily="49" charset="0"/>
+                <a:cs typeface="Consolas" panose="020B0609020204030204" pitchFamily="49" charset="0"/>
+              </a:rPr>
+              <a:t>"Start server..."</a:t>
+            </a:r>
+            <a:r>
+              <a:rPr lang="en" sz="1800" noProof="1">
+                <a:effectLst/>
+                <a:latin typeface="Consolas" panose="020B0609020204030204" pitchFamily="49" charset="0"/>
+                <a:cs typeface="Consolas" panose="020B0609020204030204" pitchFamily="49" charset="0"/>
+              </a:rPr>
+              <a:t>)</a:t>
+            </a:r>
+            <a:br>
+              <a:rPr lang="en" sz="1800" noProof="1">
+                <a:effectLst/>
+                <a:latin typeface="Consolas" panose="020B0609020204030204" pitchFamily="49" charset="0"/>
+                <a:cs typeface="Consolas" panose="020B0609020204030204" pitchFamily="49" charset="0"/>
+              </a:rPr>
+            </a:br>
+            <a:r>
+              <a:rPr lang="en" sz="1800" noProof="1">
+                <a:effectLst/>
+                <a:latin typeface="Consolas" panose="020B0609020204030204" pitchFamily="49" charset="0"/>
+                <a:cs typeface="Consolas" panose="020B0609020204030204" pitchFamily="49" charset="0"/>
+              </a:rPr>
+              <a:t>    </a:t>
+            </a:r>
+            <a:r>
+              <a:rPr lang="en" sz="1800" b="1" noProof="1">
+                <a:solidFill>
+                  <a:srgbClr val="0000FF"/>
+                </a:solidFill>
+                <a:effectLst/>
+                <a:latin typeface="Consolas" panose="020B0609020204030204" pitchFamily="49" charset="0"/>
+                <a:cs typeface="Consolas" panose="020B0609020204030204" pitchFamily="49" charset="0"/>
+              </a:rPr>
+              <a:t>async</a:t>
+            </a:r>
+            <a:r>
+              <a:rPr lang="en" sz="1800" noProof="1">
+                <a:effectLst/>
+                <a:latin typeface="Consolas" panose="020B0609020204030204" pitchFamily="49" charset="0"/>
+                <a:cs typeface="Consolas" panose="020B0609020204030204" pitchFamily="49" charset="0"/>
+              </a:rPr>
+              <a:t> </a:t>
+            </a:r>
+            <a:r>
+              <a:rPr lang="en" sz="1800" b="1" noProof="1">
+                <a:solidFill>
+                  <a:srgbClr val="0000FF"/>
+                </a:solidFill>
+                <a:effectLst/>
+                <a:latin typeface="Consolas" panose="020B0609020204030204" pitchFamily="49" charset="0"/>
+                <a:cs typeface="Consolas" panose="020B0609020204030204" pitchFamily="49" charset="0"/>
+              </a:rPr>
+              <a:t>with</a:t>
+            </a:r>
+            <a:r>
+              <a:rPr lang="en" sz="1800" noProof="1">
+                <a:effectLst/>
+                <a:latin typeface="Consolas" panose="020B0609020204030204" pitchFamily="49" charset="0"/>
+                <a:cs typeface="Consolas" panose="020B0609020204030204" pitchFamily="49" charset="0"/>
+              </a:rPr>
+              <a:t> server:</a:t>
+            </a:r>
+            <a:br>
+              <a:rPr lang="en" sz="1800" noProof="1">
+                <a:effectLst/>
+                <a:latin typeface="Consolas" panose="020B0609020204030204" pitchFamily="49" charset="0"/>
+                <a:cs typeface="Consolas" panose="020B0609020204030204" pitchFamily="49" charset="0"/>
+              </a:rPr>
+            </a:br>
+            <a:r>
+              <a:rPr lang="en" sz="1800" noProof="1">
+                <a:effectLst/>
+                <a:latin typeface="Consolas" panose="020B0609020204030204" pitchFamily="49" charset="0"/>
+                <a:cs typeface="Consolas" panose="020B0609020204030204" pitchFamily="49" charset="0"/>
+              </a:rPr>
+              <a:t>        </a:t>
+            </a:r>
+            <a:r>
+              <a:rPr lang="en" sz="1800" b="1" noProof="1">
+                <a:solidFill>
+                  <a:srgbClr val="0000FF"/>
+                </a:solidFill>
+                <a:effectLst/>
+                <a:latin typeface="Consolas" panose="020B0609020204030204" pitchFamily="49" charset="0"/>
+                <a:cs typeface="Consolas" panose="020B0609020204030204" pitchFamily="49" charset="0"/>
+              </a:rPr>
+              <a:t>await</a:t>
+            </a:r>
+            <a:r>
+              <a:rPr lang="en" sz="1800" noProof="1">
+                <a:effectLst/>
+                <a:latin typeface="Consolas" panose="020B0609020204030204" pitchFamily="49" charset="0"/>
+                <a:cs typeface="Consolas" panose="020B0609020204030204" pitchFamily="49" charset="0"/>
+              </a:rPr>
+              <a:t> server.serve_forever()</a:t>
+            </a:r>
+            <a:br>
+              <a:rPr lang="en" sz="1800" noProof="1">
+                <a:effectLst/>
+                <a:latin typeface="Consolas" panose="020B0609020204030204" pitchFamily="49" charset="0"/>
+                <a:cs typeface="Consolas" panose="020B0609020204030204" pitchFamily="49" charset="0"/>
+              </a:rPr>
+            </a:br>
+            <a:br>
+              <a:rPr lang="en" sz="1800" noProof="1">
+                <a:effectLst/>
+                <a:latin typeface="Consolas" panose="020B0609020204030204" pitchFamily="49" charset="0"/>
+                <a:cs typeface="Consolas" panose="020B0609020204030204" pitchFamily="49" charset="0"/>
+              </a:rPr>
+            </a:br>
+            <a:r>
+              <a:rPr lang="en" sz="1800" noProof="1">
+                <a:effectLst/>
+                <a:latin typeface="Consolas" panose="020B0609020204030204" pitchFamily="49" charset="0"/>
+                <a:cs typeface="Consolas" panose="020B0609020204030204" pitchFamily="49" charset="0"/>
+              </a:rPr>
+              <a:t>asyncio.run( main(</a:t>
+            </a:r>
+            <a:r>
+              <a:rPr lang="en" sz="1800" b="1" noProof="1">
                 <a:solidFill>
                   <a:srgbClr val="C5060B"/>
                 </a:solidFill>
@@ -35308,100 +37457,18 @@
                 <a:latin typeface="Consolas" panose="020B0609020204030204" pitchFamily="49" charset="0"/>
                 <a:cs typeface="Consolas" panose="020B0609020204030204" pitchFamily="49" charset="0"/>
               </a:rPr>
-              <a:t>{addr}</a:t>
-            </a:r>
-            <a:r>
-              <a:rPr lang="en" sz="1600" noProof="1">
-                <a:solidFill>
-                  <a:srgbClr val="036A07"/>
-                </a:solidFill>
-                <a:effectLst/>
-                <a:latin typeface="Consolas" panose="020B0609020204030204" pitchFamily="49" charset="0"/>
-                <a:cs typeface="Consolas" panose="020B0609020204030204" pitchFamily="49" charset="0"/>
-              </a:rPr>
-              <a:t>"</a:t>
-            </a:r>
-            <a:r>
-              <a:rPr lang="en" sz="1600" noProof="1">
-                <a:effectLst/>
-                <a:latin typeface="Consolas" panose="020B0609020204030204" pitchFamily="49" charset="0"/>
-                <a:cs typeface="Consolas" panose="020B0609020204030204" pitchFamily="49" charset="0"/>
-              </a:rPr>
-              <a:t>)</a:t>
-            </a:r>
-            <a:br>
-              <a:rPr lang="en" sz="1600" noProof="1">
-                <a:effectLst/>
-                <a:latin typeface="Consolas" panose="020B0609020204030204" pitchFamily="49" charset="0"/>
-                <a:cs typeface="Consolas" panose="020B0609020204030204" pitchFamily="49" charset="0"/>
-              </a:rPr>
-            </a:br>
-            <a:r>
-              <a:rPr lang="en" sz="1600" noProof="1">
-                <a:effectLst/>
-                <a:latin typeface="Consolas" panose="020B0609020204030204" pitchFamily="49" charset="0"/>
-                <a:cs typeface="Consolas" panose="020B0609020204030204" pitchFamily="49" charset="0"/>
-              </a:rPr>
-              <a:t>            </a:t>
-            </a:r>
-            <a:r>
-              <a:rPr lang="en" sz="1600" b="1" noProof="1">
-                <a:solidFill>
-                  <a:srgbClr val="0000FF"/>
-                </a:solidFill>
-                <a:effectLst/>
-                <a:latin typeface="Consolas" panose="020B0609020204030204" pitchFamily="49" charset="0"/>
-                <a:cs typeface="Consolas" panose="020B0609020204030204" pitchFamily="49" charset="0"/>
-              </a:rPr>
-              <a:t>break</a:t>
-            </a:r>
-            <a:br>
-              <a:rPr lang="en" sz="1600" noProof="1">
-                <a:effectLst/>
-                <a:latin typeface="Consolas" panose="020B0609020204030204" pitchFamily="49" charset="0"/>
-                <a:cs typeface="Consolas" panose="020B0609020204030204" pitchFamily="49" charset="0"/>
-              </a:rPr>
-            </a:br>
-            <a:r>
-              <a:rPr lang="en" sz="1600" noProof="1">
-                <a:effectLst/>
-                <a:latin typeface="Consolas" panose="020B0609020204030204" pitchFamily="49" charset="0"/>
-                <a:cs typeface="Consolas" panose="020B0609020204030204" pitchFamily="49" charset="0"/>
-              </a:rPr>
-              <a:t>        </a:t>
-            </a:r>
-            <a:r>
-              <a:rPr lang="en" sz="1600" b="1" noProof="1">
-                <a:solidFill>
-                  <a:srgbClr val="3C4C72"/>
-                </a:solidFill>
-                <a:effectLst/>
-                <a:latin typeface="Consolas" panose="020B0609020204030204" pitchFamily="49" charset="0"/>
-                <a:cs typeface="Consolas" panose="020B0609020204030204" pitchFamily="49" charset="0"/>
-              </a:rPr>
-              <a:t>print</a:t>
-            </a:r>
-            <a:r>
-              <a:rPr lang="en" sz="1600" noProof="1">
-                <a:effectLst/>
-                <a:latin typeface="Consolas" panose="020B0609020204030204" pitchFamily="49" charset="0"/>
-                <a:cs typeface="Consolas" panose="020B0609020204030204" pitchFamily="49" charset="0"/>
-              </a:rPr>
-              <a:t>(f</a:t>
-            </a:r>
-            <a:r>
-              <a:rPr lang="en" sz="1600" noProof="1">
-                <a:solidFill>
-                  <a:srgbClr val="036A07"/>
-                </a:solidFill>
-                <a:effectLst/>
-                <a:latin typeface="Consolas" panose="020B0609020204030204" pitchFamily="49" charset="0"/>
-                <a:cs typeface="Consolas" panose="020B0609020204030204" pitchFamily="49" charset="0"/>
-              </a:rPr>
-              <a:t>"Received </a:t>
-            </a:r>
-            <a:r>
-              <a:rPr lang="en" sz="1600" b="1" noProof="1">
+              <a:t>HOST</a:t>
+            </a:r>
+            <a:r>
+              <a:rPr lang="en" sz="1800" noProof="1">
+                <a:effectLst/>
+                <a:latin typeface="Consolas" panose="020B0609020204030204" pitchFamily="49" charset="0"/>
+                <a:cs typeface="Consolas" panose="020B0609020204030204" pitchFamily="49" charset="0"/>
+              </a:rPr>
+              <a:t>, </a:t>
+            </a:r>
+            <a:r>
+              <a:rPr lang="en" sz="1800" b="1" noProof="1">
                 <a:solidFill>
                   <a:srgbClr val="C5060B"/>
                 </a:solidFill>
@@ -35409,1048 +37476,10 @@
                 <a:latin typeface="Consolas" panose="020B0609020204030204" pitchFamily="49" charset="0"/>
                 <a:cs typeface="Consolas" panose="020B0609020204030204" pitchFamily="49" charset="0"/>
               </a:rPr>
-              <a:t>{data}</a:t>
-            </a:r>
-            <a:r>
-              <a:rPr lang="en" sz="1600" noProof="1">
-                <a:solidFill>
-                  <a:srgbClr val="036A07"/>
-                </a:solidFill>
-                <a:effectLst/>
-                <a:latin typeface="Consolas" panose="020B0609020204030204" pitchFamily="49" charset="0"/>
-                <a:cs typeface="Consolas" panose="020B0609020204030204" pitchFamily="49" charset="0"/>
-              </a:rPr>
-              <a:t> fr </a:t>
-            </a:r>
-            <a:r>
-              <a:rPr lang="en" sz="1600" b="1" noProof="1">
-                <a:solidFill>
-                  <a:srgbClr val="C5060B"/>
-                </a:solidFill>
-                <a:effectLst/>
-                <a:latin typeface="Consolas" panose="020B0609020204030204" pitchFamily="49" charset="0"/>
-                <a:cs typeface="Consolas" panose="020B0609020204030204" pitchFamily="49" charset="0"/>
-              </a:rPr>
-              <a:t>{addr}</a:t>
-            </a:r>
-            <a:r>
-              <a:rPr lang="en" sz="1600" noProof="1">
-                <a:solidFill>
-                  <a:srgbClr val="036A07"/>
-                </a:solidFill>
-                <a:effectLst/>
-                <a:latin typeface="Consolas" panose="020B0609020204030204" pitchFamily="49" charset="0"/>
-                <a:cs typeface="Consolas" panose="020B0609020204030204" pitchFamily="49" charset="0"/>
-              </a:rPr>
-              <a:t>"</a:t>
-            </a:r>
-            <a:r>
-              <a:rPr lang="en" sz="1600" noProof="1">
-                <a:effectLst/>
-                <a:latin typeface="Consolas" panose="020B0609020204030204" pitchFamily="49" charset="0"/>
-                <a:cs typeface="Consolas" panose="020B0609020204030204" pitchFamily="49" charset="0"/>
-              </a:rPr>
-              <a:t>)</a:t>
-            </a:r>
-            <a:br>
-              <a:rPr lang="en" sz="1600" noProof="1">
-                <a:effectLst/>
-                <a:latin typeface="Consolas" panose="020B0609020204030204" pitchFamily="49" charset="0"/>
-                <a:cs typeface="Consolas" panose="020B0609020204030204" pitchFamily="49" charset="0"/>
-              </a:rPr>
-            </a:br>
-            <a:r>
-              <a:rPr lang="en" sz="1600" noProof="1">
-                <a:effectLst/>
-                <a:latin typeface="Consolas" panose="020B0609020204030204" pitchFamily="49" charset="0"/>
-                <a:cs typeface="Consolas" panose="020B0609020204030204" pitchFamily="49" charset="0"/>
-              </a:rPr>
-              <a:t>        </a:t>
-            </a:r>
-            <a:r>
-              <a:rPr lang="en" sz="1600" b="1" noProof="1">
-                <a:solidFill>
-                  <a:srgbClr val="0000FF"/>
-                </a:solidFill>
-                <a:effectLst/>
-                <a:latin typeface="Consolas" panose="020B0609020204030204" pitchFamily="49" charset="0"/>
-                <a:cs typeface="Consolas" panose="020B0609020204030204" pitchFamily="49" charset="0"/>
-              </a:rPr>
-              <a:t>if</a:t>
-            </a:r>
-            <a:r>
-              <a:rPr lang="en" sz="1600" noProof="1">
-                <a:effectLst/>
-                <a:latin typeface="Consolas" panose="020B0609020204030204" pitchFamily="49" charset="0"/>
-                <a:cs typeface="Consolas" panose="020B0609020204030204" pitchFamily="49" charset="0"/>
-              </a:rPr>
-              <a:t> </a:t>
-            </a:r>
-            <a:r>
-              <a:rPr lang="en" sz="1600" b="1" noProof="1">
-                <a:solidFill>
-                  <a:srgbClr val="0000FF"/>
-                </a:solidFill>
-                <a:effectLst/>
-                <a:latin typeface="Consolas" panose="020B0609020204030204" pitchFamily="49" charset="0"/>
-                <a:cs typeface="Consolas" panose="020B0609020204030204" pitchFamily="49" charset="0"/>
-              </a:rPr>
-              <a:t>not</a:t>
-            </a:r>
-            <a:r>
-              <a:rPr lang="en" sz="1600" noProof="1">
-                <a:effectLst/>
-                <a:latin typeface="Consolas" panose="020B0609020204030204" pitchFamily="49" charset="0"/>
-                <a:cs typeface="Consolas" panose="020B0609020204030204" pitchFamily="49" charset="0"/>
-              </a:rPr>
-              <a:t> data:</a:t>
-            </a:r>
-            <a:br>
-              <a:rPr lang="en" sz="1600" noProof="1">
-                <a:effectLst/>
-                <a:latin typeface="Consolas" panose="020B0609020204030204" pitchFamily="49" charset="0"/>
-                <a:cs typeface="Consolas" panose="020B0609020204030204" pitchFamily="49" charset="0"/>
-              </a:rPr>
-            </a:br>
-            <a:r>
-              <a:rPr lang="en" sz="1600" noProof="1">
-                <a:effectLst/>
-                <a:latin typeface="Consolas" panose="020B0609020204030204" pitchFamily="49" charset="0"/>
-                <a:cs typeface="Consolas" panose="020B0609020204030204" pitchFamily="49" charset="0"/>
-              </a:rPr>
-              <a:t>            </a:t>
-            </a:r>
-            <a:r>
-              <a:rPr lang="en" sz="1600" b="1" noProof="1">
-                <a:solidFill>
-                  <a:srgbClr val="0000FF"/>
-                </a:solidFill>
-                <a:effectLst/>
-                <a:latin typeface="Consolas" panose="020B0609020204030204" pitchFamily="49" charset="0"/>
-                <a:cs typeface="Consolas" panose="020B0609020204030204" pitchFamily="49" charset="0"/>
-              </a:rPr>
-              <a:t>break</a:t>
-            </a:r>
-            <a:br>
-              <a:rPr lang="en" sz="1600" noProof="1">
-                <a:effectLst/>
-                <a:latin typeface="Consolas" panose="020B0609020204030204" pitchFamily="49" charset="0"/>
-                <a:cs typeface="Consolas" panose="020B0609020204030204" pitchFamily="49" charset="0"/>
-              </a:rPr>
-            </a:br>
-            <a:r>
-              <a:rPr lang="en" sz="1600" noProof="1">
-                <a:effectLst/>
-                <a:latin typeface="Consolas" panose="020B0609020204030204" pitchFamily="49" charset="0"/>
-                <a:cs typeface="Consolas" panose="020B0609020204030204" pitchFamily="49" charset="0"/>
-              </a:rPr>
-              <a:t>        </a:t>
-            </a:r>
-            <a:r>
-              <a:rPr lang="en" sz="1600" noProof="1">
-                <a:solidFill>
-                  <a:srgbClr val="0066FF"/>
-                </a:solidFill>
-                <a:effectLst/>
-                <a:latin typeface="Consolas" panose="020B0609020204030204" pitchFamily="49" charset="0"/>
-                <a:cs typeface="Consolas" panose="020B0609020204030204" pitchFamily="49" charset="0"/>
-              </a:rPr>
-              <a:t># Process</a:t>
-            </a:r>
-            <a:br>
-              <a:rPr lang="en" sz="1600" noProof="1">
-                <a:solidFill>
-                  <a:srgbClr val="0066FF"/>
-                </a:solidFill>
-                <a:effectLst/>
-                <a:latin typeface="Consolas" panose="020B0609020204030204" pitchFamily="49" charset="0"/>
-                <a:cs typeface="Consolas" panose="020B0609020204030204" pitchFamily="49" charset="0"/>
-              </a:rPr>
-            </a:br>
-            <a:r>
-              <a:rPr lang="en" sz="1600" noProof="1">
-                <a:effectLst/>
-                <a:latin typeface="Consolas" panose="020B0609020204030204" pitchFamily="49" charset="0"/>
-                <a:cs typeface="Consolas" panose="020B0609020204030204" pitchFamily="49" charset="0"/>
-              </a:rPr>
-              <a:t>        </a:t>
-            </a:r>
-            <a:r>
-              <a:rPr lang="en" sz="1600" b="1" noProof="1">
-                <a:solidFill>
-                  <a:srgbClr val="0000FF"/>
-                </a:solidFill>
-                <a:effectLst/>
-                <a:latin typeface="Consolas" panose="020B0609020204030204" pitchFamily="49" charset="0"/>
-                <a:cs typeface="Consolas" panose="020B0609020204030204" pitchFamily="49" charset="0"/>
-              </a:rPr>
-              <a:t>if</a:t>
-            </a:r>
-            <a:r>
-              <a:rPr lang="en" sz="1600" noProof="1">
-                <a:effectLst/>
-                <a:latin typeface="Consolas" panose="020B0609020204030204" pitchFamily="49" charset="0"/>
-                <a:cs typeface="Consolas" panose="020B0609020204030204" pitchFamily="49" charset="0"/>
-              </a:rPr>
-              <a:t> data </a:t>
-            </a:r>
-            <a:r>
-              <a:rPr lang="en" sz="1600" b="1" noProof="1">
-                <a:solidFill>
-                  <a:srgbClr val="0000FF"/>
-                </a:solidFill>
-                <a:effectLst/>
-                <a:latin typeface="Consolas" panose="020B0609020204030204" pitchFamily="49" charset="0"/>
-                <a:cs typeface="Consolas" panose="020B0609020204030204" pitchFamily="49" charset="0"/>
-              </a:rPr>
-              <a:t>==</a:t>
-            </a:r>
-            <a:r>
-              <a:rPr lang="en" sz="1600" noProof="1">
-                <a:effectLst/>
-                <a:latin typeface="Consolas" panose="020B0609020204030204" pitchFamily="49" charset="0"/>
-                <a:cs typeface="Consolas" panose="020B0609020204030204" pitchFamily="49" charset="0"/>
-              </a:rPr>
-              <a:t> </a:t>
-            </a:r>
-            <a:r>
-              <a:rPr lang="en" sz="1600" b="1" noProof="1">
-                <a:solidFill>
-                  <a:srgbClr val="0000FF"/>
-                </a:solidFill>
-                <a:effectLst/>
-                <a:latin typeface="Consolas" panose="020B0609020204030204" pitchFamily="49" charset="0"/>
-                <a:cs typeface="Consolas" panose="020B0609020204030204" pitchFamily="49" charset="0"/>
-              </a:rPr>
-              <a:t>b</a:t>
-            </a:r>
-            <a:r>
-              <a:rPr lang="en" sz="1600" noProof="1">
-                <a:solidFill>
-                  <a:srgbClr val="036A07"/>
-                </a:solidFill>
-                <a:effectLst/>
-                <a:latin typeface="Consolas" panose="020B0609020204030204" pitchFamily="49" charset="0"/>
-                <a:cs typeface="Consolas" panose="020B0609020204030204" pitchFamily="49" charset="0"/>
-              </a:rPr>
-              <a:t>"close"</a:t>
-            </a:r>
-            <a:r>
-              <a:rPr lang="en" sz="1600" noProof="1">
-                <a:effectLst/>
-                <a:latin typeface="Consolas" panose="020B0609020204030204" pitchFamily="49" charset="0"/>
-                <a:cs typeface="Consolas" panose="020B0609020204030204" pitchFamily="49" charset="0"/>
-              </a:rPr>
-              <a:t>:</a:t>
-            </a:r>
-            <a:br>
-              <a:rPr lang="en" sz="1600" noProof="1">
-                <a:effectLst/>
-                <a:latin typeface="Consolas" panose="020B0609020204030204" pitchFamily="49" charset="0"/>
-                <a:cs typeface="Consolas" panose="020B0609020204030204" pitchFamily="49" charset="0"/>
-              </a:rPr>
-            </a:br>
-            <a:r>
-              <a:rPr lang="en" sz="1600" noProof="1">
-                <a:effectLst/>
-                <a:latin typeface="Consolas" panose="020B0609020204030204" pitchFamily="49" charset="0"/>
-                <a:cs typeface="Consolas" panose="020B0609020204030204" pitchFamily="49" charset="0"/>
-              </a:rPr>
-              <a:t>            </a:t>
-            </a:r>
-            <a:r>
-              <a:rPr lang="en" sz="1600" b="1" noProof="1">
-                <a:solidFill>
-                  <a:srgbClr val="0000FF"/>
-                </a:solidFill>
-                <a:effectLst/>
-                <a:latin typeface="Consolas" panose="020B0609020204030204" pitchFamily="49" charset="0"/>
-                <a:cs typeface="Consolas" panose="020B0609020204030204" pitchFamily="49" charset="0"/>
-              </a:rPr>
-              <a:t>break</a:t>
-            </a:r>
-            <a:br>
-              <a:rPr lang="en" sz="1600" noProof="1">
-                <a:effectLst/>
-                <a:latin typeface="Consolas" panose="020B0609020204030204" pitchFamily="49" charset="0"/>
-                <a:cs typeface="Consolas" panose="020B0609020204030204" pitchFamily="49" charset="0"/>
-              </a:rPr>
-            </a:br>
-            <a:r>
-              <a:rPr lang="en" sz="1600" noProof="1">
-                <a:effectLst/>
-                <a:latin typeface="Consolas" panose="020B0609020204030204" pitchFamily="49" charset="0"/>
-                <a:cs typeface="Consolas" panose="020B0609020204030204" pitchFamily="49" charset="0"/>
-              </a:rPr>
-              <a:t>        data </a:t>
-            </a:r>
-            <a:r>
-              <a:rPr lang="en" sz="1600" b="1" noProof="1">
-                <a:solidFill>
-                  <a:srgbClr val="0000FF"/>
-                </a:solidFill>
-                <a:effectLst/>
-                <a:latin typeface="Consolas" panose="020B0609020204030204" pitchFamily="49" charset="0"/>
-                <a:cs typeface="Consolas" panose="020B0609020204030204" pitchFamily="49" charset="0"/>
-              </a:rPr>
-              <a:t>=</a:t>
-            </a:r>
-            <a:r>
-              <a:rPr lang="en" sz="1600" noProof="1">
-                <a:effectLst/>
-                <a:latin typeface="Consolas" panose="020B0609020204030204" pitchFamily="49" charset="0"/>
-                <a:cs typeface="Consolas" panose="020B0609020204030204" pitchFamily="49" charset="0"/>
-              </a:rPr>
-              <a:t> data.upper()</a:t>
-            </a:r>
-            <a:br>
-              <a:rPr lang="en" sz="1600" noProof="1">
-                <a:effectLst/>
-                <a:latin typeface="Consolas" panose="020B0609020204030204" pitchFamily="49" charset="0"/>
-                <a:cs typeface="Consolas" panose="020B0609020204030204" pitchFamily="49" charset="0"/>
-              </a:rPr>
-            </a:br>
-            <a:r>
-              <a:rPr lang="en" sz="1600" noProof="1">
-                <a:effectLst/>
-                <a:latin typeface="Consolas" panose="020B0609020204030204" pitchFamily="49" charset="0"/>
-                <a:cs typeface="Consolas" panose="020B0609020204030204" pitchFamily="49" charset="0"/>
-              </a:rPr>
-              <a:t>        </a:t>
-            </a:r>
-            <a:r>
-              <a:rPr lang="en" sz="1600" noProof="1">
-                <a:solidFill>
-                  <a:srgbClr val="0066FF"/>
-                </a:solidFill>
-                <a:effectLst/>
-                <a:latin typeface="Consolas" panose="020B0609020204030204" pitchFamily="49" charset="0"/>
-                <a:cs typeface="Consolas" panose="020B0609020204030204" pitchFamily="49" charset="0"/>
-              </a:rPr>
-              <a:t># Send</a:t>
-            </a:r>
-            <a:br>
-              <a:rPr lang="en" sz="1600" noProof="1">
-                <a:solidFill>
-                  <a:srgbClr val="0066FF"/>
-                </a:solidFill>
-                <a:effectLst/>
-                <a:latin typeface="Consolas" panose="020B0609020204030204" pitchFamily="49" charset="0"/>
-                <a:cs typeface="Consolas" panose="020B0609020204030204" pitchFamily="49" charset="0"/>
-              </a:rPr>
-            </a:br>
-            <a:r>
-              <a:rPr lang="en" sz="1600" noProof="1">
-                <a:effectLst/>
-                <a:latin typeface="Consolas" panose="020B0609020204030204" pitchFamily="49" charset="0"/>
-                <a:cs typeface="Consolas" panose="020B0609020204030204" pitchFamily="49" charset="0"/>
-              </a:rPr>
-              <a:t>        </a:t>
-            </a:r>
-            <a:r>
-              <a:rPr lang="en" sz="1600" b="1" noProof="1">
-                <a:solidFill>
-                  <a:srgbClr val="3C4C72"/>
-                </a:solidFill>
-                <a:effectLst/>
-                <a:latin typeface="Consolas" panose="020B0609020204030204" pitchFamily="49" charset="0"/>
-                <a:cs typeface="Consolas" panose="020B0609020204030204" pitchFamily="49" charset="0"/>
-              </a:rPr>
-              <a:t>print</a:t>
-            </a:r>
-            <a:r>
-              <a:rPr lang="en" sz="1600" noProof="1">
-                <a:effectLst/>
-                <a:latin typeface="Consolas" panose="020B0609020204030204" pitchFamily="49" charset="0"/>
-                <a:cs typeface="Consolas" panose="020B0609020204030204" pitchFamily="49" charset="0"/>
-              </a:rPr>
-              <a:t>(f</a:t>
-            </a:r>
-            <a:r>
-              <a:rPr lang="en" sz="1600" noProof="1">
-                <a:solidFill>
-                  <a:srgbClr val="036A07"/>
-                </a:solidFill>
-                <a:effectLst/>
-                <a:latin typeface="Consolas" panose="020B0609020204030204" pitchFamily="49" charset="0"/>
-                <a:cs typeface="Consolas" panose="020B0609020204030204" pitchFamily="49" charset="0"/>
-              </a:rPr>
-              <a:t>"Send: </a:t>
-            </a:r>
-            <a:r>
-              <a:rPr lang="en" sz="1600" b="1" noProof="1">
-                <a:solidFill>
-                  <a:srgbClr val="C5060B"/>
-                </a:solidFill>
-                <a:effectLst/>
-                <a:latin typeface="Consolas" panose="020B0609020204030204" pitchFamily="49" charset="0"/>
-                <a:cs typeface="Consolas" panose="020B0609020204030204" pitchFamily="49" charset="0"/>
-              </a:rPr>
-              <a:t>{data}</a:t>
-            </a:r>
-            <a:r>
-              <a:rPr lang="en" sz="1600" noProof="1">
-                <a:solidFill>
-                  <a:srgbClr val="036A07"/>
-                </a:solidFill>
-                <a:effectLst/>
-                <a:latin typeface="Consolas" panose="020B0609020204030204" pitchFamily="49" charset="0"/>
-                <a:cs typeface="Consolas" panose="020B0609020204030204" pitchFamily="49" charset="0"/>
-              </a:rPr>
-              <a:t> to: </a:t>
-            </a:r>
-            <a:r>
-              <a:rPr lang="en" sz="1600" b="1" noProof="1">
-                <a:solidFill>
-                  <a:srgbClr val="C5060B"/>
-                </a:solidFill>
-                <a:effectLst/>
-                <a:latin typeface="Consolas" panose="020B0609020204030204" pitchFamily="49" charset="0"/>
-                <a:cs typeface="Consolas" panose="020B0609020204030204" pitchFamily="49" charset="0"/>
-              </a:rPr>
-              <a:t>{addr}</a:t>
-            </a:r>
-            <a:r>
-              <a:rPr lang="en" sz="1600" noProof="1">
-                <a:solidFill>
-                  <a:srgbClr val="036A07"/>
-                </a:solidFill>
-                <a:effectLst/>
-                <a:latin typeface="Consolas" panose="020B0609020204030204" pitchFamily="49" charset="0"/>
-                <a:cs typeface="Consolas" panose="020B0609020204030204" pitchFamily="49" charset="0"/>
-              </a:rPr>
-              <a:t>"</a:t>
-            </a:r>
-            <a:r>
-              <a:rPr lang="en" sz="1600" noProof="1">
-                <a:effectLst/>
-                <a:latin typeface="Consolas" panose="020B0609020204030204" pitchFamily="49" charset="0"/>
-                <a:cs typeface="Consolas" panose="020B0609020204030204" pitchFamily="49" charset="0"/>
-              </a:rPr>
-              <a:t>)</a:t>
-            </a:r>
-            <a:br>
-              <a:rPr lang="en" sz="1600" noProof="1">
-                <a:effectLst/>
-                <a:latin typeface="Consolas" panose="020B0609020204030204" pitchFamily="49" charset="0"/>
-                <a:cs typeface="Consolas" panose="020B0609020204030204" pitchFamily="49" charset="0"/>
-              </a:rPr>
-            </a:br>
-            <a:r>
-              <a:rPr lang="en" sz="1600" noProof="1">
-                <a:effectLst/>
-                <a:latin typeface="Consolas" panose="020B0609020204030204" pitchFamily="49" charset="0"/>
-                <a:cs typeface="Consolas" panose="020B0609020204030204" pitchFamily="49" charset="0"/>
-              </a:rPr>
-              <a:t>        </a:t>
-            </a:r>
-            <a:r>
-              <a:rPr lang="en" sz="1600" b="1" noProof="1">
-                <a:solidFill>
-                  <a:srgbClr val="0000FF"/>
-                </a:solidFill>
-                <a:effectLst/>
-                <a:latin typeface="Consolas" panose="020B0609020204030204" pitchFamily="49" charset="0"/>
-                <a:cs typeface="Consolas" panose="020B0609020204030204" pitchFamily="49" charset="0"/>
-              </a:rPr>
-              <a:t>try</a:t>
-            </a:r>
-            <a:r>
-              <a:rPr lang="en" sz="1600" noProof="1">
-                <a:effectLst/>
-                <a:latin typeface="Consolas" panose="020B0609020204030204" pitchFamily="49" charset="0"/>
-                <a:cs typeface="Consolas" panose="020B0609020204030204" pitchFamily="49" charset="0"/>
-              </a:rPr>
-              <a:t>:</a:t>
-            </a:r>
-            <a:br>
-              <a:rPr lang="en" sz="1600" noProof="1">
-                <a:effectLst/>
-                <a:latin typeface="Consolas" panose="020B0609020204030204" pitchFamily="49" charset="0"/>
-                <a:cs typeface="Consolas" panose="020B0609020204030204" pitchFamily="49" charset="0"/>
-              </a:rPr>
-            </a:br>
-            <a:r>
-              <a:rPr lang="en" sz="1600" noProof="1">
-                <a:effectLst/>
-                <a:latin typeface="Consolas" panose="020B0609020204030204" pitchFamily="49" charset="0"/>
-                <a:cs typeface="Consolas" panose="020B0609020204030204" pitchFamily="49" charset="0"/>
-              </a:rPr>
-              <a:t>            writer.write(data)  </a:t>
-            </a:r>
-            <a:r>
-              <a:rPr lang="en" sz="1600" noProof="1">
-                <a:solidFill>
-                  <a:srgbClr val="0066FF"/>
-                </a:solidFill>
-                <a:effectLst/>
-                <a:latin typeface="Consolas" panose="020B0609020204030204" pitchFamily="49" charset="0"/>
-                <a:cs typeface="Consolas" panose="020B0609020204030204" pitchFamily="49" charset="0"/>
-              </a:rPr>
-              <a:t># New</a:t>
-            </a:r>
-            <a:br>
-              <a:rPr lang="en" sz="1600" noProof="1">
-                <a:solidFill>
-                  <a:srgbClr val="0066FF"/>
-                </a:solidFill>
-                <a:effectLst/>
-                <a:latin typeface="Consolas" panose="020B0609020204030204" pitchFamily="49" charset="0"/>
-                <a:cs typeface="Consolas" panose="020B0609020204030204" pitchFamily="49" charset="0"/>
-              </a:rPr>
-            </a:br>
-            <a:r>
-              <a:rPr lang="en" sz="1600" noProof="1">
-                <a:effectLst/>
-                <a:latin typeface="Consolas" panose="020B0609020204030204" pitchFamily="49" charset="0"/>
-                <a:cs typeface="Consolas" panose="020B0609020204030204" pitchFamily="49" charset="0"/>
-              </a:rPr>
-              <a:t>            </a:t>
-            </a:r>
-            <a:r>
-              <a:rPr lang="en" sz="1600" b="1" noProof="1">
-                <a:solidFill>
-                  <a:srgbClr val="0000FF"/>
-                </a:solidFill>
-                <a:effectLst/>
-                <a:latin typeface="Consolas" panose="020B0609020204030204" pitchFamily="49" charset="0"/>
-                <a:cs typeface="Consolas" panose="020B0609020204030204" pitchFamily="49" charset="0"/>
-              </a:rPr>
-              <a:t>await</a:t>
-            </a:r>
-            <a:r>
-              <a:rPr lang="en" sz="1600" noProof="1">
-                <a:effectLst/>
-                <a:latin typeface="Consolas" panose="020B0609020204030204" pitchFamily="49" charset="0"/>
-                <a:cs typeface="Consolas" panose="020B0609020204030204" pitchFamily="49" charset="0"/>
-              </a:rPr>
-              <a:t> writer.drain()</a:t>
-            </a:r>
-            <a:br>
-              <a:rPr lang="en" sz="1600" noProof="1">
-                <a:effectLst/>
-                <a:latin typeface="Consolas" panose="020B0609020204030204" pitchFamily="49" charset="0"/>
-                <a:cs typeface="Consolas" panose="020B0609020204030204" pitchFamily="49" charset="0"/>
-              </a:rPr>
-            </a:br>
-            <a:r>
-              <a:rPr lang="en" sz="1600" noProof="1">
-                <a:effectLst/>
-                <a:latin typeface="Consolas" panose="020B0609020204030204" pitchFamily="49" charset="0"/>
-                <a:cs typeface="Consolas" panose="020B0609020204030204" pitchFamily="49" charset="0"/>
-              </a:rPr>
-              <a:t>        </a:t>
-            </a:r>
-            <a:r>
-              <a:rPr lang="en" sz="1600" b="1" noProof="1">
-                <a:solidFill>
-                  <a:srgbClr val="0000FF"/>
-                </a:solidFill>
-                <a:effectLst/>
-                <a:latin typeface="Consolas" panose="020B0609020204030204" pitchFamily="49" charset="0"/>
-                <a:cs typeface="Consolas" panose="020B0609020204030204" pitchFamily="49" charset="0"/>
-              </a:rPr>
-              <a:t>except</a:t>
-            </a:r>
-            <a:r>
-              <a:rPr lang="en" sz="1600" noProof="1">
-                <a:effectLst/>
-                <a:latin typeface="Consolas" panose="020B0609020204030204" pitchFamily="49" charset="0"/>
-                <a:cs typeface="Consolas" panose="020B0609020204030204" pitchFamily="49" charset="0"/>
-              </a:rPr>
-              <a:t> </a:t>
-            </a:r>
-            <a:r>
-              <a:rPr lang="en" sz="1600" b="1" noProof="1">
-                <a:solidFill>
-                  <a:srgbClr val="6D79DE"/>
-                </a:solidFill>
-                <a:effectLst/>
-                <a:latin typeface="Consolas" panose="020B0609020204030204" pitchFamily="49" charset="0"/>
-                <a:cs typeface="Consolas" panose="020B0609020204030204" pitchFamily="49" charset="0"/>
-              </a:rPr>
-              <a:t>ConnectionError</a:t>
-            </a:r>
-            <a:r>
-              <a:rPr lang="en" sz="1600" noProof="1">
-                <a:effectLst/>
-                <a:latin typeface="Consolas" panose="020B0609020204030204" pitchFamily="49" charset="0"/>
-                <a:cs typeface="Consolas" panose="020B0609020204030204" pitchFamily="49" charset="0"/>
-              </a:rPr>
-              <a:t>:</a:t>
-            </a:r>
-            <a:br>
-              <a:rPr lang="en" sz="1600" noProof="1">
-                <a:effectLst/>
-                <a:latin typeface="Consolas" panose="020B0609020204030204" pitchFamily="49" charset="0"/>
-                <a:cs typeface="Consolas" panose="020B0609020204030204" pitchFamily="49" charset="0"/>
-              </a:rPr>
-            </a:br>
-            <a:r>
-              <a:rPr lang="en" sz="1600" noProof="1">
-                <a:effectLst/>
-                <a:latin typeface="Consolas" panose="020B0609020204030204" pitchFamily="49" charset="0"/>
-                <a:cs typeface="Consolas" panose="020B0609020204030204" pitchFamily="49" charset="0"/>
-              </a:rPr>
-              <a:t>            </a:t>
-            </a:r>
-            <a:r>
-              <a:rPr lang="en" sz="1600" b="1" noProof="1">
-                <a:solidFill>
-                  <a:srgbClr val="3C4C72"/>
-                </a:solidFill>
-                <a:effectLst/>
-                <a:latin typeface="Consolas" panose="020B0609020204030204" pitchFamily="49" charset="0"/>
-                <a:cs typeface="Consolas" panose="020B0609020204030204" pitchFamily="49" charset="0"/>
-              </a:rPr>
-              <a:t>print</a:t>
-            </a:r>
-            <a:r>
-              <a:rPr lang="en" sz="1600" noProof="1">
-                <a:effectLst/>
-                <a:latin typeface="Consolas" panose="020B0609020204030204" pitchFamily="49" charset="0"/>
-                <a:cs typeface="Consolas" panose="020B0609020204030204" pitchFamily="49" charset="0"/>
-              </a:rPr>
-              <a:t>(f</a:t>
-            </a:r>
-            <a:r>
-              <a:rPr lang="en" sz="1600" noProof="1">
-                <a:solidFill>
-                  <a:srgbClr val="036A07"/>
-                </a:solidFill>
-                <a:effectLst/>
-                <a:latin typeface="Consolas" panose="020B0609020204030204" pitchFamily="49" charset="0"/>
-                <a:cs typeface="Consolas" panose="020B0609020204030204" pitchFamily="49" charset="0"/>
-              </a:rPr>
-              <a:t>"Client suddenly closed, cannot send"</a:t>
-            </a:r>
-            <a:r>
-              <a:rPr lang="en" sz="1600" noProof="1">
-                <a:effectLst/>
-                <a:latin typeface="Consolas" panose="020B0609020204030204" pitchFamily="49" charset="0"/>
-                <a:cs typeface="Consolas" panose="020B0609020204030204" pitchFamily="49" charset="0"/>
-              </a:rPr>
-              <a:t>)</a:t>
-            </a:r>
-            <a:br>
-              <a:rPr lang="en" sz="1600" noProof="1">
-                <a:effectLst/>
-                <a:latin typeface="Consolas" panose="020B0609020204030204" pitchFamily="49" charset="0"/>
-                <a:cs typeface="Consolas" panose="020B0609020204030204" pitchFamily="49" charset="0"/>
-              </a:rPr>
-            </a:br>
-            <a:r>
-              <a:rPr lang="en" sz="1600" noProof="1">
-                <a:effectLst/>
-                <a:latin typeface="Consolas" panose="020B0609020204030204" pitchFamily="49" charset="0"/>
-                <a:cs typeface="Consolas" panose="020B0609020204030204" pitchFamily="49" charset="0"/>
-              </a:rPr>
-              <a:t>            </a:t>
-            </a:r>
-            <a:r>
-              <a:rPr lang="en" sz="1600" b="1" noProof="1">
-                <a:solidFill>
-                  <a:srgbClr val="0000FF"/>
-                </a:solidFill>
-                <a:effectLst/>
-                <a:latin typeface="Consolas" panose="020B0609020204030204" pitchFamily="49" charset="0"/>
-                <a:cs typeface="Consolas" panose="020B0609020204030204" pitchFamily="49" charset="0"/>
-              </a:rPr>
-              <a:t>break</a:t>
-            </a:r>
-            <a:br>
-              <a:rPr lang="en" sz="1600" noProof="1">
-                <a:effectLst/>
-                <a:latin typeface="Consolas" panose="020B0609020204030204" pitchFamily="49" charset="0"/>
-                <a:cs typeface="Consolas" panose="020B0609020204030204" pitchFamily="49" charset="0"/>
-              </a:rPr>
-            </a:br>
-            <a:r>
-              <a:rPr lang="en" sz="1600" noProof="1">
-                <a:effectLst/>
-                <a:latin typeface="Consolas" panose="020B0609020204030204" pitchFamily="49" charset="0"/>
-                <a:cs typeface="Consolas" panose="020B0609020204030204" pitchFamily="49" charset="0"/>
-              </a:rPr>
-              <a:t>    writer.close()</a:t>
-            </a:r>
-            <a:br>
-              <a:rPr lang="en" sz="1600" noProof="1">
-                <a:effectLst/>
-                <a:latin typeface="Consolas" panose="020B0609020204030204" pitchFamily="49" charset="0"/>
-                <a:cs typeface="Consolas" panose="020B0609020204030204" pitchFamily="49" charset="0"/>
-              </a:rPr>
-            </a:br>
-            <a:r>
-              <a:rPr lang="en" sz="1600" noProof="1">
-                <a:effectLst/>
-                <a:latin typeface="Consolas" panose="020B0609020204030204" pitchFamily="49" charset="0"/>
-                <a:cs typeface="Consolas" panose="020B0609020204030204" pitchFamily="49" charset="0"/>
-              </a:rPr>
-              <a:t>    </a:t>
-            </a:r>
-            <a:r>
-              <a:rPr lang="en" sz="1600" b="1" noProof="1">
-                <a:solidFill>
-                  <a:srgbClr val="3C4C72"/>
-                </a:solidFill>
-                <a:effectLst/>
-                <a:latin typeface="Consolas" panose="020B0609020204030204" pitchFamily="49" charset="0"/>
-                <a:cs typeface="Consolas" panose="020B0609020204030204" pitchFamily="49" charset="0"/>
-              </a:rPr>
-              <a:t>print</a:t>
-            </a:r>
-            <a:r>
-              <a:rPr lang="en" sz="1600" noProof="1">
-                <a:effectLst/>
-                <a:latin typeface="Consolas" panose="020B0609020204030204" pitchFamily="49" charset="0"/>
-                <a:cs typeface="Consolas" panose="020B0609020204030204" pitchFamily="49" charset="0"/>
-              </a:rPr>
-              <a:t>(</a:t>
-            </a:r>
-            <a:r>
-              <a:rPr lang="en" sz="1600" noProof="1">
-                <a:solidFill>
-                  <a:srgbClr val="036A07"/>
-                </a:solidFill>
-                <a:effectLst/>
-                <a:latin typeface="Consolas" panose="020B0609020204030204" pitchFamily="49" charset="0"/>
-                <a:cs typeface="Consolas" panose="020B0609020204030204" pitchFamily="49" charset="0"/>
-              </a:rPr>
-              <a:t>"Disconnected by"</a:t>
-            </a:r>
-            <a:r>
-              <a:rPr lang="en" sz="1600" noProof="1">
-                <a:effectLst/>
-                <a:latin typeface="Consolas" panose="020B0609020204030204" pitchFamily="49" charset="0"/>
-                <a:cs typeface="Consolas" panose="020B0609020204030204" pitchFamily="49" charset="0"/>
-              </a:rPr>
-              <a:t>, addr)</a:t>
-            </a:r>
-            <a:br>
-              <a:rPr lang="en" sz="1600" noProof="1">
-                <a:effectLst/>
-                <a:latin typeface="Consolas" panose="020B0609020204030204" pitchFamily="49" charset="0"/>
-                <a:cs typeface="Consolas" panose="020B0609020204030204" pitchFamily="49" charset="0"/>
-              </a:rPr>
-            </a:br>
-            <a:br>
-              <a:rPr lang="en" sz="1600" noProof="1">
-                <a:effectLst/>
-                <a:latin typeface="Consolas" panose="020B0609020204030204" pitchFamily="49" charset="0"/>
-                <a:cs typeface="Consolas" panose="020B0609020204030204" pitchFamily="49" charset="0"/>
-              </a:rPr>
-            </a:br>
-            <a:br>
-              <a:rPr lang="en" sz="1600" noProof="1">
-                <a:effectLst/>
-                <a:latin typeface="Consolas" panose="020B0609020204030204" pitchFamily="49" charset="0"/>
-                <a:cs typeface="Consolas" panose="020B0609020204030204" pitchFamily="49" charset="0"/>
-              </a:rPr>
-            </a:br>
-            <a:r>
-              <a:rPr lang="en" sz="1600" b="1" noProof="1">
-                <a:solidFill>
-                  <a:srgbClr val="0000FF"/>
-                </a:solidFill>
-                <a:effectLst/>
-                <a:latin typeface="Consolas" panose="020B0609020204030204" pitchFamily="49" charset="0"/>
-                <a:cs typeface="Consolas" panose="020B0609020204030204" pitchFamily="49" charset="0"/>
-              </a:rPr>
-              <a:t>async</a:t>
-            </a:r>
-            <a:r>
-              <a:rPr lang="en" sz="1600" noProof="1">
-                <a:effectLst/>
-                <a:latin typeface="Consolas" panose="020B0609020204030204" pitchFamily="49" charset="0"/>
-                <a:cs typeface="Consolas" panose="020B0609020204030204" pitchFamily="49" charset="0"/>
-              </a:rPr>
-              <a:t> </a:t>
-            </a:r>
-            <a:r>
-              <a:rPr lang="en" sz="1600" b="1" noProof="1">
-                <a:solidFill>
-                  <a:srgbClr val="0000FF"/>
-                </a:solidFill>
-                <a:effectLst/>
-                <a:latin typeface="Consolas" panose="020B0609020204030204" pitchFamily="49" charset="0"/>
-                <a:cs typeface="Consolas" panose="020B0609020204030204" pitchFamily="49" charset="0"/>
-              </a:rPr>
-              <a:t>def</a:t>
-            </a:r>
-            <a:r>
-              <a:rPr lang="en" sz="1600" noProof="1">
-                <a:effectLst/>
-                <a:latin typeface="Consolas" panose="020B0609020204030204" pitchFamily="49" charset="0"/>
-                <a:cs typeface="Consolas" panose="020B0609020204030204" pitchFamily="49" charset="0"/>
-              </a:rPr>
-              <a:t> </a:t>
-            </a:r>
-            <a:r>
-              <a:rPr lang="en" sz="1600" b="1" noProof="1">
-                <a:solidFill>
-                  <a:srgbClr val="0000A2"/>
-                </a:solidFill>
-                <a:effectLst/>
-                <a:latin typeface="Consolas" panose="020B0609020204030204" pitchFamily="49" charset="0"/>
-                <a:cs typeface="Consolas" panose="020B0609020204030204" pitchFamily="49" charset="0"/>
-              </a:rPr>
-              <a:t>main</a:t>
-            </a:r>
-            <a:r>
-              <a:rPr lang="en" sz="1600" noProof="1">
-                <a:effectLst/>
-                <a:latin typeface="Consolas" panose="020B0609020204030204" pitchFamily="49" charset="0"/>
-                <a:cs typeface="Consolas" panose="020B0609020204030204" pitchFamily="49" charset="0"/>
-              </a:rPr>
-              <a:t>(host, port):</a:t>
-            </a:r>
-            <a:br>
-              <a:rPr lang="en" sz="1600" noProof="1">
-                <a:effectLst/>
-                <a:latin typeface="Consolas" panose="020B0609020204030204" pitchFamily="49" charset="0"/>
-                <a:cs typeface="Consolas" panose="020B0609020204030204" pitchFamily="49" charset="0"/>
-              </a:rPr>
-            </a:br>
-            <a:r>
-              <a:rPr lang="en" sz="1600" noProof="1">
-                <a:effectLst/>
-                <a:latin typeface="Consolas" panose="020B0609020204030204" pitchFamily="49" charset="0"/>
-                <a:cs typeface="Consolas" panose="020B0609020204030204" pitchFamily="49" charset="0"/>
-              </a:rPr>
-              <a:t>    server </a:t>
-            </a:r>
-            <a:r>
-              <a:rPr lang="en" sz="1600" b="1" noProof="1">
-                <a:solidFill>
-                  <a:srgbClr val="0000FF"/>
-                </a:solidFill>
-                <a:effectLst/>
-                <a:latin typeface="Consolas" panose="020B0609020204030204" pitchFamily="49" charset="0"/>
-                <a:cs typeface="Consolas" panose="020B0609020204030204" pitchFamily="49" charset="0"/>
-              </a:rPr>
-              <a:t>=</a:t>
-            </a:r>
-            <a:r>
-              <a:rPr lang="en" sz="1600" noProof="1">
-                <a:effectLst/>
-                <a:latin typeface="Consolas" panose="020B0609020204030204" pitchFamily="49" charset="0"/>
-                <a:cs typeface="Consolas" panose="020B0609020204030204" pitchFamily="49" charset="0"/>
-              </a:rPr>
-              <a:t> </a:t>
-            </a:r>
-            <a:r>
-              <a:rPr lang="en" sz="1600" b="1" noProof="1">
-                <a:solidFill>
-                  <a:srgbClr val="0000FF"/>
-                </a:solidFill>
-                <a:effectLst/>
-                <a:latin typeface="Consolas" panose="020B0609020204030204" pitchFamily="49" charset="0"/>
-                <a:cs typeface="Consolas" panose="020B0609020204030204" pitchFamily="49" charset="0"/>
-              </a:rPr>
-              <a:t>await</a:t>
-            </a:r>
-            <a:r>
-              <a:rPr lang="en" sz="1600" noProof="1">
-                <a:effectLst/>
-                <a:latin typeface="Consolas" panose="020B0609020204030204" pitchFamily="49" charset="0"/>
-                <a:cs typeface="Consolas" panose="020B0609020204030204" pitchFamily="49" charset="0"/>
-              </a:rPr>
-              <a:t> asyncio.start_server(handle_connection, host, port)</a:t>
-            </a:r>
-            <a:br>
-              <a:rPr lang="en" sz="1600" noProof="1">
-                <a:effectLst/>
-                <a:latin typeface="Consolas" panose="020B0609020204030204" pitchFamily="49" charset="0"/>
-                <a:cs typeface="Consolas" panose="020B0609020204030204" pitchFamily="49" charset="0"/>
-              </a:rPr>
-            </a:br>
-            <a:r>
-              <a:rPr lang="en" sz="1600" noProof="1">
-                <a:effectLst/>
-                <a:latin typeface="Consolas" panose="020B0609020204030204" pitchFamily="49" charset="0"/>
-                <a:cs typeface="Consolas" panose="020B0609020204030204" pitchFamily="49" charset="0"/>
-              </a:rPr>
-              <a:t>    </a:t>
-            </a:r>
-            <a:r>
-              <a:rPr lang="en" sz="1600" b="1" noProof="1">
-                <a:solidFill>
-                  <a:srgbClr val="3C4C72"/>
-                </a:solidFill>
-                <a:effectLst/>
-                <a:latin typeface="Consolas" panose="020B0609020204030204" pitchFamily="49" charset="0"/>
-                <a:cs typeface="Consolas" panose="020B0609020204030204" pitchFamily="49" charset="0"/>
-              </a:rPr>
-              <a:t>print</a:t>
-            </a:r>
-            <a:r>
-              <a:rPr lang="en" sz="1600" noProof="1">
-                <a:effectLst/>
-                <a:latin typeface="Consolas" panose="020B0609020204030204" pitchFamily="49" charset="0"/>
-                <a:cs typeface="Consolas" panose="020B0609020204030204" pitchFamily="49" charset="0"/>
-              </a:rPr>
-              <a:t>(f</a:t>
-            </a:r>
-            <a:r>
-              <a:rPr lang="en" sz="1600" noProof="1">
-                <a:solidFill>
-                  <a:srgbClr val="036A07"/>
-                </a:solidFill>
-                <a:effectLst/>
-                <a:latin typeface="Consolas" panose="020B0609020204030204" pitchFamily="49" charset="0"/>
-                <a:cs typeface="Consolas" panose="020B0609020204030204" pitchFamily="49" charset="0"/>
-              </a:rPr>
-              <a:t>"Start server..."</a:t>
-            </a:r>
-            <a:r>
-              <a:rPr lang="en" sz="1600" noProof="1">
-                <a:effectLst/>
-                <a:latin typeface="Consolas" panose="020B0609020204030204" pitchFamily="49" charset="0"/>
-                <a:cs typeface="Consolas" panose="020B0609020204030204" pitchFamily="49" charset="0"/>
-              </a:rPr>
-              <a:t>)</a:t>
-            </a:r>
-            <a:br>
-              <a:rPr lang="en" sz="1600" noProof="1">
-                <a:effectLst/>
-                <a:latin typeface="Consolas" panose="020B0609020204030204" pitchFamily="49" charset="0"/>
-                <a:cs typeface="Consolas" panose="020B0609020204030204" pitchFamily="49" charset="0"/>
-              </a:rPr>
-            </a:br>
-            <a:r>
-              <a:rPr lang="en" sz="1600" noProof="1">
-                <a:effectLst/>
-                <a:latin typeface="Consolas" panose="020B0609020204030204" pitchFamily="49" charset="0"/>
-                <a:cs typeface="Consolas" panose="020B0609020204030204" pitchFamily="49" charset="0"/>
-              </a:rPr>
-              <a:t>    </a:t>
-            </a:r>
-            <a:r>
-              <a:rPr lang="en" sz="1600" b="1" noProof="1">
-                <a:solidFill>
-                  <a:srgbClr val="0000FF"/>
-                </a:solidFill>
-                <a:effectLst/>
-                <a:latin typeface="Consolas" panose="020B0609020204030204" pitchFamily="49" charset="0"/>
-                <a:cs typeface="Consolas" panose="020B0609020204030204" pitchFamily="49" charset="0"/>
-              </a:rPr>
-              <a:t>async</a:t>
-            </a:r>
-            <a:r>
-              <a:rPr lang="en" sz="1600" noProof="1">
-                <a:effectLst/>
-                <a:latin typeface="Consolas" panose="020B0609020204030204" pitchFamily="49" charset="0"/>
-                <a:cs typeface="Consolas" panose="020B0609020204030204" pitchFamily="49" charset="0"/>
-              </a:rPr>
-              <a:t> </a:t>
-            </a:r>
-            <a:r>
-              <a:rPr lang="en" sz="1600" b="1" noProof="1">
-                <a:solidFill>
-                  <a:srgbClr val="0000FF"/>
-                </a:solidFill>
-                <a:effectLst/>
-                <a:latin typeface="Consolas" panose="020B0609020204030204" pitchFamily="49" charset="0"/>
-                <a:cs typeface="Consolas" panose="020B0609020204030204" pitchFamily="49" charset="0"/>
-              </a:rPr>
-              <a:t>with</a:t>
-            </a:r>
-            <a:r>
-              <a:rPr lang="en" sz="1600" noProof="1">
-                <a:effectLst/>
-                <a:latin typeface="Consolas" panose="020B0609020204030204" pitchFamily="49" charset="0"/>
-                <a:cs typeface="Consolas" panose="020B0609020204030204" pitchFamily="49" charset="0"/>
-              </a:rPr>
-              <a:t> server:</a:t>
-            </a:r>
-            <a:br>
-              <a:rPr lang="en" sz="1600" noProof="1">
-                <a:effectLst/>
-                <a:latin typeface="Consolas" panose="020B0609020204030204" pitchFamily="49" charset="0"/>
-                <a:cs typeface="Consolas" panose="020B0609020204030204" pitchFamily="49" charset="0"/>
-              </a:rPr>
-            </a:br>
-            <a:r>
-              <a:rPr lang="en" sz="1600" noProof="1">
-                <a:effectLst/>
-                <a:latin typeface="Consolas" panose="020B0609020204030204" pitchFamily="49" charset="0"/>
-                <a:cs typeface="Consolas" panose="020B0609020204030204" pitchFamily="49" charset="0"/>
-              </a:rPr>
-              <a:t>        </a:t>
-            </a:r>
-            <a:r>
-              <a:rPr lang="en" sz="1600" b="1" noProof="1">
-                <a:solidFill>
-                  <a:srgbClr val="0000FF"/>
-                </a:solidFill>
-                <a:effectLst/>
-                <a:latin typeface="Consolas" panose="020B0609020204030204" pitchFamily="49" charset="0"/>
-                <a:cs typeface="Consolas" panose="020B0609020204030204" pitchFamily="49" charset="0"/>
-              </a:rPr>
-              <a:t>await</a:t>
-            </a:r>
-            <a:r>
-              <a:rPr lang="en" sz="1600" noProof="1">
-                <a:effectLst/>
-                <a:latin typeface="Consolas" panose="020B0609020204030204" pitchFamily="49" charset="0"/>
-                <a:cs typeface="Consolas" panose="020B0609020204030204" pitchFamily="49" charset="0"/>
-              </a:rPr>
-              <a:t> server.serve_forever()</a:t>
-            </a:r>
-            <a:br>
-              <a:rPr lang="en" sz="1600" noProof="1">
-                <a:effectLst/>
-                <a:latin typeface="Consolas" panose="020B0609020204030204" pitchFamily="49" charset="0"/>
-                <a:cs typeface="Consolas" panose="020B0609020204030204" pitchFamily="49" charset="0"/>
-              </a:rPr>
-            </a:br>
-            <a:br>
-              <a:rPr lang="en" sz="1600" noProof="1">
-                <a:effectLst/>
-                <a:latin typeface="Consolas" panose="020B0609020204030204" pitchFamily="49" charset="0"/>
-                <a:cs typeface="Consolas" panose="020B0609020204030204" pitchFamily="49" charset="0"/>
-              </a:rPr>
-            </a:br>
-            <a:r>
-              <a:rPr lang="en" sz="1600" noProof="1">
-                <a:effectLst/>
-                <a:latin typeface="Consolas" panose="020B0609020204030204" pitchFamily="49" charset="0"/>
-                <a:cs typeface="Consolas" panose="020B0609020204030204" pitchFamily="49" charset="0"/>
-              </a:rPr>
-              <a:t>asyncio.run( main(</a:t>
-            </a:r>
-            <a:r>
-              <a:rPr lang="en" sz="1600" b="1" noProof="1">
-                <a:solidFill>
-                  <a:srgbClr val="C5060B"/>
-                </a:solidFill>
-                <a:effectLst/>
-                <a:latin typeface="Consolas" panose="020B0609020204030204" pitchFamily="49" charset="0"/>
-                <a:cs typeface="Consolas" panose="020B0609020204030204" pitchFamily="49" charset="0"/>
-              </a:rPr>
-              <a:t>HOST</a:t>
-            </a:r>
-            <a:r>
-              <a:rPr lang="en" sz="1600" noProof="1">
-                <a:effectLst/>
-                <a:latin typeface="Consolas" panose="020B0609020204030204" pitchFamily="49" charset="0"/>
-                <a:cs typeface="Consolas" panose="020B0609020204030204" pitchFamily="49" charset="0"/>
-              </a:rPr>
-              <a:t>, </a:t>
-            </a:r>
-            <a:r>
-              <a:rPr lang="en" sz="1600" b="1" noProof="1">
-                <a:solidFill>
-                  <a:srgbClr val="C5060B"/>
-                </a:solidFill>
-                <a:effectLst/>
-                <a:latin typeface="Consolas" panose="020B0609020204030204" pitchFamily="49" charset="0"/>
-                <a:cs typeface="Consolas" panose="020B0609020204030204" pitchFamily="49" charset="0"/>
-              </a:rPr>
               <a:t>PORT</a:t>
             </a:r>
             <a:r>
-              <a:rPr lang="en" sz="1600" noProof="1">
+              <a:rPr lang="en" sz="1800" noProof="1">
                 <a:effectLst/>
                 <a:latin typeface="Consolas" panose="020B0609020204030204" pitchFamily="49" charset="0"/>
                 <a:cs typeface="Consolas" panose="020B0609020204030204" pitchFamily="49" charset="0"/>
@@ -36458,23 +37487,226 @@
               <a:t>) )</a:t>
             </a:r>
             <a:br>
-              <a:rPr lang="en" sz="1600" noProof="1">
-                <a:effectLst/>
-                <a:latin typeface="Consolas" panose="020B0609020204030204" pitchFamily="49" charset="0"/>
-                <a:cs typeface="Consolas" panose="020B0609020204030204" pitchFamily="49" charset="0"/>
-              </a:rPr>
-            </a:br>
-            <a:endParaRPr lang="en" sz="1600" noProof="1">
+              <a:rPr lang="en" sz="1800" noProof="1">
+                <a:effectLst/>
+                <a:latin typeface="Consolas" panose="020B0609020204030204" pitchFamily="49" charset="0"/>
+                <a:cs typeface="Consolas" panose="020B0609020204030204" pitchFamily="49" charset="0"/>
+              </a:rPr>
+            </a:br>
+            <a:endParaRPr lang="en" sz="1800" noProof="1">
               <a:effectLst/>
               <a:latin typeface="Consolas" panose="020B0609020204030204" pitchFamily="49" charset="0"/>
               <a:cs typeface="Consolas" panose="020B0609020204030204" pitchFamily="49" charset="0"/>
             </a:endParaRPr>
           </a:p>
-          <a:p>
-            <a:endParaRPr lang="en" sz="1600" noProof="1">
-              <a:latin typeface="Consolas" panose="020B0609020204030204" pitchFamily="49" charset="0"/>
-              <a:cs typeface="Consolas" panose="020B0609020204030204" pitchFamily="49" charset="0"/>
-            </a:endParaRPr>
+        </p:txBody>
+      </p:sp>
+      <p:sp>
+        <p:nvSpPr>
+          <p:cNvPr id="2" name="Заголовок 1">
+            <a:extLst>
+              <a:ext uri="{FF2B5EF4-FFF2-40B4-BE49-F238E27FC236}">
+                <a16:creationId xmlns:a16="http://schemas.microsoft.com/office/drawing/2014/main" id="{F63EE9A6-9BBF-7F6B-8888-8330C89AC117}"/>
+              </a:ext>
+            </a:extLst>
+          </p:cNvPr>
+          <p:cNvSpPr>
+            <a:spLocks noGrp="1"/>
+          </p:cNvSpPr>
+          <p:nvPr>
+            <p:ph type="title"/>
+          </p:nvPr>
+        </p:nvSpPr>
+        <p:spPr>
+          <a:xfrm>
+            <a:off x="6802022" y="5900058"/>
+            <a:ext cx="4656248" cy="819642"/>
+          </a:xfrm>
+        </p:spPr>
+        <p:txBody>
+          <a:bodyPr>
+            <a:noAutofit/>
+          </a:bodyPr>
+          <a:lstStyle/>
+          <a:p>
+            <a:pPr>
+              <a:lnSpc>
+                <a:spcPct val="80000"/>
+              </a:lnSpc>
+            </a:pPr>
+            <a:r>
+              <a:rPr lang="en-US" sz="2800" noProof="1">
+                <a:cs typeface="Consolas" panose="020B0609020204030204" pitchFamily="49" charset="0"/>
+              </a:rPr>
+              <a:t>«</a:t>
+            </a:r>
+            <a:r>
+              <a:rPr lang="ru-RU" sz="2800" noProof="1">
+                <a:cs typeface="Consolas" panose="020B0609020204030204" pitchFamily="49" charset="0"/>
+              </a:rPr>
+              <a:t>Правильная</a:t>
+            </a:r>
+            <a:r>
+              <a:rPr lang="en-US" sz="2800" noProof="1">
+                <a:cs typeface="Consolas" panose="020B0609020204030204" pitchFamily="49" charset="0"/>
+              </a:rPr>
+              <a:t>» </a:t>
+            </a:r>
+            <a:r>
+              <a:rPr lang="ru-RU" sz="2800" noProof="1">
+                <a:effectLst/>
+                <a:cs typeface="Consolas" panose="020B0609020204030204" pitchFamily="49" charset="0"/>
+              </a:rPr>
+              <a:t>асинхронщина через </a:t>
+            </a:r>
+            <a:r>
+              <a:rPr lang="en-US" sz="2800" noProof="1">
+                <a:effectLst/>
+                <a:cs typeface="Consolas" panose="020B0609020204030204" pitchFamily="49" charset="0"/>
+              </a:rPr>
+              <a:t>asyncio</a:t>
+            </a:r>
+            <a:endParaRPr lang="ru-RU" sz="2800" dirty="0"/>
+          </a:p>
+        </p:txBody>
+      </p:sp>
+      <p:sp>
+        <p:nvSpPr>
+          <p:cNvPr id="7" name="TextBox 6">
+            <a:extLst>
+              <a:ext uri="{FF2B5EF4-FFF2-40B4-BE49-F238E27FC236}">
+                <a16:creationId xmlns:a16="http://schemas.microsoft.com/office/drawing/2014/main" id="{872F78A4-5EBF-FF30-D18E-56E451C0B913}"/>
+              </a:ext>
+            </a:extLst>
+          </p:cNvPr>
+          <p:cNvSpPr txBox="1"/>
+          <p:nvPr/>
+        </p:nvSpPr>
+        <p:spPr>
+          <a:xfrm>
+            <a:off x="6068292" y="2732452"/>
+            <a:ext cx="6123708" cy="2585323"/>
+          </a:xfrm>
+          <a:prstGeom prst="rect">
+            <a:avLst/>
+          </a:prstGeom>
+          <a:solidFill>
+            <a:schemeClr val="tx1"/>
+          </a:solidFill>
+        </p:spPr>
+        <p:txBody>
+          <a:bodyPr wrap="square">
+            <a:spAutoFit/>
+          </a:bodyPr>
+          <a:lstStyle/>
+          <a:p>
+            <a:pPr>
+              <a:buNone/>
+            </a:pPr>
+            <a:r>
+              <a:rPr lang="en" noProof="1">
+                <a:solidFill>
+                  <a:srgbClr val="2FFF12"/>
+                </a:solidFill>
+                <a:effectLst/>
+                <a:latin typeface="Consolas" panose="020B0609020204030204" pitchFamily="49" charset="0"/>
+                <a:cs typeface="Consolas" panose="020B0609020204030204" pitchFamily="49" charset="0"/>
+              </a:rPr>
+              <a:t>$ src/tcp_socket_server_6_asyncio.py </a:t>
+            </a:r>
+          </a:p>
+          <a:p>
+            <a:pPr>
+              <a:buNone/>
+            </a:pPr>
+            <a:r>
+              <a:rPr lang="en" noProof="1">
+                <a:solidFill>
+                  <a:srgbClr val="2FFF12"/>
+                </a:solidFill>
+                <a:effectLst/>
+                <a:latin typeface="Consolas" panose="020B0609020204030204" pitchFamily="49" charset="0"/>
+                <a:cs typeface="Consolas" panose="020B0609020204030204" pitchFamily="49" charset="0"/>
+              </a:rPr>
+              <a:t>Start server...</a:t>
+            </a:r>
+          </a:p>
+          <a:p>
+            <a:pPr>
+              <a:buNone/>
+            </a:pPr>
+            <a:r>
+              <a:rPr lang="en" noProof="1">
+                <a:solidFill>
+                  <a:srgbClr val="2FFF12"/>
+                </a:solidFill>
+                <a:effectLst/>
+                <a:latin typeface="Consolas" panose="020B0609020204030204" pitchFamily="49" charset="0"/>
+                <a:cs typeface="Consolas" panose="020B0609020204030204" pitchFamily="49" charset="0"/>
+              </a:rPr>
+              <a:t>Connected by ('::1', 63002, 0, 0)</a:t>
+            </a:r>
+          </a:p>
+          <a:p>
+            <a:pPr>
+              <a:buNone/>
+            </a:pPr>
+            <a:r>
+              <a:rPr lang="en" noProof="1">
+                <a:solidFill>
+                  <a:srgbClr val="2FFF12"/>
+                </a:solidFill>
+                <a:effectLst/>
+                <a:latin typeface="Consolas" panose="020B0609020204030204" pitchFamily="49" charset="0"/>
+                <a:cs typeface="Consolas" panose="020B0609020204030204" pitchFamily="49" charset="0"/>
+              </a:rPr>
+              <a:t>Received b'hello, world!\r\n' from: ('::1', 63002, 0, 0)</a:t>
+            </a:r>
+          </a:p>
+          <a:p>
+            <a:pPr>
+              <a:buNone/>
+            </a:pPr>
+            <a:r>
+              <a:rPr lang="en" noProof="1">
+                <a:solidFill>
+                  <a:srgbClr val="2FFF12"/>
+                </a:solidFill>
+                <a:effectLst/>
+                <a:latin typeface="Consolas" panose="020B0609020204030204" pitchFamily="49" charset="0"/>
+                <a:cs typeface="Consolas" panose="020B0609020204030204" pitchFamily="49" charset="0"/>
+              </a:rPr>
+              <a:t>Sending: b'HELLO, WORLD!\r\n' to: ('::1', 63002, 0, 0)</a:t>
+            </a:r>
+          </a:p>
+          <a:p>
+            <a:pPr>
+              <a:buNone/>
+            </a:pPr>
+            <a:r>
+              <a:rPr lang="en" noProof="1">
+                <a:solidFill>
+                  <a:srgbClr val="2FFF12"/>
+                </a:solidFill>
+                <a:effectLst/>
+                <a:latin typeface="Consolas" panose="020B0609020204030204" pitchFamily="49" charset="0"/>
+                <a:cs typeface="Consolas" panose="020B0609020204030204" pitchFamily="49" charset="0"/>
+              </a:rPr>
+              <a:t>Received b'' from: ('::1', 63002, 0, 0)</a:t>
+            </a:r>
+          </a:p>
+          <a:p>
+            <a:r>
+              <a:rPr lang="en" noProof="1">
+                <a:solidFill>
+                  <a:srgbClr val="2FFF12"/>
+                </a:solidFill>
+                <a:effectLst/>
+                <a:latin typeface="Consolas" panose="020B0609020204030204" pitchFamily="49" charset="0"/>
+                <a:cs typeface="Consolas" panose="020B0609020204030204" pitchFamily="49" charset="0"/>
+              </a:rPr>
+              <a:t>Disconnected by ('::1', 63002, 0, 0)</a:t>
+            </a:r>
           </a:p>
         </p:txBody>
       </p:sp>

</xml_diff>